<commit_message>
Diapo final ( manque gantt )
</commit_message>
<xml_diff>
--- a/doc/diapo pour les bouseux.pptx
+++ b/doc/diapo pour les bouseux.pptx
@@ -3273,7 +3273,7 @@
       </p:grpSpPr>
       <p:sp>
         <p:nvSpPr>
-          <p:cNvPr id="218" name="Bilan"/>
+          <p:cNvPr id="221" name="Bilan"/>
           <p:cNvSpPr txBox="1"/>
           <p:nvPr/>
         </p:nvSpPr>
@@ -3318,7 +3318,7 @@
       </p:sp>
       <p:sp>
         <p:nvSpPr>
-          <p:cNvPr id="219" name="Numéro de diapositive"/>
+          <p:cNvPr id="222" name="Numéro de diapositive"/>
           <p:cNvSpPr txBox="1"/>
           <p:nvPr>
             <p:ph type="sldNum" sz="quarter" idx="2"/>
@@ -3356,7 +3356,7 @@
       </p:sp>
       <p:sp>
         <p:nvSpPr>
-          <p:cNvPr id="220" name="Technique :"/>
+          <p:cNvPr id="223" name="Technique :"/>
           <p:cNvSpPr txBox="1"/>
           <p:nvPr/>
         </p:nvSpPr>
@@ -3399,7 +3399,7 @@
       </p:sp>
       <p:sp>
         <p:nvSpPr>
-          <p:cNvPr id="221" name="- Programme fonctionnel"/>
+          <p:cNvPr id="224" name="- Programme fonctionnel"/>
           <p:cNvSpPr txBox="1"/>
           <p:nvPr/>
         </p:nvSpPr>
@@ -3442,7 +3442,7 @@
       </p:sp>
       <p:sp>
         <p:nvSpPr>
-          <p:cNvPr id="222" name="- Possible d’améliorer l’aspect graphique"/>
+          <p:cNvPr id="225" name="- Possible d’améliorer l’aspect graphique"/>
           <p:cNvSpPr txBox="1"/>
           <p:nvPr/>
         </p:nvSpPr>
@@ -3485,7 +3485,7 @@
       </p:sp>
       <p:sp>
         <p:nvSpPr>
-          <p:cNvPr id="223" name="- Ajout d’une IA pour jouer seul"/>
+          <p:cNvPr id="226" name="- Ajout d’une IA pour jouer seul"/>
           <p:cNvSpPr txBox="1"/>
           <p:nvPr/>
         </p:nvSpPr>
@@ -3528,13 +3528,13 @@
       </p:sp>
       <p:sp>
         <p:nvSpPr>
-          <p:cNvPr id="224" name="Humain :"/>
+          <p:cNvPr id="227" name="Humain :"/>
           <p:cNvSpPr txBox="1"/>
           <p:nvPr/>
         </p:nvSpPr>
         <p:spPr>
           <a:xfrm>
-            <a:off x="1049444" y="2440312"/>
+            <a:off x="1049444" y="2453012"/>
             <a:ext cx="1744981" cy="548133"/>
           </a:xfrm>
           <a:prstGeom prst="rect">
@@ -3571,7 +3571,7 @@
       </p:sp>
       <p:sp>
         <p:nvSpPr>
-          <p:cNvPr id="225" name="- Difficile de se coordonner"/>
+          <p:cNvPr id="228" name="- Difficile de se coordonner"/>
           <p:cNvSpPr txBox="1"/>
           <p:nvPr/>
         </p:nvSpPr>
@@ -3614,7 +3614,7 @@
       </p:sp>
       <p:sp>
         <p:nvSpPr>
-          <p:cNvPr id="226" name="- Bonne entente et bonne ambiance de travail"/>
+          <p:cNvPr id="229" name="- Bonne entente et bonne ambiance de travail"/>
           <p:cNvSpPr txBox="1"/>
           <p:nvPr/>
         </p:nvSpPr>
@@ -3657,7 +3657,7 @@
       </p:sp>
       <p:sp>
         <p:nvSpPr>
-          <p:cNvPr id="227" name="Pédagogique :"/>
+          <p:cNvPr id="230" name="Pédagogique :"/>
           <p:cNvSpPr txBox="1"/>
           <p:nvPr/>
         </p:nvSpPr>
@@ -3700,7 +3700,7 @@
       </p:sp>
       <p:sp>
         <p:nvSpPr>
-          <p:cNvPr id="228" name="- Meilleure connaissance du jeu d’échecs"/>
+          <p:cNvPr id="231" name="- Meilleure connaissance du jeu d’échecs"/>
           <p:cNvSpPr txBox="1"/>
           <p:nvPr/>
         </p:nvSpPr>
@@ -3743,7 +3743,7 @@
       </p:sp>
       <p:sp>
         <p:nvSpPr>
-          <p:cNvPr id="229" name="- Utilisation de GitKraken pour la gestion du code"/>
+          <p:cNvPr id="232" name="- Utilisation de GitKraken pour la gestion du code"/>
           <p:cNvSpPr txBox="1"/>
           <p:nvPr/>
         </p:nvSpPr>
@@ -3786,7 +3786,7 @@
       </p:sp>
       <p:sp>
         <p:nvSpPr>
-          <p:cNvPr id="230" name="- Utilisation d’une grande partie des connaissances"/>
+          <p:cNvPr id="233" name="- Utilisation d’une grande partie des connaissances"/>
           <p:cNvSpPr txBox="1"/>
           <p:nvPr/>
         </p:nvSpPr>
@@ -3829,7 +3829,7 @@
       </p:sp>
       <p:sp>
         <p:nvSpPr>
-          <p:cNvPr id="231" name="- Apprentissage de la répartition du travail"/>
+          <p:cNvPr id="234" name="- Apprentissage de la répartition du travail"/>
           <p:cNvSpPr txBox="1"/>
           <p:nvPr/>
         </p:nvSpPr>
@@ -3872,7 +3872,7 @@
       </p:sp>
       <p:pic>
         <p:nvPicPr>
-          <p:cNvPr id="232" name="computer.png" descr="computer.png"/>
+          <p:cNvPr id="235" name="computer.png" descr="computer.png"/>
           <p:cNvPicPr>
             <a:picLocks noChangeAspect="1"/>
           </p:cNvPicPr>
@@ -3901,7 +3901,7 @@
       </p:pic>
       <p:pic>
         <p:nvPicPr>
-          <p:cNvPr id="233" name="artificial-intelligence.png" descr="artificial-intelligence.png"/>
+          <p:cNvPr id="236" name="artificial-intelligence.png" descr="artificial-intelligence.png"/>
           <p:cNvPicPr>
             <a:picLocks noChangeAspect="1"/>
           </p:cNvPicPr>
@@ -3930,7 +3930,7 @@
       </p:pic>
       <p:pic>
         <p:nvPicPr>
-          <p:cNvPr id="234" name="code.png" descr="code.png"/>
+          <p:cNvPr id="237" name="code.png" descr="code.png"/>
           <p:cNvPicPr>
             <a:picLocks noChangeAspect="1"/>
           </p:cNvPicPr>
@@ -3959,7 +3959,7 @@
       </p:pic>
       <p:pic>
         <p:nvPicPr>
-          <p:cNvPr id="235" name="laptop.png" descr="laptop.png"/>
+          <p:cNvPr id="238" name="laptop.png" descr="laptop.png"/>
           <p:cNvPicPr>
             <a:picLocks noChangeAspect="1"/>
           </p:cNvPicPr>
@@ -3988,7 +3988,7 @@
       </p:pic>
       <p:sp>
         <p:nvSpPr>
-          <p:cNvPr id="236" name="- Apprentissage de la communication en groupe"/>
+          <p:cNvPr id="239" name="- Apprentissage de la communication en groupe"/>
           <p:cNvSpPr txBox="1"/>
           <p:nvPr/>
         </p:nvSpPr>
@@ -4031,7 +4031,7 @@
       </p:sp>
       <p:pic>
         <p:nvPicPr>
-          <p:cNvPr id="237" name="calendar.png" descr="calendar.png"/>
+          <p:cNvPr id="240" name="calendar.png" descr="calendar.png"/>
           <p:cNvPicPr>
             <a:picLocks noChangeAspect="1"/>
           </p:cNvPicPr>
@@ -4060,7 +4060,7 @@
       </p:pic>
       <p:pic>
         <p:nvPicPr>
-          <p:cNvPr id="238" name="employees.png" descr="employees.png"/>
+          <p:cNvPr id="241" name="employees.png" descr="employees.png"/>
           <p:cNvPicPr>
             <a:picLocks noChangeAspect="1"/>
           </p:cNvPicPr>
@@ -4089,7 +4089,7 @@
       </p:pic>
       <p:pic>
         <p:nvPicPr>
-          <p:cNvPr id="239" name="speak.png" descr="speak.png"/>
+          <p:cNvPr id="242" name="speak.png" descr="speak.png"/>
           <p:cNvPicPr>
             <a:picLocks noChangeAspect="1"/>
           </p:cNvPicPr>
@@ -4118,7 +4118,7 @@
       </p:pic>
       <p:pic>
         <p:nvPicPr>
-          <p:cNvPr id="240" name="teamwork.png" descr="teamwork.png"/>
+          <p:cNvPr id="243" name="teamwork.png" descr="teamwork.png"/>
           <p:cNvPicPr>
             <a:picLocks noChangeAspect="1"/>
           </p:cNvPicPr>
@@ -4147,7 +4147,7 @@
       </p:pic>
       <p:pic>
         <p:nvPicPr>
-          <p:cNvPr id="241" name="bookshelf.png" descr="bookshelf.png"/>
+          <p:cNvPr id="244" name="bookshelf.png" descr="bookshelf.png"/>
           <p:cNvPicPr>
             <a:picLocks noChangeAspect="1"/>
           </p:cNvPicPr>
@@ -4176,7 +4176,7 @@
       </p:pic>
       <p:pic>
         <p:nvPicPr>
-          <p:cNvPr id="242" name="chat.png" descr="chat.png"/>
+          <p:cNvPr id="245" name="chat.png" descr="chat.png"/>
           <p:cNvPicPr>
             <a:picLocks noChangeAspect="1"/>
           </p:cNvPicPr>
@@ -4205,7 +4205,7 @@
       </p:pic>
       <p:pic>
         <p:nvPicPr>
-          <p:cNvPr id="243" name="chess-board.png" descr="chess-board.png"/>
+          <p:cNvPr id="246" name="chess-board.png" descr="chess-board.png"/>
           <p:cNvPicPr>
             <a:picLocks noChangeAspect="1"/>
           </p:cNvPicPr>
@@ -4234,7 +4234,7 @@
       </p:pic>
       <p:pic>
         <p:nvPicPr>
-          <p:cNvPr id="244" name="classroom.png" descr="classroom.png"/>
+          <p:cNvPr id="247" name="classroom.png" descr="classroom.png"/>
           <p:cNvPicPr>
             <a:picLocks noChangeAspect="1"/>
           </p:cNvPicPr>
@@ -4263,7 +4263,7 @@
       </p:pic>
       <p:pic>
         <p:nvPicPr>
-          <p:cNvPr id="245" name="GitKraken-Logo.png" descr="GitKraken-Logo.png"/>
+          <p:cNvPr id="248" name="GitKraken-Logo.png" descr="GitKraken-Logo.png"/>
           <p:cNvPicPr>
             <a:picLocks noChangeAspect="1"/>
           </p:cNvPicPr>
@@ -4343,7 +4343,7 @@
                                       <p:cBhvr>
                                         <p:cTn id="6" fill="hold"/>
                                         <p:tgtEl>
-                                          <p:spTgt spid="220"/>
+                                          <p:spTgt spid="223"/>
                                         </p:tgtEl>
                                         <p:attrNameLst>
                                           <p:attrName>style.visibility</p:attrName>
@@ -4355,9 +4355,9 @@
                                     </p:set>
                                     <p:animEffect filter="dissolve" transition="in">
                                       <p:cBhvr>
-                                        <p:cTn id="7" dur="500"/>
-                                        <p:tgtEl>
-                                          <p:spTgt spid="220"/>
+                                        <p:cTn id="7" dur="799"/>
+                                        <p:tgtEl>
+                                          <p:spTgt spid="223"/>
                                         </p:tgtEl>
                                       </p:cBhvr>
                                     </p:animEffect>
@@ -4370,7 +4370,7 @@
                         <p:par>
                           <p:cTn id="8" fill="hold">
                             <p:stCondLst>
-                              <p:cond delay="500"/>
+                              <p:cond delay="799"/>
                             </p:stCondLst>
                             <p:childTnLst>
                               <p:par>
@@ -4386,7 +4386,7 @@
                                       <p:cBhvr>
                                         <p:cTn id="10" fill="hold"/>
                                         <p:tgtEl>
-                                          <p:spTgt spid="232"/>
+                                          <p:spTgt spid="235"/>
                                         </p:tgtEl>
                                         <p:attrNameLst>
                                           <p:attrName>style.visibility</p:attrName>
@@ -4398,9 +4398,9 @@
                                     </p:set>
                                     <p:animEffect filter="dissolve" transition="in">
                                       <p:cBhvr>
-                                        <p:cTn id="11" dur="499"/>
-                                        <p:tgtEl>
-                                          <p:spTgt spid="232"/>
+                                        <p:cTn id="11" dur="799"/>
+                                        <p:tgtEl>
+                                          <p:spTgt spid="235"/>
                                         </p:tgtEl>
                                       </p:cBhvr>
                                     </p:animEffect>
@@ -4438,7 +4438,7 @@
                                       <p:cBhvr>
                                         <p:cTn id="15" fill="hold"/>
                                         <p:tgtEl>
-                                          <p:spTgt spid="221"/>
+                                          <p:spTgt spid="224"/>
                                         </p:tgtEl>
                                         <p:attrNameLst>
                                           <p:attrName>style.visibility</p:attrName>
@@ -4450,9 +4450,9 @@
                                     </p:set>
                                     <p:animEffect filter="dissolve" transition="in">
                                       <p:cBhvr>
-                                        <p:cTn id="16" dur="800"/>
-                                        <p:tgtEl>
-                                          <p:spTgt spid="221"/>
+                                        <p:cTn id="16" dur="799"/>
+                                        <p:tgtEl>
+                                          <p:spTgt spid="224"/>
                                         </p:tgtEl>
                                       </p:cBhvr>
                                     </p:animEffect>
@@ -4465,7 +4465,7 @@
                         <p:par>
                           <p:cTn id="17" fill="hold">
                             <p:stCondLst>
-                              <p:cond delay="800"/>
+                              <p:cond delay="799"/>
                             </p:stCondLst>
                             <p:childTnLst>
                               <p:par>
@@ -4481,7 +4481,7 @@
                                       <p:cBhvr>
                                         <p:cTn id="19" fill="hold"/>
                                         <p:tgtEl>
-                                          <p:spTgt spid="234"/>
+                                          <p:spTgt spid="237"/>
                                         </p:tgtEl>
                                         <p:attrNameLst>
                                           <p:attrName>style.visibility</p:attrName>
@@ -4495,7 +4495,7 @@
                                       <p:cBhvr>
                                         <p:cTn id="20" dur="799"/>
                                         <p:tgtEl>
-                                          <p:spTgt spid="234"/>
+                                          <p:spTgt spid="237"/>
                                         </p:tgtEl>
                                       </p:cBhvr>
                                     </p:animEffect>
@@ -4533,7 +4533,7 @@
                                       <p:cBhvr>
                                         <p:cTn id="24" fill="hold"/>
                                         <p:tgtEl>
-                                          <p:spTgt spid="222"/>
+                                          <p:spTgt spid="225"/>
                                         </p:tgtEl>
                                         <p:attrNameLst>
                                           <p:attrName>style.visibility</p:attrName>
@@ -4547,7 +4547,7 @@
                                       <p:cBhvr>
                                         <p:cTn id="25" dur="800"/>
                                         <p:tgtEl>
-                                          <p:spTgt spid="222"/>
+                                          <p:spTgt spid="225"/>
                                         </p:tgtEl>
                                       </p:cBhvr>
                                     </p:animEffect>
@@ -4576,7 +4576,7 @@
                                       <p:cBhvr>
                                         <p:cTn id="28" fill="hold"/>
                                         <p:tgtEl>
-                                          <p:spTgt spid="235"/>
+                                          <p:spTgt spid="238"/>
                                         </p:tgtEl>
                                         <p:attrNameLst>
                                           <p:attrName>style.visibility</p:attrName>
@@ -4590,7 +4590,7 @@
                                       <p:cBhvr>
                                         <p:cTn id="29" dur="799"/>
                                         <p:tgtEl>
-                                          <p:spTgt spid="235"/>
+                                          <p:spTgt spid="238"/>
                                         </p:tgtEl>
                                       </p:cBhvr>
                                     </p:animEffect>
@@ -4628,7 +4628,7 @@
                                       <p:cBhvr>
                                         <p:cTn id="33" fill="hold"/>
                                         <p:tgtEl>
-                                          <p:spTgt spid="223"/>
+                                          <p:spTgt spid="226"/>
                                         </p:tgtEl>
                                         <p:attrNameLst>
                                           <p:attrName>style.visibility</p:attrName>
@@ -4642,7 +4642,7 @@
                                       <p:cBhvr>
                                         <p:cTn id="34" dur="800"/>
                                         <p:tgtEl>
-                                          <p:spTgt spid="223"/>
+                                          <p:spTgt spid="226"/>
                                         </p:tgtEl>
                                       </p:cBhvr>
                                     </p:animEffect>
@@ -4671,7 +4671,7 @@
                                       <p:cBhvr>
                                         <p:cTn id="37" fill="hold"/>
                                         <p:tgtEl>
-                                          <p:spTgt spid="233"/>
+                                          <p:spTgt spid="236"/>
                                         </p:tgtEl>
                                         <p:attrNameLst>
                                           <p:attrName>style.visibility</p:attrName>
@@ -4685,7 +4685,7 @@
                                       <p:cBhvr>
                                         <p:cTn id="38" dur="799"/>
                                         <p:tgtEl>
-                                          <p:spTgt spid="233"/>
+                                          <p:spTgt spid="236"/>
                                         </p:tgtEl>
                                       </p:cBhvr>
                                     </p:animEffect>
@@ -4723,7 +4723,7 @@
                                       <p:cBhvr>
                                         <p:cTn id="42" dur="1000" fill="hold"/>
                                         <p:tgtEl>
-                                          <p:spTgt spid="220"/>
+                                          <p:spTgt spid="223"/>
                                         </p:tgtEl>
                                         <p:attrNameLst>
                                           <p:attrName>ppt_w</p:attrName>
@@ -4746,7 +4746,7 @@
                                       <p:cBhvr>
                                         <p:cTn id="43" dur="1000" fill="hold"/>
                                         <p:tgtEl>
-                                          <p:spTgt spid="220"/>
+                                          <p:spTgt spid="223"/>
                                         </p:tgtEl>
                                         <p:attrNameLst>
                                           <p:attrName>ppt_h</p:attrName>
@@ -4773,7 +4773,7 @@
                                           </p:stCondLst>
                                         </p:cTn>
                                         <p:tgtEl>
-                                          <p:spTgt spid="220"/>
+                                          <p:spTgt spid="223"/>
                                         </p:tgtEl>
                                         <p:attrNameLst>
                                           <p:attrName>style.visibility</p:attrName>
@@ -4808,7 +4808,7 @@
                                       <p:cBhvr>
                                         <p:cTn id="47" dur="1000" fill="hold"/>
                                         <p:tgtEl>
-                                          <p:spTgt spid="235"/>
+                                          <p:spTgt spid="238"/>
                                         </p:tgtEl>
                                         <p:attrNameLst>
                                           <p:attrName>ppt_w</p:attrName>
@@ -4831,7 +4831,7 @@
                                       <p:cBhvr>
                                         <p:cTn id="48" dur="1000" fill="hold"/>
                                         <p:tgtEl>
-                                          <p:spTgt spid="235"/>
+                                          <p:spTgt spid="238"/>
                                         </p:tgtEl>
                                         <p:attrNameLst>
                                           <p:attrName>ppt_h</p:attrName>
@@ -4858,7 +4858,7 @@
                                           </p:stCondLst>
                                         </p:cTn>
                                         <p:tgtEl>
-                                          <p:spTgt spid="235"/>
+                                          <p:spTgt spid="238"/>
                                         </p:tgtEl>
                                         <p:attrNameLst>
                                           <p:attrName>style.visibility</p:attrName>
@@ -4893,7 +4893,7 @@
                                       <p:cBhvr>
                                         <p:cTn id="52" dur="1000" fill="hold"/>
                                         <p:tgtEl>
-                                          <p:spTgt spid="233"/>
+                                          <p:spTgt spid="236"/>
                                         </p:tgtEl>
                                         <p:attrNameLst>
                                           <p:attrName>ppt_w</p:attrName>
@@ -4916,7 +4916,7 @@
                                       <p:cBhvr>
                                         <p:cTn id="53" dur="1000" fill="hold"/>
                                         <p:tgtEl>
-                                          <p:spTgt spid="233"/>
+                                          <p:spTgt spid="236"/>
                                         </p:tgtEl>
                                         <p:attrNameLst>
                                           <p:attrName>ppt_h</p:attrName>
@@ -4943,7 +4943,7 @@
                                           </p:stCondLst>
                                         </p:cTn>
                                         <p:tgtEl>
-                                          <p:spTgt spid="233"/>
+                                          <p:spTgt spid="236"/>
                                         </p:tgtEl>
                                         <p:attrNameLst>
                                           <p:attrName>style.visibility</p:attrName>
@@ -4978,7 +4978,7 @@
                                       <p:cBhvr>
                                         <p:cTn id="57" dur="1000" fill="hold"/>
                                         <p:tgtEl>
-                                          <p:spTgt spid="234"/>
+                                          <p:spTgt spid="237"/>
                                         </p:tgtEl>
                                         <p:attrNameLst>
                                           <p:attrName>ppt_w</p:attrName>
@@ -5001,7 +5001,7 @@
                                       <p:cBhvr>
                                         <p:cTn id="58" dur="1000" fill="hold"/>
                                         <p:tgtEl>
-                                          <p:spTgt spid="234"/>
+                                          <p:spTgt spid="237"/>
                                         </p:tgtEl>
                                         <p:attrNameLst>
                                           <p:attrName>ppt_h</p:attrName>
@@ -5028,7 +5028,7 @@
                                           </p:stCondLst>
                                         </p:cTn>
                                         <p:tgtEl>
-                                          <p:spTgt spid="234"/>
+                                          <p:spTgt spid="237"/>
                                         </p:tgtEl>
                                         <p:attrNameLst>
                                           <p:attrName>style.visibility</p:attrName>
@@ -5063,7 +5063,7 @@
                                       <p:cBhvr>
                                         <p:cTn id="62" dur="1000" fill="hold"/>
                                         <p:tgtEl>
-                                          <p:spTgt spid="232"/>
+                                          <p:spTgt spid="235"/>
                                         </p:tgtEl>
                                         <p:attrNameLst>
                                           <p:attrName>ppt_w</p:attrName>
@@ -5086,7 +5086,7 @@
                                       <p:cBhvr>
                                         <p:cTn id="63" dur="1000" fill="hold"/>
                                         <p:tgtEl>
-                                          <p:spTgt spid="232"/>
+                                          <p:spTgt spid="235"/>
                                         </p:tgtEl>
                                         <p:attrNameLst>
                                           <p:attrName>ppt_h</p:attrName>
@@ -5113,7 +5113,7 @@
                                           </p:stCondLst>
                                         </p:cTn>
                                         <p:tgtEl>
-                                          <p:spTgt spid="232"/>
+                                          <p:spTgt spid="235"/>
                                         </p:tgtEl>
                                         <p:attrNameLst>
                                           <p:attrName>style.visibility</p:attrName>
@@ -5148,7 +5148,7 @@
                                       <p:cBhvr>
                                         <p:cTn id="67" dur="1000" fill="hold"/>
                                         <p:tgtEl>
-                                          <p:spTgt spid="221"/>
+                                          <p:spTgt spid="224"/>
                                         </p:tgtEl>
                                         <p:attrNameLst>
                                           <p:attrName>ppt_w</p:attrName>
@@ -5171,7 +5171,7 @@
                                       <p:cBhvr>
                                         <p:cTn id="68" dur="1000" fill="hold"/>
                                         <p:tgtEl>
-                                          <p:spTgt spid="221"/>
+                                          <p:spTgt spid="224"/>
                                         </p:tgtEl>
                                         <p:attrNameLst>
                                           <p:attrName>ppt_h</p:attrName>
@@ -5198,7 +5198,7 @@
                                           </p:stCondLst>
                                         </p:cTn>
                                         <p:tgtEl>
-                                          <p:spTgt spid="221"/>
+                                          <p:spTgt spid="224"/>
                                         </p:tgtEl>
                                         <p:attrNameLst>
                                           <p:attrName>style.visibility</p:attrName>
@@ -5233,7 +5233,7 @@
                                       <p:cBhvr>
                                         <p:cTn id="72" dur="1000" fill="hold"/>
                                         <p:tgtEl>
-                                          <p:spTgt spid="222"/>
+                                          <p:spTgt spid="225"/>
                                         </p:tgtEl>
                                         <p:attrNameLst>
                                           <p:attrName>ppt_w</p:attrName>
@@ -5256,7 +5256,7 @@
                                       <p:cBhvr>
                                         <p:cTn id="73" dur="1000" fill="hold"/>
                                         <p:tgtEl>
-                                          <p:spTgt spid="222"/>
+                                          <p:spTgt spid="225"/>
                                         </p:tgtEl>
                                         <p:attrNameLst>
                                           <p:attrName>ppt_h</p:attrName>
@@ -5283,7 +5283,7 @@
                                           </p:stCondLst>
                                         </p:cTn>
                                         <p:tgtEl>
-                                          <p:spTgt spid="222"/>
+                                          <p:spTgt spid="225"/>
                                         </p:tgtEl>
                                         <p:attrNameLst>
                                           <p:attrName>style.visibility</p:attrName>
@@ -5318,7 +5318,7 @@
                                       <p:cBhvr>
                                         <p:cTn id="77" dur="1000" fill="hold"/>
                                         <p:tgtEl>
-                                          <p:spTgt spid="223"/>
+                                          <p:spTgt spid="226"/>
                                         </p:tgtEl>
                                         <p:attrNameLst>
                                           <p:attrName>ppt_w</p:attrName>
@@ -5341,7 +5341,7 @@
                                       <p:cBhvr>
                                         <p:cTn id="78" dur="1000" fill="hold"/>
                                         <p:tgtEl>
-                                          <p:spTgt spid="223"/>
+                                          <p:spTgt spid="226"/>
                                         </p:tgtEl>
                                         <p:attrNameLst>
                                           <p:attrName>ppt_h</p:attrName>
@@ -5368,7 +5368,7 @@
                                           </p:stCondLst>
                                         </p:cTn>
                                         <p:tgtEl>
-                                          <p:spTgt spid="223"/>
+                                          <p:spTgt spid="226"/>
                                         </p:tgtEl>
                                         <p:attrNameLst>
                                           <p:attrName>style.visibility</p:attrName>
@@ -5403,7 +5403,7 @@
                                       <p:cBhvr>
                                         <p:cTn id="82" fill="hold"/>
                                         <p:tgtEl>
-                                          <p:spTgt spid="224"/>
+                                          <p:spTgt spid="227"/>
                                         </p:tgtEl>
                                         <p:attrNameLst>
                                           <p:attrName>style.visibility</p:attrName>
@@ -5415,9 +5415,9 @@
                                     </p:set>
                                     <p:animEffect filter="dissolve" transition="in">
                                       <p:cBhvr>
-                                        <p:cTn id="83" dur="500"/>
-                                        <p:tgtEl>
-                                          <p:spTgt spid="224"/>
+                                        <p:cTn id="83" dur="799"/>
+                                        <p:tgtEl>
+                                          <p:spTgt spid="227"/>
                                         </p:tgtEl>
                                       </p:cBhvr>
                                     </p:animEffect>
@@ -5430,7 +5430,7 @@
                         <p:par>
                           <p:cTn id="84" fill="hold">
                             <p:stCondLst>
-                              <p:cond delay="8500"/>
+                              <p:cond delay="8799"/>
                             </p:stCondLst>
                             <p:childTnLst>
                               <p:par>
@@ -5446,7 +5446,7 @@
                                       <p:cBhvr>
                                         <p:cTn id="86" fill="hold"/>
                                         <p:tgtEl>
-                                          <p:spTgt spid="238"/>
+                                          <p:spTgt spid="241"/>
                                         </p:tgtEl>
                                         <p:attrNameLst>
                                           <p:attrName>style.visibility</p:attrName>
@@ -5458,9 +5458,9 @@
                                     </p:set>
                                     <p:animEffect filter="dissolve" transition="in">
                                       <p:cBhvr>
-                                        <p:cTn id="87" dur="499"/>
-                                        <p:tgtEl>
-                                          <p:spTgt spid="238"/>
+                                        <p:cTn id="87" dur="799"/>
+                                        <p:tgtEl>
+                                          <p:spTgt spid="241"/>
                                         </p:tgtEl>
                                       </p:cBhvr>
                                     </p:animEffect>
@@ -5498,7 +5498,7 @@
                                       <p:cBhvr>
                                         <p:cTn id="91" fill="hold"/>
                                         <p:tgtEl>
-                                          <p:spTgt spid="225"/>
+                                          <p:spTgt spid="228"/>
                                         </p:tgtEl>
                                         <p:attrNameLst>
                                           <p:attrName>style.visibility</p:attrName>
@@ -5512,7 +5512,7 @@
                                       <p:cBhvr>
                                         <p:cTn id="92" dur="800"/>
                                         <p:tgtEl>
-                                          <p:spTgt spid="225"/>
+                                          <p:spTgt spid="228"/>
                                         </p:tgtEl>
                                       </p:cBhvr>
                                     </p:animEffect>
@@ -5541,7 +5541,7 @@
                                       <p:cBhvr>
                                         <p:cTn id="95" fill="hold"/>
                                         <p:tgtEl>
-                                          <p:spTgt spid="237"/>
+                                          <p:spTgt spid="240"/>
                                         </p:tgtEl>
                                         <p:attrNameLst>
                                           <p:attrName>style.visibility</p:attrName>
@@ -5553,9 +5553,9 @@
                                     </p:set>
                                     <p:animEffect filter="dissolve" transition="in">
                                       <p:cBhvr>
-                                        <p:cTn id="96" dur="499"/>
-                                        <p:tgtEl>
-                                          <p:spTgt spid="237"/>
+                                        <p:cTn id="96" dur="799"/>
+                                        <p:tgtEl>
+                                          <p:spTgt spid="240"/>
                                         </p:tgtEl>
                                       </p:cBhvr>
                                     </p:animEffect>
@@ -5593,7 +5593,7 @@
                                       <p:cBhvr>
                                         <p:cTn id="100" fill="hold"/>
                                         <p:tgtEl>
-                                          <p:spTgt spid="226"/>
+                                          <p:spTgt spid="229"/>
                                         </p:tgtEl>
                                         <p:attrNameLst>
                                           <p:attrName>style.visibility</p:attrName>
@@ -5607,7 +5607,7 @@
                                       <p:cBhvr>
                                         <p:cTn id="101" dur="800"/>
                                         <p:tgtEl>
-                                          <p:spTgt spid="226"/>
+                                          <p:spTgt spid="229"/>
                                         </p:tgtEl>
                                       </p:cBhvr>
                                     </p:animEffect>
@@ -5636,7 +5636,7 @@
                                       <p:cBhvr>
                                         <p:cTn id="104" fill="hold"/>
                                         <p:tgtEl>
-                                          <p:spTgt spid="239"/>
+                                          <p:spTgt spid="242"/>
                                         </p:tgtEl>
                                         <p:attrNameLst>
                                           <p:attrName>style.visibility</p:attrName>
@@ -5648,9 +5648,9 @@
                                     </p:set>
                                     <p:animEffect filter="dissolve" transition="in">
                                       <p:cBhvr>
-                                        <p:cTn id="105" dur="499"/>
-                                        <p:tgtEl>
-                                          <p:spTgt spid="239"/>
+                                        <p:cTn id="105" dur="799"/>
+                                        <p:tgtEl>
+                                          <p:spTgt spid="242"/>
                                         </p:tgtEl>
                                       </p:cBhvr>
                                     </p:animEffect>
@@ -5688,7 +5688,7 @@
                                       <p:cBhvr>
                                         <p:cTn id="109" fill="hold"/>
                                         <p:tgtEl>
-                                          <p:spTgt spid="231"/>
+                                          <p:spTgt spid="234"/>
                                         </p:tgtEl>
                                         <p:attrNameLst>
                                           <p:attrName>style.visibility</p:attrName>
@@ -5702,7 +5702,7 @@
                                       <p:cBhvr>
                                         <p:cTn id="110" dur="800"/>
                                         <p:tgtEl>
-                                          <p:spTgt spid="231"/>
+                                          <p:spTgt spid="234"/>
                                         </p:tgtEl>
                                       </p:cBhvr>
                                     </p:animEffect>
@@ -5731,7 +5731,7 @@
                                       <p:cBhvr>
                                         <p:cTn id="113" fill="hold"/>
                                         <p:tgtEl>
-                                          <p:spTgt spid="240"/>
+                                          <p:spTgt spid="243"/>
                                         </p:tgtEl>
                                         <p:attrNameLst>
                                           <p:attrName>style.visibility</p:attrName>
@@ -5743,9 +5743,9 @@
                                     </p:set>
                                     <p:animEffect filter="dissolve" transition="in">
                                       <p:cBhvr>
-                                        <p:cTn id="114" dur="499"/>
-                                        <p:tgtEl>
-                                          <p:spTgt spid="240"/>
+                                        <p:cTn id="114" dur="799"/>
+                                        <p:tgtEl>
+                                          <p:spTgt spid="243"/>
                                         </p:tgtEl>
                                       </p:cBhvr>
                                     </p:animEffect>
@@ -5783,7 +5783,7 @@
                                       <p:cBhvr>
                                         <p:cTn id="118" dur="1000" fill="hold"/>
                                         <p:tgtEl>
-                                          <p:spTgt spid="224"/>
+                                          <p:spTgt spid="227"/>
                                         </p:tgtEl>
                                         <p:attrNameLst>
                                           <p:attrName>ppt_w</p:attrName>
@@ -5806,7 +5806,7 @@
                                       <p:cBhvr>
                                         <p:cTn id="119" dur="1000" fill="hold"/>
                                         <p:tgtEl>
-                                          <p:spTgt spid="224"/>
+                                          <p:spTgt spid="227"/>
                                         </p:tgtEl>
                                         <p:attrNameLst>
                                           <p:attrName>ppt_h</p:attrName>
@@ -5833,7 +5833,7 @@
                                           </p:stCondLst>
                                         </p:cTn>
                                         <p:tgtEl>
-                                          <p:spTgt spid="224"/>
+                                          <p:spTgt spid="227"/>
                                         </p:tgtEl>
                                         <p:attrNameLst>
                                           <p:attrName>style.visibility</p:attrName>
@@ -5868,7 +5868,7 @@
                                       <p:cBhvr>
                                         <p:cTn id="123" dur="1000" fill="hold"/>
                                         <p:tgtEl>
-                                          <p:spTgt spid="225"/>
+                                          <p:spTgt spid="228"/>
                                         </p:tgtEl>
                                         <p:attrNameLst>
                                           <p:attrName>ppt_w</p:attrName>
@@ -5891,7 +5891,7 @@
                                       <p:cBhvr>
                                         <p:cTn id="124" dur="1000" fill="hold"/>
                                         <p:tgtEl>
-                                          <p:spTgt spid="225"/>
+                                          <p:spTgt spid="228"/>
                                         </p:tgtEl>
                                         <p:attrNameLst>
                                           <p:attrName>ppt_h</p:attrName>
@@ -5918,7 +5918,7 @@
                                           </p:stCondLst>
                                         </p:cTn>
                                         <p:tgtEl>
-                                          <p:spTgt spid="225"/>
+                                          <p:spTgt spid="228"/>
                                         </p:tgtEl>
                                         <p:attrNameLst>
                                           <p:attrName>style.visibility</p:attrName>
@@ -5953,7 +5953,7 @@
                                       <p:cBhvr>
                                         <p:cTn id="128" dur="1000" fill="hold"/>
                                         <p:tgtEl>
-                                          <p:spTgt spid="226"/>
+                                          <p:spTgt spid="229"/>
                                         </p:tgtEl>
                                         <p:attrNameLst>
                                           <p:attrName>ppt_w</p:attrName>
@@ -5976,7 +5976,7 @@
                                       <p:cBhvr>
                                         <p:cTn id="129" dur="1000" fill="hold"/>
                                         <p:tgtEl>
-                                          <p:spTgt spid="226"/>
+                                          <p:spTgt spid="229"/>
                                         </p:tgtEl>
                                         <p:attrNameLst>
                                           <p:attrName>ppt_h</p:attrName>
@@ -6003,7 +6003,7 @@
                                           </p:stCondLst>
                                         </p:cTn>
                                         <p:tgtEl>
-                                          <p:spTgt spid="226"/>
+                                          <p:spTgt spid="229"/>
                                         </p:tgtEl>
                                         <p:attrNameLst>
                                           <p:attrName>style.visibility</p:attrName>
@@ -6038,7 +6038,7 @@
                                       <p:cBhvr>
                                         <p:cTn id="133" dur="1000" fill="hold"/>
                                         <p:tgtEl>
-                                          <p:spTgt spid="231"/>
+                                          <p:spTgt spid="234"/>
                                         </p:tgtEl>
                                         <p:attrNameLst>
                                           <p:attrName>ppt_w</p:attrName>
@@ -6061,7 +6061,7 @@
                                       <p:cBhvr>
                                         <p:cTn id="134" dur="1000" fill="hold"/>
                                         <p:tgtEl>
-                                          <p:spTgt spid="231"/>
+                                          <p:spTgt spid="234"/>
                                         </p:tgtEl>
                                         <p:attrNameLst>
                                           <p:attrName>ppt_h</p:attrName>
@@ -6088,7 +6088,7 @@
                                           </p:stCondLst>
                                         </p:cTn>
                                         <p:tgtEl>
-                                          <p:spTgt spid="231"/>
+                                          <p:spTgt spid="234"/>
                                         </p:tgtEl>
                                         <p:attrNameLst>
                                           <p:attrName>style.visibility</p:attrName>
@@ -6123,7 +6123,7 @@
                                       <p:cBhvr>
                                         <p:cTn id="138" dur="1000" fill="hold"/>
                                         <p:tgtEl>
-                                          <p:spTgt spid="238"/>
+                                          <p:spTgt spid="241"/>
                                         </p:tgtEl>
                                         <p:attrNameLst>
                                           <p:attrName>ppt_w</p:attrName>
@@ -6146,7 +6146,7 @@
                                       <p:cBhvr>
                                         <p:cTn id="139" dur="1000" fill="hold"/>
                                         <p:tgtEl>
-                                          <p:spTgt spid="238"/>
+                                          <p:spTgt spid="241"/>
                                         </p:tgtEl>
                                         <p:attrNameLst>
                                           <p:attrName>ppt_h</p:attrName>
@@ -6173,7 +6173,7 @@
                                           </p:stCondLst>
                                         </p:cTn>
                                         <p:tgtEl>
-                                          <p:spTgt spid="238"/>
+                                          <p:spTgt spid="241"/>
                                         </p:tgtEl>
                                         <p:attrNameLst>
                                           <p:attrName>style.visibility</p:attrName>
@@ -6208,7 +6208,7 @@
                                       <p:cBhvr>
                                         <p:cTn id="143" dur="1000" fill="hold"/>
                                         <p:tgtEl>
-                                          <p:spTgt spid="237"/>
+                                          <p:spTgt spid="240"/>
                                         </p:tgtEl>
                                         <p:attrNameLst>
                                           <p:attrName>ppt_w</p:attrName>
@@ -6231,7 +6231,7 @@
                                       <p:cBhvr>
                                         <p:cTn id="144" dur="1000" fill="hold"/>
                                         <p:tgtEl>
-                                          <p:spTgt spid="237"/>
+                                          <p:spTgt spid="240"/>
                                         </p:tgtEl>
                                         <p:attrNameLst>
                                           <p:attrName>ppt_h</p:attrName>
@@ -6258,7 +6258,7 @@
                                           </p:stCondLst>
                                         </p:cTn>
                                         <p:tgtEl>
-                                          <p:spTgt spid="237"/>
+                                          <p:spTgt spid="240"/>
                                         </p:tgtEl>
                                         <p:attrNameLst>
                                           <p:attrName>style.visibility</p:attrName>
@@ -6293,7 +6293,7 @@
                                       <p:cBhvr>
                                         <p:cTn id="148" dur="1000" fill="hold"/>
                                         <p:tgtEl>
-                                          <p:spTgt spid="239"/>
+                                          <p:spTgt spid="242"/>
                                         </p:tgtEl>
                                         <p:attrNameLst>
                                           <p:attrName>ppt_w</p:attrName>
@@ -6316,7 +6316,7 @@
                                       <p:cBhvr>
                                         <p:cTn id="149" dur="1000" fill="hold"/>
                                         <p:tgtEl>
-                                          <p:spTgt spid="239"/>
+                                          <p:spTgt spid="242"/>
                                         </p:tgtEl>
                                         <p:attrNameLst>
                                           <p:attrName>ppt_h</p:attrName>
@@ -6343,7 +6343,7 @@
                                           </p:stCondLst>
                                         </p:cTn>
                                         <p:tgtEl>
-                                          <p:spTgt spid="239"/>
+                                          <p:spTgt spid="242"/>
                                         </p:tgtEl>
                                         <p:attrNameLst>
                                           <p:attrName>style.visibility</p:attrName>
@@ -6378,7 +6378,7 @@
                                       <p:cBhvr>
                                         <p:cTn id="153" dur="1000" fill="hold"/>
                                         <p:tgtEl>
-                                          <p:spTgt spid="240"/>
+                                          <p:spTgt spid="243"/>
                                         </p:tgtEl>
                                         <p:attrNameLst>
                                           <p:attrName>ppt_w</p:attrName>
@@ -6401,7 +6401,7 @@
                                       <p:cBhvr>
                                         <p:cTn id="154" dur="1000" fill="hold"/>
                                         <p:tgtEl>
-                                          <p:spTgt spid="240"/>
+                                          <p:spTgt spid="243"/>
                                         </p:tgtEl>
                                         <p:attrNameLst>
                                           <p:attrName>ppt_h</p:attrName>
@@ -6428,7 +6428,7 @@
                                           </p:stCondLst>
                                         </p:cTn>
                                         <p:tgtEl>
-                                          <p:spTgt spid="240"/>
+                                          <p:spTgt spid="243"/>
                                         </p:tgtEl>
                                         <p:attrNameLst>
                                           <p:attrName>style.visibility</p:attrName>
@@ -6463,7 +6463,7 @@
                                       <p:cBhvr>
                                         <p:cTn id="158" fill="hold"/>
                                         <p:tgtEl>
-                                          <p:spTgt spid="227"/>
+                                          <p:spTgt spid="230"/>
                                         </p:tgtEl>
                                         <p:attrNameLst>
                                           <p:attrName>style.visibility</p:attrName>
@@ -6475,9 +6475,9 @@
                                     </p:set>
                                     <p:animEffect filter="dissolve" transition="in">
                                       <p:cBhvr>
-                                        <p:cTn id="159" dur="500"/>
-                                        <p:tgtEl>
-                                          <p:spTgt spid="227"/>
+                                        <p:cTn id="159" dur="799"/>
+                                        <p:tgtEl>
+                                          <p:spTgt spid="230"/>
                                         </p:tgtEl>
                                       </p:cBhvr>
                                     </p:animEffect>
@@ -6490,7 +6490,7 @@
                         <p:par>
                           <p:cTn id="160" fill="hold">
                             <p:stCondLst>
-                              <p:cond delay="8500"/>
+                              <p:cond delay="8799"/>
                             </p:stCondLst>
                             <p:childTnLst>
                               <p:par>
@@ -6506,7 +6506,7 @@
                                       <p:cBhvr>
                                         <p:cTn id="162" fill="hold"/>
                                         <p:tgtEl>
-                                          <p:spTgt spid="244"/>
+                                          <p:spTgt spid="247"/>
                                         </p:tgtEl>
                                         <p:attrNameLst>
                                           <p:attrName>style.visibility</p:attrName>
@@ -6518,9 +6518,9 @@
                                     </p:set>
                                     <p:animEffect filter="dissolve" transition="in">
                                       <p:cBhvr>
-                                        <p:cTn id="163" dur="499"/>
-                                        <p:tgtEl>
-                                          <p:spTgt spid="244"/>
+                                        <p:cTn id="163" dur="799"/>
+                                        <p:tgtEl>
+                                          <p:spTgt spid="247"/>
                                         </p:tgtEl>
                                       </p:cBhvr>
                                     </p:animEffect>
@@ -6558,7 +6558,7 @@
                                       <p:cBhvr>
                                         <p:cTn id="167" fill="hold"/>
                                         <p:tgtEl>
-                                          <p:spTgt spid="228"/>
+                                          <p:spTgt spid="231"/>
                                         </p:tgtEl>
                                         <p:attrNameLst>
                                           <p:attrName>style.visibility</p:attrName>
@@ -6572,7 +6572,7 @@
                                       <p:cBhvr>
                                         <p:cTn id="168" dur="800"/>
                                         <p:tgtEl>
-                                          <p:spTgt spid="228"/>
+                                          <p:spTgt spid="231"/>
                                         </p:tgtEl>
                                       </p:cBhvr>
                                     </p:animEffect>
@@ -6601,7 +6601,7 @@
                                       <p:cBhvr>
                                         <p:cTn id="171" fill="hold"/>
                                         <p:tgtEl>
-                                          <p:spTgt spid="243"/>
+                                          <p:spTgt spid="246"/>
                                         </p:tgtEl>
                                         <p:attrNameLst>
                                           <p:attrName>style.visibility</p:attrName>
@@ -6613,9 +6613,9 @@
                                     </p:set>
                                     <p:animEffect filter="dissolve" transition="in">
                                       <p:cBhvr>
-                                        <p:cTn id="172" dur="499"/>
-                                        <p:tgtEl>
-                                          <p:spTgt spid="243"/>
+                                        <p:cTn id="172" dur="799"/>
+                                        <p:tgtEl>
+                                          <p:spTgt spid="246"/>
                                         </p:tgtEl>
                                       </p:cBhvr>
                                     </p:animEffect>
@@ -6653,7 +6653,7 @@
                                       <p:cBhvr>
                                         <p:cTn id="176" fill="hold"/>
                                         <p:tgtEl>
-                                          <p:spTgt spid="229"/>
+                                          <p:spTgt spid="232"/>
                                         </p:tgtEl>
                                         <p:attrNameLst>
                                           <p:attrName>style.visibility</p:attrName>
@@ -6667,7 +6667,7 @@
                                       <p:cBhvr>
                                         <p:cTn id="177" dur="800"/>
                                         <p:tgtEl>
-                                          <p:spTgt spid="229"/>
+                                          <p:spTgt spid="232"/>
                                         </p:tgtEl>
                                       </p:cBhvr>
                                     </p:animEffect>
@@ -6696,7 +6696,7 @@
                                       <p:cBhvr>
                                         <p:cTn id="180" fill="hold"/>
                                         <p:tgtEl>
-                                          <p:spTgt spid="245"/>
+                                          <p:spTgt spid="248"/>
                                         </p:tgtEl>
                                         <p:attrNameLst>
                                           <p:attrName>style.visibility</p:attrName>
@@ -6708,9 +6708,9 @@
                                     </p:set>
                                     <p:animEffect filter="dissolve" transition="in">
                                       <p:cBhvr>
-                                        <p:cTn id="181" dur="499"/>
-                                        <p:tgtEl>
-                                          <p:spTgt spid="245"/>
+                                        <p:cTn id="181" dur="800"/>
+                                        <p:tgtEl>
+                                          <p:spTgt spid="248"/>
                                         </p:tgtEl>
                                       </p:cBhvr>
                                     </p:animEffect>
@@ -6748,7 +6748,7 @@
                                       <p:cBhvr>
                                         <p:cTn id="185" fill="hold"/>
                                         <p:tgtEl>
-                                          <p:spTgt spid="230"/>
+                                          <p:spTgt spid="233"/>
                                         </p:tgtEl>
                                         <p:attrNameLst>
                                           <p:attrName>style.visibility</p:attrName>
@@ -6762,7 +6762,7 @@
                                       <p:cBhvr>
                                         <p:cTn id="186" dur="800"/>
                                         <p:tgtEl>
-                                          <p:spTgt spid="230"/>
+                                          <p:spTgt spid="233"/>
                                         </p:tgtEl>
                                       </p:cBhvr>
                                     </p:animEffect>
@@ -6791,7 +6791,7 @@
                                       <p:cBhvr>
                                         <p:cTn id="189" fill="hold"/>
                                         <p:tgtEl>
-                                          <p:spTgt spid="241"/>
+                                          <p:spTgt spid="244"/>
                                         </p:tgtEl>
                                         <p:attrNameLst>
                                           <p:attrName>style.visibility</p:attrName>
@@ -6803,9 +6803,9 @@
                                     </p:set>
                                     <p:animEffect filter="dissolve" transition="in">
                                       <p:cBhvr>
-                                        <p:cTn id="190" dur="499"/>
-                                        <p:tgtEl>
-                                          <p:spTgt spid="241"/>
+                                        <p:cTn id="190" dur="799"/>
+                                        <p:tgtEl>
+                                          <p:spTgt spid="244"/>
                                         </p:tgtEl>
                                       </p:cBhvr>
                                     </p:animEffect>
@@ -6843,7 +6843,7 @@
                                       <p:cBhvr>
                                         <p:cTn id="194" fill="hold"/>
                                         <p:tgtEl>
-                                          <p:spTgt spid="236"/>
+                                          <p:spTgt spid="239"/>
                                         </p:tgtEl>
                                         <p:attrNameLst>
                                           <p:attrName>style.visibility</p:attrName>
@@ -6857,7 +6857,7 @@
                                       <p:cBhvr>
                                         <p:cTn id="195" dur="800"/>
                                         <p:tgtEl>
-                                          <p:spTgt spid="236"/>
+                                          <p:spTgt spid="239"/>
                                         </p:tgtEl>
                                       </p:cBhvr>
                                     </p:animEffect>
@@ -6886,7 +6886,7 @@
                                       <p:cBhvr>
                                         <p:cTn id="198" fill="hold"/>
                                         <p:tgtEl>
-                                          <p:spTgt spid="242"/>
+                                          <p:spTgt spid="245"/>
                                         </p:tgtEl>
                                         <p:attrNameLst>
                                           <p:attrName>style.visibility</p:attrName>
@@ -6898,9 +6898,9 @@
                                     </p:set>
                                     <p:animEffect filter="dissolve" transition="in">
                                       <p:cBhvr>
-                                        <p:cTn id="199" dur="499"/>
-                                        <p:tgtEl>
-                                          <p:spTgt spid="242"/>
+                                        <p:cTn id="199" dur="799"/>
+                                        <p:tgtEl>
+                                          <p:spTgt spid="245"/>
                                         </p:tgtEl>
                                       </p:cBhvr>
                                     </p:animEffect>
@@ -6935,48 +6935,48 @@
       </p:par>
     </p:tnLst>
     <p:bldLst>
-      <p:bldP build="whole" bldLvl="1" animBg="1" rev="0" advAuto="0" spid="236" grpId="41"/>
-      <p:bldP build="whole" bldLvl="1" animBg="1" rev="0" advAuto="0" spid="234" grpId="4"/>
-      <p:bldP build="whole" bldLvl="1" animBg="1" rev="0" advAuto="0" spid="245" grpId="38"/>
-      <p:bldP build="whole" bldLvl="1" animBg="1" rev="0" advAuto="0" spid="227" grpId="33"/>
-      <p:bldP build="whole" bldLvl="1" animBg="1" rev="0" advAuto="0" spid="220" grpId="1"/>
-      <p:bldP build="whole" bldLvl="1" animBg="1" rev="0" advAuto="0" spid="234" grpId="12"/>
-      <p:bldP build="whole" bldLvl="1" animBg="1" rev="0" advAuto="0" spid="232" grpId="2"/>
-      <p:bldP build="whole" bldLvl="1" animBg="1" rev="0" advAuto="0" spid="220" grpId="9"/>
-      <p:bldP build="whole" bldLvl="1" animBg="1" rev="0" advAuto="0" spid="221" grpId="3"/>
-      <p:bldP build="whole" bldLvl="1" animBg="1" rev="0" advAuto="0" spid="222" grpId="5"/>
-      <p:bldP build="whole" bldLvl="1" animBg="1" rev="0" advAuto="0" spid="230" grpId="39"/>
-      <p:bldP build="whole" bldLvl="1" animBg="1" rev="0" advAuto="0" spid="242" grpId="42"/>
-      <p:bldP build="whole" bldLvl="1" animBg="1" rev="0" advAuto="0" spid="225" grpId="19"/>
-      <p:bldP build="whole" bldLvl="1" animBg="1" rev="0" advAuto="0" spid="235" grpId="6"/>
-      <p:bldP build="whole" bldLvl="1" animBg="1" rev="0" advAuto="0" spid="226" grpId="21"/>
-      <p:bldP build="whole" bldLvl="1" animBg="1" rev="0" advAuto="0" spid="221" grpId="14"/>
-      <p:bldP build="whole" bldLvl="1" animBg="1" rev="0" advAuto="0" spid="224" grpId="17"/>
-      <p:bldP build="whole" bldLvl="1" animBg="1" rev="0" advAuto="0" spid="222" grpId="15"/>
-      <p:bldP build="whole" bldLvl="1" animBg="1" rev="0" advAuto="0" spid="235" grpId="10"/>
-      <p:bldP build="whole" bldLvl="1" animBg="1" rev="0" advAuto="0" spid="225" grpId="26"/>
-      <p:bldP build="whole" bldLvl="1" animBg="1" rev="0" advAuto="0" spid="226" grpId="27"/>
-      <p:bldP build="whole" bldLvl="1" animBg="1" rev="0" advAuto="0" spid="232" grpId="13"/>
-      <p:bldP build="whole" bldLvl="1" animBg="1" rev="0" advAuto="0" spid="224" grpId="25"/>
-      <p:bldP build="whole" bldLvl="1" animBg="1" rev="0" advAuto="0" spid="243" grpId="36"/>
-      <p:bldP build="whole" bldLvl="1" animBg="1" rev="0" advAuto="0" spid="241" grpId="40"/>
-      <p:bldP build="whole" bldLvl="1" animBg="1" rev="0" advAuto="0" spid="244" grpId="34"/>
-      <p:bldP build="whole" bldLvl="1" animBg="1" rev="0" advAuto="0" spid="238" grpId="18"/>
-      <p:bldP build="whole" bldLvl="1" animBg="1" rev="0" advAuto="0" spid="240" grpId="24"/>
-      <p:bldP build="whole" bldLvl="1" animBg="1" rev="0" advAuto="0" spid="237" grpId="20"/>
-      <p:bldP build="whole" bldLvl="1" animBg="1" rev="0" advAuto="0" spid="239" grpId="22"/>
-      <p:bldP build="whole" bldLvl="1" animBg="1" rev="0" advAuto="0" spid="231" grpId="23"/>
-      <p:bldP build="whole" bldLvl="1" animBg="1" rev="0" advAuto="0" spid="240" grpId="32"/>
-      <p:bldP build="whole" bldLvl="1" animBg="1" rev="0" advAuto="0" spid="238" grpId="29"/>
-      <p:bldP build="whole" bldLvl="1" animBg="1" rev="0" advAuto="0" spid="223" grpId="7"/>
-      <p:bldP build="whole" bldLvl="1" animBg="1" rev="0" advAuto="0" spid="231" grpId="28"/>
-      <p:bldP build="whole" bldLvl="1" animBg="1" rev="0" advAuto="0" spid="229" grpId="37"/>
-      <p:bldP build="whole" bldLvl="1" animBg="1" rev="0" advAuto="0" spid="228" grpId="35"/>
-      <p:bldP build="whole" bldLvl="1" animBg="1" rev="0" advAuto="0" spid="237" grpId="30"/>
-      <p:bldP build="whole" bldLvl="1" animBg="1" rev="0" advAuto="0" spid="239" grpId="31"/>
-      <p:bldP build="whole" bldLvl="1" animBg="1" rev="0" advAuto="0" spid="233" grpId="8"/>
-      <p:bldP build="whole" bldLvl="1" animBg="1" rev="0" advAuto="0" spid="223" grpId="16"/>
-      <p:bldP build="whole" bldLvl="1" animBg="1" rev="0" advAuto="0" spid="233" grpId="11"/>
+      <p:bldP build="whole" bldLvl="1" animBg="1" rev="0" advAuto="0" spid="229" grpId="21"/>
+      <p:bldP build="whole" bldLvl="1" animBg="1" rev="0" advAuto="0" spid="242" grpId="22"/>
+      <p:bldP build="whole" bldLvl="1" animBg="1" rev="0" advAuto="0" spid="235" grpId="13"/>
+      <p:bldP build="whole" bldLvl="1" animBg="1" rev="0" advAuto="0" spid="227" grpId="17"/>
+      <p:bldP build="whole" bldLvl="1" animBg="1" rev="0" advAuto="0" spid="230" grpId="33"/>
+      <p:bldP build="whole" bldLvl="1" animBg="1" rev="0" advAuto="0" spid="229" grpId="27"/>
+      <p:bldP build="whole" bldLvl="1" animBg="1" rev="0" advAuto="0" spid="232" grpId="37"/>
+      <p:bldP build="whole" bldLvl="1" animBg="1" rev="0" advAuto="0" spid="225" grpId="5"/>
+      <p:bldP build="whole" bldLvl="1" animBg="1" rev="0" advAuto="0" spid="239" grpId="41"/>
+      <p:bldP build="whole" bldLvl="1" animBg="1" rev="0" advAuto="0" spid="241" grpId="18"/>
+      <p:bldP build="whole" bldLvl="1" animBg="1" rev="0" advAuto="0" spid="236" grpId="8"/>
+      <p:bldP build="whole" bldLvl="1" animBg="1" rev="0" advAuto="0" spid="242" grpId="31"/>
+      <p:bldP build="whole" bldLvl="1" animBg="1" rev="0" advAuto="0" spid="227" grpId="25"/>
+      <p:bldP build="whole" bldLvl="1" animBg="1" rev="0" advAuto="0" spid="236" grpId="11"/>
+      <p:bldP build="whole" bldLvl="1" animBg="1" rev="0" advAuto="0" spid="225" grpId="15"/>
+      <p:bldP build="whole" bldLvl="1" animBg="1" rev="0" advAuto="0" spid="234" grpId="23"/>
+      <p:bldP build="whole" bldLvl="1" animBg="1" rev="0" advAuto="0" spid="223" grpId="1"/>
+      <p:bldP build="whole" bldLvl="1" animBg="1" rev="0" advAuto="0" spid="240" grpId="20"/>
+      <p:bldP build="whole" bldLvl="1" animBg="1" rev="0" advAuto="0" spid="241" grpId="29"/>
+      <p:bldP build="whole" bldLvl="1" animBg="1" rev="0" advAuto="0" spid="231" grpId="35"/>
+      <p:bldP build="whole" bldLvl="1" animBg="1" rev="0" advAuto="0" spid="234" grpId="28"/>
+      <p:bldP build="whole" bldLvl="1" animBg="1" rev="0" advAuto="0" spid="243" grpId="24"/>
+      <p:bldP build="whole" bldLvl="1" animBg="1" rev="0" advAuto="0" spid="224" grpId="3"/>
+      <p:bldP build="whole" bldLvl="1" animBg="1" rev="0" advAuto="0" spid="238" grpId="6"/>
+      <p:bldP build="whole" bldLvl="1" animBg="1" rev="0" advAuto="0" spid="223" grpId="9"/>
+      <p:bldP build="whole" bldLvl="1" animBg="1" rev="0" advAuto="0" spid="238" grpId="10"/>
+      <p:bldP build="whole" bldLvl="1" animBg="1" rev="0" advAuto="0" spid="237" grpId="4"/>
+      <p:bldP build="whole" bldLvl="1" animBg="1" rev="0" advAuto="0" spid="240" grpId="30"/>
+      <p:bldP build="whole" bldLvl="1" animBg="1" rev="0" advAuto="0" spid="243" grpId="32"/>
+      <p:bldP build="whole" bldLvl="1" animBg="1" rev="0" advAuto="0" spid="237" grpId="12"/>
+      <p:bldP build="whole" bldLvl="1" animBg="1" rev="0" advAuto="0" spid="248" grpId="38"/>
+      <p:bldP build="whole" bldLvl="1" animBg="1" rev="0" advAuto="0" spid="245" grpId="42"/>
+      <p:bldP build="whole" bldLvl="1" animBg="1" rev="0" advAuto="0" spid="224" grpId="14"/>
+      <p:bldP build="whole" bldLvl="1" animBg="1" rev="0" advAuto="0" spid="226" grpId="7"/>
+      <p:bldP build="whole" bldLvl="1" animBg="1" rev="0" advAuto="0" spid="228" grpId="19"/>
+      <p:bldP build="whole" bldLvl="1" animBg="1" rev="0" advAuto="0" spid="233" grpId="39"/>
+      <p:bldP build="whole" bldLvl="1" animBg="1" rev="0" advAuto="0" spid="226" grpId="16"/>
+      <p:bldP build="whole" bldLvl="1" animBg="1" rev="0" advAuto="0" spid="228" grpId="26"/>
+      <p:bldP build="whole" bldLvl="1" animBg="1" rev="0" advAuto="0" spid="247" grpId="34"/>
+      <p:bldP build="whole" bldLvl="1" animBg="1" rev="0" advAuto="0" spid="235" grpId="2"/>
+      <p:bldP build="whole" bldLvl="1" animBg="1" rev="0" advAuto="0" spid="246" grpId="36"/>
+      <p:bldP build="whole" bldLvl="1" animBg="1" rev="0" advAuto="0" spid="244" grpId="40"/>
     </p:bldLst>
   </p:timing>
 </p:sld>
@@ -7001,7 +7001,7 @@
       </p:grpSpPr>
       <p:sp>
         <p:nvSpPr>
-          <p:cNvPr id="247" name="Conclusion"/>
+          <p:cNvPr id="250" name="Conclusion"/>
           <p:cNvSpPr txBox="1"/>
           <p:nvPr/>
         </p:nvSpPr>
@@ -7046,7 +7046,7 @@
       </p:sp>
       <p:sp>
         <p:nvSpPr>
-          <p:cNvPr id="248" name="- Amélioration de notre capacité au travail de groupe"/>
+          <p:cNvPr id="251" name="- Amélioration de notre capacité au travail de groupe"/>
           <p:cNvSpPr txBox="1"/>
           <p:nvPr/>
         </p:nvSpPr>
@@ -7089,7 +7089,7 @@
       </p:sp>
       <p:sp>
         <p:nvSpPr>
-          <p:cNvPr id="249" name="- Réalisation d’un jeu d’échecs"/>
+          <p:cNvPr id="252" name="- Réalisation d’un jeu d’échecs"/>
           <p:cNvSpPr txBox="1"/>
           <p:nvPr/>
         </p:nvSpPr>
@@ -7132,7 +7132,7 @@
       </p:sp>
       <p:sp>
         <p:nvSpPr>
-          <p:cNvPr id="250" name="- Mise en pratique des connaissances comme l’UML"/>
+          <p:cNvPr id="253" name="- Mise en pratique des connaissances comme l’UML"/>
           <p:cNvSpPr txBox="1"/>
           <p:nvPr/>
         </p:nvSpPr>
@@ -7175,7 +7175,7 @@
       </p:sp>
       <p:sp>
         <p:nvSpPr>
-          <p:cNvPr id="251" name="- Amélioration de l’esthétique du jeu"/>
+          <p:cNvPr id="254" name="- Amélioration de l’esthétique du jeu"/>
           <p:cNvSpPr txBox="1"/>
           <p:nvPr/>
         </p:nvSpPr>
@@ -7218,7 +7218,7 @@
       </p:sp>
       <p:sp>
         <p:nvSpPr>
-          <p:cNvPr id="252" name="Numéro de diapositive"/>
+          <p:cNvPr id="255" name="Numéro de diapositive"/>
           <p:cNvSpPr txBox="1"/>
           <p:nvPr>
             <p:ph type="sldNum" sz="quarter" idx="2"/>
@@ -7256,7 +7256,7 @@
       </p:sp>
       <p:pic>
         <p:nvPicPr>
-          <p:cNvPr id="253" name="chess-board.png" descr="chess-board.png"/>
+          <p:cNvPr id="256" name="chess-board.png" descr="chess-board.png"/>
           <p:cNvPicPr>
             <a:picLocks noChangeAspect="1"/>
           </p:cNvPicPr>
@@ -7285,7 +7285,7 @@
       </p:pic>
       <p:pic>
         <p:nvPicPr>
-          <p:cNvPr id="254" name="teamwork.png" descr="teamwork.png"/>
+          <p:cNvPr id="257" name="teamwork.png" descr="teamwork.png"/>
           <p:cNvPicPr>
             <a:picLocks noChangeAspect="1"/>
           </p:cNvPicPr>
@@ -7314,7 +7314,7 @@
       </p:pic>
       <p:pic>
         <p:nvPicPr>
-          <p:cNvPr id="255" name="monitor.png" descr="monitor.png"/>
+          <p:cNvPr id="258" name="monitor.png" descr="monitor.png"/>
           <p:cNvPicPr>
             <a:picLocks noChangeAspect="1"/>
           </p:cNvPicPr>
@@ -7343,7 +7343,7 @@
       </p:pic>
       <p:pic>
         <p:nvPicPr>
-          <p:cNvPr id="256" name="diagram.png" descr="diagram.png"/>
+          <p:cNvPr id="259" name="diagram.png" descr="diagram.png"/>
           <p:cNvPicPr>
             <a:picLocks noChangeAspect="1"/>
           </p:cNvPicPr>
@@ -7359,8 +7359,8 @@
         </p:blipFill>
         <p:spPr>
           <a:xfrm>
-            <a:off x="7237006" y="7339341"/>
-            <a:ext cx="1276045" cy="1276044"/>
+            <a:off x="7237007" y="7339341"/>
+            <a:ext cx="1276044" cy="1276044"/>
           </a:xfrm>
           <a:prstGeom prst="rect">
             <a:avLst/>
@@ -7423,7 +7423,7 @@
                                       <p:cBhvr>
                                         <p:cTn id="6" fill="hold"/>
                                         <p:tgtEl>
-                                          <p:spTgt spid="249"/>
+                                          <p:spTgt spid="252"/>
                                         </p:tgtEl>
                                         <p:attrNameLst>
                                           <p:attrName>style.visibility</p:attrName>
@@ -7437,7 +7437,7 @@
                                       <p:cBhvr>
                                         <p:cTn id="7" dur="800"/>
                                         <p:tgtEl>
-                                          <p:spTgt spid="249"/>
+                                          <p:spTgt spid="252"/>
                                         </p:tgtEl>
                                       </p:cBhvr>
                                     </p:animEffect>
@@ -7466,7 +7466,7 @@
                                       <p:cBhvr>
                                         <p:cTn id="10" fill="hold"/>
                                         <p:tgtEl>
-                                          <p:spTgt spid="253"/>
+                                          <p:spTgt spid="256"/>
                                         </p:tgtEl>
                                         <p:attrNameLst>
                                           <p:attrName>style.visibility</p:attrName>
@@ -7480,7 +7480,7 @@
                                       <p:cBhvr>
                                         <p:cTn id="11" dur="1000"/>
                                         <p:tgtEl>
-                                          <p:spTgt spid="253"/>
+                                          <p:spTgt spid="256"/>
                                         </p:tgtEl>
                                       </p:cBhvr>
                                     </p:animEffect>
@@ -7518,7 +7518,7 @@
                                       <p:cBhvr>
                                         <p:cTn id="15" fill="hold"/>
                                         <p:tgtEl>
-                                          <p:spTgt spid="248"/>
+                                          <p:spTgt spid="251"/>
                                         </p:tgtEl>
                                         <p:attrNameLst>
                                           <p:attrName>style.visibility</p:attrName>
@@ -7532,7 +7532,7 @@
                                       <p:cBhvr>
                                         <p:cTn id="16" dur="800"/>
                                         <p:tgtEl>
-                                          <p:spTgt spid="248"/>
+                                          <p:spTgt spid="251"/>
                                         </p:tgtEl>
                                       </p:cBhvr>
                                     </p:animEffect>
@@ -7561,7 +7561,7 @@
                                       <p:cBhvr>
                                         <p:cTn id="19" fill="hold"/>
                                         <p:tgtEl>
-                                          <p:spTgt spid="254"/>
+                                          <p:spTgt spid="257"/>
                                         </p:tgtEl>
                                         <p:attrNameLst>
                                           <p:attrName>style.visibility</p:attrName>
@@ -7575,7 +7575,7 @@
                                       <p:cBhvr>
                                         <p:cTn id="20" dur="1000"/>
                                         <p:tgtEl>
-                                          <p:spTgt spid="254"/>
+                                          <p:spTgt spid="257"/>
                                         </p:tgtEl>
                                       </p:cBhvr>
                                     </p:animEffect>
@@ -7613,7 +7613,7 @@
                                       <p:cBhvr>
                                         <p:cTn id="24" fill="hold"/>
                                         <p:tgtEl>
-                                          <p:spTgt spid="250"/>
+                                          <p:spTgt spid="253"/>
                                         </p:tgtEl>
                                         <p:attrNameLst>
                                           <p:attrName>style.visibility</p:attrName>
@@ -7627,7 +7627,7 @@
                                       <p:cBhvr>
                                         <p:cTn id="25" dur="800"/>
                                         <p:tgtEl>
-                                          <p:spTgt spid="250"/>
+                                          <p:spTgt spid="253"/>
                                         </p:tgtEl>
                                       </p:cBhvr>
                                     </p:animEffect>
@@ -7656,7 +7656,7 @@
                                       <p:cBhvr>
                                         <p:cTn id="28" fill="hold"/>
                                         <p:tgtEl>
-                                          <p:spTgt spid="256"/>
+                                          <p:spTgt spid="259"/>
                                         </p:tgtEl>
                                         <p:attrNameLst>
                                           <p:attrName>style.visibility</p:attrName>
@@ -7670,7 +7670,7 @@
                                       <p:cBhvr>
                                         <p:cTn id="29" dur="1000"/>
                                         <p:tgtEl>
-                                          <p:spTgt spid="256"/>
+                                          <p:spTgt spid="259"/>
                                         </p:tgtEl>
                                       </p:cBhvr>
                                     </p:animEffect>
@@ -7708,7 +7708,7 @@
                                       <p:cBhvr>
                                         <p:cTn id="33" fill="hold"/>
                                         <p:tgtEl>
-                                          <p:spTgt spid="251"/>
+                                          <p:spTgt spid="254"/>
                                         </p:tgtEl>
                                         <p:attrNameLst>
                                           <p:attrName>style.visibility</p:attrName>
@@ -7722,7 +7722,7 @@
                                       <p:cBhvr>
                                         <p:cTn id="34" dur="800"/>
                                         <p:tgtEl>
-                                          <p:spTgt spid="251"/>
+                                          <p:spTgt spid="254"/>
                                         </p:tgtEl>
                                       </p:cBhvr>
                                     </p:animEffect>
@@ -7751,7 +7751,7 @@
                                       <p:cBhvr>
                                         <p:cTn id="37" fill="hold"/>
                                         <p:tgtEl>
-                                          <p:spTgt spid="255"/>
+                                          <p:spTgt spid="258"/>
                                         </p:tgtEl>
                                         <p:attrNameLst>
                                           <p:attrName>style.visibility</p:attrName>
@@ -7765,7 +7765,7 @@
                                       <p:cBhvr>
                                         <p:cTn id="38" dur="1000"/>
                                         <p:tgtEl>
-                                          <p:spTgt spid="255"/>
+                                          <p:spTgt spid="258"/>
                                         </p:tgtEl>
                                       </p:cBhvr>
                                     </p:animEffect>
@@ -7800,14 +7800,14 @@
       </p:par>
     </p:tnLst>
     <p:bldLst>
-      <p:bldP build="whole" bldLvl="1" animBg="1" rev="0" advAuto="0" spid="255" grpId="8"/>
-      <p:bldP build="whole" bldLvl="1" animBg="1" rev="0" advAuto="0" spid="250" grpId="5"/>
-      <p:bldP build="whole" bldLvl="1" animBg="1" rev="0" advAuto="0" spid="248" grpId="3"/>
-      <p:bldP build="whole" bldLvl="1" animBg="1" rev="0" advAuto="0" spid="256" grpId="6"/>
-      <p:bldP build="whole" bldLvl="1" animBg="1" rev="0" advAuto="0" spid="249" grpId="1"/>
-      <p:bldP build="whole" bldLvl="1" animBg="1" rev="0" advAuto="0" spid="251" grpId="7"/>
-      <p:bldP build="whole" bldLvl="1" animBg="1" rev="0" advAuto="0" spid="253" grpId="2"/>
-      <p:bldP build="whole" bldLvl="1" animBg="1" rev="0" advAuto="0" spid="254" grpId="4"/>
+      <p:bldP build="whole" bldLvl="1" animBg="1" rev="0" advAuto="0" spid="258" grpId="8"/>
+      <p:bldP build="whole" bldLvl="1" animBg="1" rev="0" advAuto="0" spid="256" grpId="2"/>
+      <p:bldP build="whole" bldLvl="1" animBg="1" rev="0" advAuto="0" spid="259" grpId="6"/>
+      <p:bldP build="whole" bldLvl="1" animBg="1" rev="0" advAuto="0" spid="257" grpId="4"/>
+      <p:bldP build="whole" bldLvl="1" animBg="1" rev="0" advAuto="0" spid="252" grpId="1"/>
+      <p:bldP build="whole" bldLvl="1" animBg="1" rev="0" advAuto="0" spid="251" grpId="3"/>
+      <p:bldP build="whole" bldLvl="1" animBg="1" rev="0" advAuto="0" spid="254" grpId="7"/>
+      <p:bldP build="whole" bldLvl="1" animBg="1" rev="0" advAuto="0" spid="253" grpId="5"/>
     </p:bldLst>
   </p:timing>
 </p:sld>
@@ -7931,7 +7931,7 @@
         </p:blipFill>
         <p:spPr>
           <a:xfrm>
-            <a:off x="1097493" y="5985252"/>
+            <a:off x="1088641" y="5985252"/>
             <a:ext cx="1120063" cy="1120063"/>
           </a:xfrm>
           <a:prstGeom prst="rect">
@@ -7960,7 +7960,7 @@
         </p:blipFill>
         <p:spPr>
           <a:xfrm>
-            <a:off x="7403831" y="4316769"/>
+            <a:off x="6755963" y="4356768"/>
             <a:ext cx="1120063" cy="1120063"/>
           </a:xfrm>
           <a:prstGeom prst="rect">
@@ -7989,7 +7989,7 @@
         </p:blipFill>
         <p:spPr>
           <a:xfrm>
-            <a:off x="1088641" y="2729269"/>
+            <a:off x="1057439" y="2728285"/>
             <a:ext cx="1120063" cy="1120063"/>
           </a:xfrm>
           <a:prstGeom prst="rect">
@@ -8018,7 +8018,7 @@
         </p:blipFill>
         <p:spPr>
           <a:xfrm>
-            <a:off x="7441273" y="5933540"/>
+            <a:off x="6755963" y="5985252"/>
             <a:ext cx="1120063" cy="1120063"/>
           </a:xfrm>
           <a:prstGeom prst="rect">
@@ -8047,7 +8047,7 @@
         </p:blipFill>
         <p:spPr>
           <a:xfrm>
-            <a:off x="1092350" y="4357260"/>
+            <a:off x="1088641" y="4356768"/>
             <a:ext cx="1120063" cy="1120063"/>
           </a:xfrm>
           <a:prstGeom prst="rect">
@@ -8076,7 +8076,7 @@
         </p:blipFill>
         <p:spPr>
           <a:xfrm>
-            <a:off x="7428793" y="2699997"/>
+            <a:off x="6768444" y="2728777"/>
             <a:ext cx="1120063" cy="1120063"/>
           </a:xfrm>
           <a:prstGeom prst="rect">
@@ -8095,8 +8095,8 @@
         </p:nvSpPr>
         <p:spPr>
           <a:xfrm>
-            <a:off x="2539423" y="3095828"/>
-            <a:ext cx="3885821" cy="386944"/>
+            <a:off x="2551904" y="3088672"/>
+            <a:ext cx="3885820" cy="399289"/>
           </a:xfrm>
           <a:prstGeom prst="rect">
             <a:avLst/>
@@ -8119,7 +8119,7 @@
               <a:spcBef>
                 <a:spcPts val="500"/>
               </a:spcBef>
-              <a:defRPr b="0" sz="1900"/>
+              <a:defRPr b="0" sz="2000"/>
             </a:lvl1pPr>
           </a:lstStyle>
           <a:p>
@@ -8138,8 +8138,8 @@
         </p:nvSpPr>
         <p:spPr>
           <a:xfrm>
-            <a:off x="8879575" y="2920507"/>
-            <a:ext cx="3885820" cy="679044"/>
+            <a:off x="8231706" y="2936272"/>
+            <a:ext cx="3885821" cy="704089"/>
           </a:xfrm>
           <a:prstGeom prst="rect">
             <a:avLst/>
@@ -8162,7 +8162,7 @@
               <a:spcBef>
                 <a:spcPts val="500"/>
               </a:spcBef>
-              <a:defRPr b="0" sz="1900"/>
+              <a:defRPr b="0" sz="2000"/>
             </a:lvl1pPr>
           </a:lstStyle>
           <a:p>
@@ -8181,8 +8181,8 @@
         </p:nvSpPr>
         <p:spPr>
           <a:xfrm>
-            <a:off x="2543132" y="4782362"/>
-            <a:ext cx="3885821" cy="386944"/>
+            <a:off x="2533182" y="4717155"/>
+            <a:ext cx="3885821" cy="399289"/>
           </a:xfrm>
           <a:prstGeom prst="rect">
             <a:avLst/>
@@ -8205,7 +8205,7 @@
               <a:spcBef>
                 <a:spcPts val="500"/>
               </a:spcBef>
-              <a:defRPr b="0" sz="1900"/>
+              <a:defRPr b="0" sz="2000"/>
             </a:lvl1pPr>
           </a:lstStyle>
           <a:p>
@@ -8224,8 +8224,8 @@
         </p:nvSpPr>
         <p:spPr>
           <a:xfrm>
-            <a:off x="8769443" y="4635599"/>
-            <a:ext cx="3885821" cy="386945"/>
+            <a:off x="8213205" y="4717155"/>
+            <a:ext cx="3885821" cy="399289"/>
           </a:xfrm>
           <a:prstGeom prst="rect">
             <a:avLst/>
@@ -8248,7 +8248,7 @@
               <a:spcBef>
                 <a:spcPts val="500"/>
               </a:spcBef>
-              <a:defRPr b="0" sz="1900"/>
+              <a:defRPr b="0" sz="2000"/>
             </a:lvl1pPr>
           </a:lstStyle>
           <a:p>
@@ -8267,8 +8267,8 @@
         </p:nvSpPr>
         <p:spPr>
           <a:xfrm>
-            <a:off x="2463105" y="6322540"/>
-            <a:ext cx="3885821" cy="386945"/>
+            <a:off x="2533182" y="6163968"/>
+            <a:ext cx="3885821" cy="704089"/>
           </a:xfrm>
           <a:prstGeom prst="rect">
             <a:avLst/>
@@ -8291,7 +8291,7 @@
               <a:spcBef>
                 <a:spcPts val="500"/>
               </a:spcBef>
-              <a:defRPr b="0" sz="1900"/>
+              <a:defRPr b="0" sz="2000"/>
             </a:lvl1pPr>
           </a:lstStyle>
           <a:p>
@@ -8310,8 +8310,8 @@
         </p:nvSpPr>
         <p:spPr>
           <a:xfrm>
-            <a:off x="8806885" y="6300099"/>
-            <a:ext cx="3885821" cy="386944"/>
+            <a:off x="8213205" y="6316368"/>
+            <a:ext cx="3885821" cy="399289"/>
           </a:xfrm>
           <a:prstGeom prst="rect">
             <a:avLst/>
@@ -8334,7 +8334,7 @@
               <a:spcBef>
                 <a:spcPts val="500"/>
               </a:spcBef>
-              <a:defRPr b="0" sz="1900"/>
+              <a:defRPr b="0" sz="2000"/>
             </a:lvl1pPr>
           </a:lstStyle>
           <a:p>
@@ -8363,7 +8363,7 @@
         </p:blipFill>
         <p:spPr>
           <a:xfrm>
-            <a:off x="7453754" y="7550311"/>
+            <a:off x="6780924" y="7613244"/>
             <a:ext cx="1120063" cy="1120063"/>
           </a:xfrm>
           <a:prstGeom prst="rect">
@@ -8392,7 +8392,7 @@
         </p:blipFill>
         <p:spPr>
           <a:xfrm>
-            <a:off x="1126082" y="7613244"/>
+            <a:off x="1088641" y="7613244"/>
             <a:ext cx="1120063" cy="1120063"/>
           </a:xfrm>
           <a:prstGeom prst="rect">
@@ -8411,8 +8411,8 @@
         </p:nvSpPr>
         <p:spPr>
           <a:xfrm>
-            <a:off x="2551903" y="7950838"/>
-            <a:ext cx="3885821" cy="386944"/>
+            <a:off x="2533182" y="7973631"/>
+            <a:ext cx="3885821" cy="399289"/>
           </a:xfrm>
           <a:prstGeom prst="rect">
             <a:avLst/>
@@ -8435,7 +8435,7 @@
               <a:spcBef>
                 <a:spcPts val="500"/>
               </a:spcBef>
-              <a:defRPr b="0" sz="1900"/>
+              <a:defRPr b="0" sz="2000"/>
             </a:lvl1pPr>
           </a:lstStyle>
           <a:p>
@@ -8454,8 +8454,8 @@
         </p:nvSpPr>
         <p:spPr>
           <a:xfrm>
-            <a:off x="8819366" y="7916870"/>
-            <a:ext cx="3885821" cy="386944"/>
+            <a:off x="8244187" y="7973631"/>
+            <a:ext cx="3885821" cy="399289"/>
           </a:xfrm>
           <a:prstGeom prst="rect">
             <a:avLst/>
@@ -8478,7 +8478,7 @@
               <a:spcBef>
                 <a:spcPts val="500"/>
               </a:spcBef>
-              <a:defRPr b="0" sz="1900"/>
+              <a:defRPr b="0" sz="2000"/>
             </a:lvl1pPr>
           </a:lstStyle>
           <a:p>
@@ -9971,22 +9971,22 @@
       </p:par>
     </p:tnLst>
     <p:bldLst>
-      <p:bldP build="whole" bldLvl="1" animBg="1" rev="0" advAuto="0" spid="130" grpId="1"/>
+      <p:bldP build="whole" bldLvl="1" animBg="1" rev="0" advAuto="0" spid="137" grpId="8"/>
+      <p:bldP build="whole" bldLvl="1" animBg="1" rev="0" advAuto="0" spid="129" grpId="7"/>
+      <p:bldP build="whole" bldLvl="1" animBg="1" rev="0" advAuto="0" spid="128" grpId="9"/>
+      <p:bldP build="whole" bldLvl="1" animBg="1" rev="0" advAuto="0" spid="143" grpId="16"/>
       <p:bldP build="whole" bldLvl="1" animBg="1" rev="0" advAuto="0" spid="133" grpId="3"/>
-      <p:bldP build="whole" bldLvl="1" animBg="1" rev="0" advAuto="0" spid="131" grpId="11"/>
-      <p:bldP build="whole" bldLvl="1" animBg="1" rev="0" advAuto="0" spid="132" grpId="5"/>
+      <p:bldP build="whole" bldLvl="1" animBg="1" rev="0" advAuto="0" spid="138" grpId="10"/>
+      <p:bldP build="whole" bldLvl="1" animBg="1" rev="0" advAuto="0" spid="136" grpId="6"/>
+      <p:bldP build="whole" bldLvl="1" animBg="1" rev="0" advAuto="0" spid="140" grpId="15"/>
+      <p:bldP build="whole" bldLvl="1" animBg="1" rev="0" advAuto="0" spid="134" grpId="2"/>
+      <p:bldP build="whole" bldLvl="1" animBg="1" rev="0" advAuto="0" spid="139" grpId="12"/>
       <p:bldP build="whole" bldLvl="1" animBg="1" rev="0" advAuto="0" spid="141" grpId="13"/>
       <p:bldP build="whole" bldLvl="1" animBg="1" rev="0" advAuto="0" spid="135" grpId="4"/>
-      <p:bldP build="whole" bldLvl="1" animBg="1" rev="0" advAuto="0" spid="140" grpId="15"/>
-      <p:bldP build="whole" bldLvl="1" animBg="1" rev="0" advAuto="0" spid="128" grpId="9"/>
-      <p:bldP build="whole" bldLvl="1" animBg="1" rev="0" advAuto="0" spid="129" grpId="7"/>
-      <p:bldP build="whole" bldLvl="1" animBg="1" rev="0" advAuto="0" spid="137" grpId="8"/>
-      <p:bldP build="whole" bldLvl="1" animBg="1" rev="0" advAuto="0" spid="139" grpId="12"/>
-      <p:bldP build="whole" bldLvl="1" animBg="1" rev="0" advAuto="0" spid="136" grpId="6"/>
-      <p:bldP build="whole" bldLvl="1" animBg="1" rev="0" advAuto="0" spid="134" grpId="2"/>
-      <p:bldP build="whole" bldLvl="1" animBg="1" rev="0" advAuto="0" spid="138" grpId="10"/>
       <p:bldP build="whole" bldLvl="1" animBg="1" rev="0" advAuto="0" spid="142" grpId="14"/>
-      <p:bldP build="whole" bldLvl="1" animBg="1" rev="0" advAuto="0" spid="143" grpId="16"/>
+      <p:bldP build="whole" bldLvl="1" animBg="1" rev="0" advAuto="0" spid="132" grpId="5"/>
+      <p:bldP build="whole" bldLvl="1" animBg="1" rev="0" advAuto="0" spid="131" grpId="11"/>
+      <p:bldP build="whole" bldLvl="1" animBg="1" rev="0" advAuto="0" spid="130" grpId="1"/>
     </p:bldLst>
   </p:timing>
 </p:sld>
@@ -10146,8 +10146,8 @@
         </p:blipFill>
         <p:spPr>
           <a:xfrm>
-            <a:off x="7855660" y="1994243"/>
-            <a:ext cx="4588014" cy="4529850"/>
+            <a:off x="7576486" y="1834420"/>
+            <a:ext cx="3908251" cy="3858705"/>
           </a:xfrm>
           <a:prstGeom prst="rect">
             <a:avLst/>
@@ -10157,45 +10157,16 @@
           </a:ln>
         </p:spPr>
       </p:pic>
-      <p:pic>
-        <p:nvPicPr>
-          <p:cNvPr id="149" name="robot.png" descr="robot.png"/>
-          <p:cNvPicPr>
-            <a:picLocks noChangeAspect="1"/>
-          </p:cNvPicPr>
-          <p:nvPr/>
-        </p:nvPicPr>
-        <p:blipFill>
-          <a:blip r:embed="rId3">
-            <a:extLst/>
-          </a:blip>
-          <a:stretch>
-            <a:fillRect/>
-          </a:stretch>
-        </p:blipFill>
-        <p:spPr>
-          <a:xfrm>
-            <a:off x="949406" y="5999630"/>
-            <a:ext cx="3251201" cy="3251201"/>
-          </a:xfrm>
-          <a:prstGeom prst="rect">
-            <a:avLst/>
-          </a:prstGeom>
-          <a:ln w="12700">
-            <a:miter lim="400000"/>
-          </a:ln>
-        </p:spPr>
-      </p:pic>
       <p:sp>
         <p:nvSpPr>
-          <p:cNvPr id="150" name="Jouable à deux ou contre une IA"/>
+          <p:cNvPr id="149" name="Jouable à deux"/>
           <p:cNvSpPr txBox="1"/>
           <p:nvPr/>
         </p:nvSpPr>
         <p:spPr>
           <a:xfrm>
-            <a:off x="5257218" y="7494317"/>
-            <a:ext cx="10464801" cy="1961515"/>
+            <a:off x="5387982" y="7009757"/>
+            <a:ext cx="10464801" cy="1961514"/>
           </a:xfrm>
           <a:prstGeom prst="rect">
             <a:avLst/>
@@ -10224,11 +10195,40 @@
           <a:p>
             <a:pPr/>
             <a:r>
-              <a:t>Jouable à deux ou contre une IA</a:t>
+              <a:t>Jouable à deux</a:t>
             </a:r>
           </a:p>
         </p:txBody>
       </p:sp>
+      <p:pic>
+        <p:nvPicPr>
+          <p:cNvPr id="150" name="computer game.png" descr="computer game.png"/>
+          <p:cNvPicPr>
+            <a:picLocks noChangeAspect="1"/>
+          </p:cNvPicPr>
+          <p:nvPr/>
+        </p:nvPicPr>
+        <p:blipFill>
+          <a:blip r:embed="rId3">
+            <a:extLst/>
+          </a:blip>
+          <a:stretch>
+            <a:fillRect/>
+          </a:stretch>
+        </p:blipFill>
+        <p:spPr>
+          <a:xfrm>
+            <a:off x="1012149" y="5906873"/>
+            <a:ext cx="3528768" cy="3528768"/>
+          </a:xfrm>
+          <a:prstGeom prst="rect">
+            <a:avLst/>
+          </a:prstGeom>
+          <a:ln w="12700">
+            <a:miter lim="400000"/>
+          </a:ln>
+        </p:spPr>
+      </p:pic>
     </p:spTree>
   </p:cSld>
   <p:clrMapOvr>
@@ -10313,46 +10313,7 @@
       </p:sp>
       <p:sp>
         <p:nvSpPr>
-          <p:cNvPr id="153" name="Rectangle"/>
-          <p:cNvSpPr/>
-          <p:nvPr/>
-        </p:nvSpPr>
-        <p:spPr>
-          <a:xfrm>
-            <a:off x="8156122" y="5999630"/>
-            <a:ext cx="3793739" cy="3171762"/>
-          </a:xfrm>
-          <a:prstGeom prst="rect">
-            <a:avLst/>
-          </a:prstGeom>
-          <a:solidFill>
-            <a:schemeClr val="accent1"/>
-          </a:solidFill>
-          <a:ln w="12700">
-            <a:miter lim="400000"/>
-          </a:ln>
-        </p:spPr>
-        <p:txBody>
-          <a:bodyPr lIns="50800" tIns="50800" rIns="50800" bIns="50800" anchor="ctr"/>
-          <a:lstStyle/>
-          <a:p>
-            <a:pPr>
-              <a:defRPr b="0" sz="2200">
-                <a:solidFill>
-                  <a:srgbClr val="FFFFFF"/>
-                </a:solidFill>
-                <a:latin typeface="+mn-lt"/>
-                <a:ea typeface="+mn-ea"/>
-                <a:cs typeface="+mn-cs"/>
-                <a:sym typeface="Helvetica Neue Medium"/>
-              </a:defRPr>
-            </a:pPr>
-          </a:p>
-        </p:txBody>
-      </p:sp>
-      <p:sp>
-        <p:nvSpPr>
-          <p:cNvPr id="154" name="Jouer dans un terminal"/>
+          <p:cNvPr id="153" name="Jouer dans un terminal"/>
           <p:cNvSpPr txBox="1"/>
           <p:nvPr/>
         </p:nvSpPr>
@@ -10395,7 +10356,7 @@
       </p:sp>
       <p:sp>
         <p:nvSpPr>
-          <p:cNvPr id="155" name="Jouer avec une interface"/>
+          <p:cNvPr id="154" name="Jouer avec une interface"/>
           <p:cNvSpPr txBox="1"/>
           <p:nvPr/>
         </p:nvSpPr>
@@ -10438,7 +10399,7 @@
       </p:sp>
       <p:sp>
         <p:nvSpPr>
-          <p:cNvPr id="156" name="Numéro de diapositive"/>
+          <p:cNvPr id="155" name="Numéro de diapositive"/>
           <p:cNvSpPr txBox="1"/>
           <p:nvPr>
             <p:ph type="sldNum" sz="quarter" idx="2"/>
@@ -10476,7 +10437,7 @@
       </p:sp>
       <p:pic>
         <p:nvPicPr>
-          <p:cNvPr id="157" name="king.png" descr="king.png"/>
+          <p:cNvPr id="156" name="king.png" descr="king.png"/>
           <p:cNvPicPr>
             <a:picLocks noChangeAspect="1"/>
           </p:cNvPicPr>
@@ -10505,7 +10466,7 @@
       </p:pic>
       <p:pic>
         <p:nvPicPr>
-          <p:cNvPr id="158" name="knight.png" descr="knight.png"/>
+          <p:cNvPr id="157" name="knight.png" descr="knight.png"/>
           <p:cNvPicPr>
             <a:picLocks noChangeAspect="1"/>
           </p:cNvPicPr>
@@ -10534,7 +10495,7 @@
       </p:pic>
       <p:pic>
         <p:nvPicPr>
-          <p:cNvPr id="159" name="rook.png" descr="rook.png"/>
+          <p:cNvPr id="158" name="rook.png" descr="rook.png"/>
           <p:cNvPicPr>
             <a:picLocks noChangeAspect="1"/>
           </p:cNvPicPr>
@@ -10563,7 +10524,7 @@
       </p:pic>
       <p:sp>
         <p:nvSpPr>
-          <p:cNvPr id="160" name="Déplacer toutes les pièces"/>
+          <p:cNvPr id="159" name="Déplacer toutes les pièces"/>
           <p:cNvSpPr txBox="1"/>
           <p:nvPr/>
         </p:nvSpPr>
@@ -10606,7 +10567,7 @@
       </p:sp>
       <p:sp>
         <p:nvSpPr>
-          <p:cNvPr id="161" name="Contrôler les mouvements"/>
+          <p:cNvPr id="160" name="Contrôler les mouvements"/>
           <p:cNvSpPr txBox="1"/>
           <p:nvPr/>
         </p:nvSpPr>
@@ -10649,7 +10610,7 @@
       </p:sp>
       <p:sp>
         <p:nvSpPr>
-          <p:cNvPr id="162" name="Gérer les coups spéciaux"/>
+          <p:cNvPr id="161" name="Gérer les coups spéciaux"/>
           <p:cNvSpPr txBox="1"/>
           <p:nvPr/>
         </p:nvSpPr>
@@ -10692,7 +10653,7 @@
       </p:sp>
       <p:pic>
         <p:nvPicPr>
-          <p:cNvPr id="163" name="Capture d’écran 2018-06-09 à 16.24.45.png" descr="Capture d’écran 2018-06-09 à 16.24.45.png"/>
+          <p:cNvPr id="162" name="Capture d’écran 2018-06-09 à 16.24.45.png" descr="Capture d’écran 2018-06-09 à 16.24.45.png"/>
           <p:cNvPicPr>
             <a:picLocks noChangeAspect="1"/>
           </p:cNvPicPr>
@@ -10708,8 +10669,38 @@
         </p:blipFill>
         <p:spPr>
           <a:xfrm>
-            <a:off x="1488093" y="6014182"/>
-            <a:ext cx="3622640" cy="2865005"/>
+            <a:off x="2620980" y="1735243"/>
+            <a:ext cx="8183165" cy="6471748"/>
+          </a:xfrm>
+          <a:prstGeom prst="rect">
+            <a:avLst/>
+          </a:prstGeom>
+          <a:ln w="12700">
+            <a:miter lim="400000"/>
+          </a:ln>
+        </p:spPr>
+      </p:pic>
+      <p:pic>
+        <p:nvPicPr>
+          <p:cNvPr id="163" name="Capture d’écran 2018-06-10 à 17.35.34.png" descr="Capture d’écran 2018-06-10 à 17.35.34.png"/>
+          <p:cNvPicPr>
+            <a:picLocks noChangeAspect="1"/>
+          </p:cNvPicPr>
+          <p:nvPr/>
+        </p:nvPicPr>
+        <p:blipFill>
+          <a:blip r:embed="rId6">
+            <a:extLst/>
+          </a:blip>
+          <a:srcRect l="0" t="4894" r="30701" b="9889"/>
+          <a:stretch>
+            <a:fillRect/>
+          </a:stretch>
+        </p:blipFill>
+        <p:spPr>
+          <a:xfrm>
+            <a:off x="2575820" y="1618310"/>
+            <a:ext cx="8724975" cy="6705620"/>
           </a:xfrm>
           <a:prstGeom prst="rect">
             <a:avLst/>
@@ -10757,19 +10748,71 @@
                             </p:stCondLst>
                             <p:childTnLst>
                               <p:par>
-                                <p:cTn id="5" presetClass="emph" nodeType="clickEffect" presetSubtype="0" presetID="6" grpId="1" accel="50000" decel="50000" fill="hold">
+                                <p:cTn id="5" presetClass="entr" nodeType="clickEffect" presetID="9" grpId="1" fill="hold">
+                                  <p:stCondLst>
+                                    <p:cond delay="0"/>
+                                  </p:stCondLst>
+                                  <p:iterate type="el" backwards="0">
+                                    <p:tmAbs val="0"/>
+                                  </p:iterate>
+                                  <p:childTnLst>
+                                    <p:set>
+                                      <p:cBhvr>
+                                        <p:cTn id="6" fill="hold"/>
+                                        <p:tgtEl>
+                                          <p:spTgt spid="162"/>
+                                        </p:tgtEl>
+                                        <p:attrNameLst>
+                                          <p:attrName>style.visibility</p:attrName>
+                                        </p:attrNameLst>
+                                      </p:cBhvr>
+                                      <p:to>
+                                        <p:strVal val="visible"/>
+                                      </p:to>
+                                    </p:set>
+                                    <p:animEffect filter="dissolve" transition="in">
+                                      <p:cBhvr>
+                                        <p:cTn id="7" dur="500"/>
+                                        <p:tgtEl>
+                                          <p:spTgt spid="162"/>
+                                        </p:tgtEl>
+                                      </p:cBhvr>
+                                    </p:animEffect>
+                                  </p:childTnLst>
+                                </p:cTn>
+                              </p:par>
+                            </p:childTnLst>
+                          </p:cTn>
+                        </p:par>
+                      </p:childTnLst>
+                    </p:cTn>
+                  </p:par>
+                  <p:par>
+                    <p:cTn id="8" fill="hold">
+                      <p:stCondLst>
+                        <p:cond delay="indefinite"/>
+                      </p:stCondLst>
+                      <p:childTnLst>
+                        <p:par>
+                          <p:cTn id="9" fill="hold">
+                            <p:stCondLst>
+                              <p:cond delay="0"/>
+                            </p:stCondLst>
+                            <p:childTnLst>
+                              <p:par>
+                                <p:cTn id="10" presetClass="emph" nodeType="clickEffect" presetSubtype="0" presetID="6" grpId="2" accel="50000" decel="50000" fill="hold">
                                   <p:stCondLst>
                                     <p:cond delay="0"/>
                                   </p:stCondLst>
                                   <p:childTnLst>
                                     <p:animScale>
                                       <p:cBhvr>
-                                        <p:cTn id="6" dur="1500" fill="hold"/>
-                                        <p:tgtEl>
-                                          <p:spTgt spid="163"/>
-                                        </p:tgtEl>
-                                      </p:cBhvr>
-                                      <p:by x="276868" y="276868"/>
+                                        <p:cTn id="11" dur="1000" fill="hold"/>
+                                        <p:tgtEl>
+                                          <p:spTgt spid="162"/>
+                                        </p:tgtEl>
+                                      </p:cBhvr>
+                                      <p:by x="47999" y="47999"/>
                                     </p:animScale>
                                   </p:childTnLst>
                                 </p:cTn>
@@ -10778,22 +10821,22 @@
                           </p:cTn>
                         </p:par>
                         <p:par>
-                          <p:cTn id="7" fill="hold">
+                          <p:cTn id="12" fill="hold">
                             <p:stCondLst>
                               <p:cond delay="0"/>
                             </p:stCondLst>
                             <p:childTnLst>
                               <p:par>
-                                <p:cTn id="8" presetClass="path" nodeType="withEffect" presetSubtype="0" presetID="-1" grpId="2" accel="50000" decel="50000" fill="hold">
+                                <p:cTn id="13" presetClass="path" nodeType="withEffect" presetSubtype="0" presetID="-1" grpId="3" accel="50000" decel="50000" fill="hold">
                                   <p:stCondLst>
                                     <p:cond delay="0"/>
                                   </p:stCondLst>
                                   <p:childTnLst>
-                                    <p:animMotion path="M 0.000000 0.000000 L 0.246293 -0.232137" origin="layout" pathEditMode="relative">
-                                      <p:cBhvr>
-                                        <p:cTn id="9" dur="1000" fill="hold"/>
-                                        <p:tgtEl>
-                                          <p:spTgt spid="163"/>
+                                    <p:animMotion path="M 0.000000 0.000000 L -0.246933 0.253811" origin="layout" pathEditMode="relative">
+                                      <p:cBhvr>
+                                        <p:cTn id="14" dur="1000" fill="hold"/>
+                                        <p:tgtEl>
+                                          <p:spTgt spid="162"/>
                                         </p:tgtEl>
                                         <p:attrNameLst>
                                           <p:attrName>ppt_x</p:attrName>
@@ -10811,31 +10854,83 @@
                     </p:cTn>
                   </p:par>
                   <p:par>
-                    <p:cTn id="10" fill="hold">
+                    <p:cTn id="15" fill="hold">
                       <p:stCondLst>
                         <p:cond delay="indefinite"/>
                       </p:stCondLst>
                       <p:childTnLst>
                         <p:par>
-                          <p:cTn id="11" fill="hold">
+                          <p:cTn id="16" fill="hold">
                             <p:stCondLst>
                               <p:cond delay="0"/>
                             </p:stCondLst>
                             <p:childTnLst>
                               <p:par>
-                                <p:cTn id="12" presetClass="emph" nodeType="clickEffect" presetSubtype="0" presetID="6" grpId="3" accel="50000" decel="50000" fill="hold">
+                                <p:cTn id="17" presetClass="entr" nodeType="clickEffect" presetID="9" grpId="4" fill="hold">
+                                  <p:stCondLst>
+                                    <p:cond delay="0"/>
+                                  </p:stCondLst>
+                                  <p:iterate type="el" backwards="0">
+                                    <p:tmAbs val="0"/>
+                                  </p:iterate>
+                                  <p:childTnLst>
+                                    <p:set>
+                                      <p:cBhvr>
+                                        <p:cTn id="18" fill="hold"/>
+                                        <p:tgtEl>
+                                          <p:spTgt spid="163"/>
+                                        </p:tgtEl>
+                                        <p:attrNameLst>
+                                          <p:attrName>style.visibility</p:attrName>
+                                        </p:attrNameLst>
+                                      </p:cBhvr>
+                                      <p:to>
+                                        <p:strVal val="visible"/>
+                                      </p:to>
+                                    </p:set>
+                                    <p:animEffect filter="dissolve" transition="in">
+                                      <p:cBhvr>
+                                        <p:cTn id="19" dur="499"/>
+                                        <p:tgtEl>
+                                          <p:spTgt spid="163"/>
+                                        </p:tgtEl>
+                                      </p:cBhvr>
+                                    </p:animEffect>
+                                  </p:childTnLst>
+                                </p:cTn>
+                              </p:par>
+                            </p:childTnLst>
+                          </p:cTn>
+                        </p:par>
+                      </p:childTnLst>
+                    </p:cTn>
+                  </p:par>
+                  <p:par>
+                    <p:cTn id="20" fill="hold">
+                      <p:stCondLst>
+                        <p:cond delay="indefinite"/>
+                      </p:stCondLst>
+                      <p:childTnLst>
+                        <p:par>
+                          <p:cTn id="21" fill="hold">
+                            <p:stCondLst>
+                              <p:cond delay="0"/>
+                            </p:stCondLst>
+                            <p:childTnLst>
+                              <p:par>
+                                <p:cTn id="22" presetClass="emph" nodeType="clickEffect" presetSubtype="0" presetID="6" grpId="5" accel="50000" decel="50000" fill="hold">
                                   <p:stCondLst>
                                     <p:cond delay="0"/>
                                   </p:stCondLst>
                                   <p:childTnLst>
                                     <p:animScale>
                                       <p:cBhvr>
-                                        <p:cTn id="13" dur="1000" fill="hold"/>
+                                        <p:cTn id="23" dur="1000" fill="hold"/>
                                         <p:tgtEl>
                                           <p:spTgt spid="163"/>
                                         </p:tgtEl>
                                       </p:cBhvr>
-                                      <p:by x="36551" y="36551"/>
+                                      <p:by x="44999" y="44999"/>
                                     </p:animScale>
                                   </p:childTnLst>
                                 </p:cTn>
@@ -10844,20 +10939,20 @@
                           </p:cTn>
                         </p:par>
                         <p:par>
-                          <p:cTn id="14" fill="hold">
+                          <p:cTn id="24" fill="hold">
                             <p:stCondLst>
                               <p:cond delay="0"/>
                             </p:stCondLst>
                             <p:childTnLst>
                               <p:par>
-                                <p:cTn id="15" presetClass="path" nodeType="withEffect" presetSubtype="0" presetID="-1" grpId="4" accel="50000" decel="50000" fill="hold">
+                                <p:cTn id="25" presetClass="path" nodeType="withEffect" presetSubtype="0" presetID="-1" grpId="6" accel="50000" decel="50000" fill="hold">
                                   <p:stCondLst>
                                     <p:cond delay="0"/>
                                   </p:stCondLst>
                                   <p:childTnLst>
-                                    <p:animMotion path="M 0.246293 -0.232137 L 0.000000 0.000000" origin="layout" pathEditMode="relative">
-                                      <p:cBhvr>
-                                        <p:cTn id="16" dur="1000" fill="hold"/>
+                                    <p:animMotion path="M 0.000000 0.000000 L 0.239503 0.260051" origin="layout" pathEditMode="relative">
+                                      <p:cBhvr>
+                                        <p:cTn id="26" dur="1000" fill="hold"/>
                                         <p:tgtEl>
                                           <p:spTgt spid="163"/>
                                         </p:tgtEl>
@@ -10898,8 +10993,10 @@
       </p:par>
     </p:tnLst>
     <p:bldLst>
-      <p:bldP build="whole" bldLvl="1" animBg="1" rev="0" advAuto="0" spid="163" grpId="1"/>
-      <p:bldP build="whole" bldLvl="1" animBg="1" rev="0" advAuto="0" spid="163" grpId="3"/>
+      <p:bldP build="whole" bldLvl="1" animBg="1" rev="0" advAuto="0" spid="163" grpId="4"/>
+      <p:bldP build="whole" bldLvl="1" animBg="1" rev="0" advAuto="0" spid="163" grpId="5"/>
+      <p:bldP build="whole" bldLvl="1" animBg="1" rev="0" advAuto="0" spid="162" grpId="1"/>
+      <p:bldP build="whole" bldLvl="1" animBg="1" rev="0" advAuto="0" spid="162" grpId="2"/>
     </p:bldLst>
   </p:timing>
 </p:sld>
@@ -12036,7 +12133,7 @@
       </p:sp>
       <p:pic>
         <p:nvPicPr>
-          <p:cNvPr id="194" name="UML.png" descr="UML.png"/>
+          <p:cNvPr id="194" name="UML_P1.png" descr="UML_P1.png"/>
           <p:cNvPicPr>
             <a:picLocks noChangeAspect="1"/>
           </p:cNvPicPr>
@@ -12052,8 +12149,95 @@
         </p:blipFill>
         <p:spPr>
           <a:xfrm>
-            <a:off x="-53124" y="1981507"/>
-            <a:ext cx="13111048" cy="6437335"/>
+            <a:off x="0" y="2133982"/>
+            <a:ext cx="13004800" cy="5485636"/>
+          </a:xfrm>
+          <a:prstGeom prst="rect">
+            <a:avLst/>
+          </a:prstGeom>
+          <a:ln w="12700">
+            <a:miter lim="400000"/>
+          </a:ln>
+        </p:spPr>
+      </p:pic>
+      <p:pic>
+        <p:nvPicPr>
+          <p:cNvPr id="195" name="UML_P2.png" descr="UML_P2.png"/>
+          <p:cNvPicPr>
+            <a:picLocks noChangeAspect="1"/>
+          </p:cNvPicPr>
+          <p:nvPr/>
+        </p:nvPicPr>
+        <p:blipFill>
+          <a:blip r:embed="rId3">
+            <a:extLst/>
+          </a:blip>
+          <a:stretch>
+            <a:fillRect/>
+          </a:stretch>
+        </p:blipFill>
+        <p:spPr>
+          <a:xfrm>
+            <a:off x="2866082" y="-1"/>
+            <a:ext cx="7272636" cy="9753601"/>
+          </a:xfrm>
+          <a:prstGeom prst="rect">
+            <a:avLst/>
+          </a:prstGeom>
+          <a:ln w="12700">
+            <a:miter lim="400000"/>
+          </a:ln>
+        </p:spPr>
+      </p:pic>
+      <p:pic>
+        <p:nvPicPr>
+          <p:cNvPr id="196" name="UML_P3.png" descr="UML_P3.png"/>
+          <p:cNvPicPr>
+            <a:picLocks noChangeAspect="1"/>
+          </p:cNvPicPr>
+          <p:nvPr/>
+        </p:nvPicPr>
+        <p:blipFill>
+          <a:blip r:embed="rId4">
+            <a:extLst/>
+          </a:blip>
+          <a:stretch>
+            <a:fillRect/>
+          </a:stretch>
+        </p:blipFill>
+        <p:spPr>
+          <a:xfrm>
+            <a:off x="2613287" y="-1"/>
+            <a:ext cx="8264695" cy="9753601"/>
+          </a:xfrm>
+          <a:prstGeom prst="rect">
+            <a:avLst/>
+          </a:prstGeom>
+          <a:ln w="12700">
+            <a:miter lim="400000"/>
+          </a:ln>
+        </p:spPr>
+      </p:pic>
+      <p:pic>
+        <p:nvPicPr>
+          <p:cNvPr id="197" name="UML_P4.png" descr="UML_P4.png"/>
+          <p:cNvPicPr>
+            <a:picLocks noChangeAspect="1"/>
+          </p:cNvPicPr>
+          <p:nvPr/>
+        </p:nvPicPr>
+        <p:blipFill>
+          <a:blip r:embed="rId5">
+            <a:extLst/>
+          </a:blip>
+          <a:stretch>
+            <a:fillRect/>
+          </a:stretch>
+        </p:blipFill>
+        <p:spPr>
+          <a:xfrm>
+            <a:off x="3244850" y="882650"/>
+            <a:ext cx="6769100" cy="8242300"/>
           </a:xfrm>
           <a:prstGeom prst="rect">
             <a:avLst/>
@@ -12101,20 +12285,429 @@
                             </p:stCondLst>
                             <p:childTnLst>
                               <p:par>
-                                <p:cTn id="5" presetClass="emph" nodeType="clickEffect" presetSubtype="0" presetID="6" grpId="1" accel="50000" decel="50000" fill="hold">
+                                <p:cTn id="5" presetClass="entr" nodeType="clickEffect" presetID="9" grpId="1" fill="hold">
+                                  <p:stCondLst>
+                                    <p:cond delay="0"/>
+                                  </p:stCondLst>
+                                  <p:iterate type="el" backwards="0">
+                                    <p:tmAbs val="0"/>
+                                  </p:iterate>
+                                  <p:childTnLst>
+                                    <p:set>
+                                      <p:cBhvr>
+                                        <p:cTn id="6" fill="hold"/>
+                                        <p:tgtEl>
+                                          <p:spTgt spid="194"/>
+                                        </p:tgtEl>
+                                        <p:attrNameLst>
+                                          <p:attrName>style.visibility</p:attrName>
+                                        </p:attrNameLst>
+                                      </p:cBhvr>
+                                      <p:to>
+                                        <p:strVal val="visible"/>
+                                      </p:to>
+                                    </p:set>
+                                    <p:animEffect filter="dissolve" transition="in">
+                                      <p:cBhvr>
+                                        <p:cTn id="7" dur="799"/>
+                                        <p:tgtEl>
+                                          <p:spTgt spid="194"/>
+                                        </p:tgtEl>
+                                      </p:cBhvr>
+                                    </p:animEffect>
+                                  </p:childTnLst>
+                                </p:cTn>
+                              </p:par>
+                            </p:childTnLst>
+                          </p:cTn>
+                        </p:par>
+                      </p:childTnLst>
+                    </p:cTn>
+                  </p:par>
+                  <p:par>
+                    <p:cTn id="8" fill="hold">
+                      <p:stCondLst>
+                        <p:cond delay="indefinite"/>
+                      </p:stCondLst>
+                      <p:childTnLst>
+                        <p:par>
+                          <p:cTn id="9" fill="hold">
+                            <p:stCondLst>
+                              <p:cond delay="0"/>
+                            </p:stCondLst>
+                            <p:childTnLst>
+                              <p:par>
+                                <p:cTn id="10" presetClass="emph" nodeType="clickEffect" presetSubtype="0" presetID="6" grpId="2" accel="50000" decel="50000" fill="hold">
                                   <p:stCondLst>
                                     <p:cond delay="0"/>
                                   </p:stCondLst>
                                   <p:childTnLst>
                                     <p:animScale>
                                       <p:cBhvr>
-                                        <p:cTn id="6" dur="1000" fill="hold"/>
+                                        <p:cTn id="11" dur="1000" fill="hold"/>
                                         <p:tgtEl>
                                           <p:spTgt spid="194"/>
                                         </p:tgtEl>
                                       </p:cBhvr>
-                                      <p:by x="150000" y="150000"/>
+                                      <p:by x="20000" y="20000"/>
                                     </p:animScale>
+                                  </p:childTnLst>
+                                </p:cTn>
+                              </p:par>
+                            </p:childTnLst>
+                          </p:cTn>
+                        </p:par>
+                        <p:par>
+                          <p:cTn id="12" fill="hold">
+                            <p:stCondLst>
+                              <p:cond delay="0"/>
+                            </p:stCondLst>
+                            <p:childTnLst>
+                              <p:par>
+                                <p:cTn id="13" presetClass="path" nodeType="withEffect" presetSubtype="0" presetID="-1" grpId="3" accel="50000" decel="50000" fill="hold">
+                                  <p:stCondLst>
+                                    <p:cond delay="0"/>
+                                  </p:stCondLst>
+                                  <p:childTnLst>
+                                    <p:animMotion path="M 0.000000 0.000000 L -0.362395 0.377694" origin="layout" pathEditMode="relative">
+                                      <p:cBhvr>
+                                        <p:cTn id="14" dur="1000" fill="hold"/>
+                                        <p:tgtEl>
+                                          <p:spTgt spid="194"/>
+                                        </p:tgtEl>
+                                        <p:attrNameLst>
+                                          <p:attrName>ppt_x</p:attrName>
+                                          <p:attrName>ppt_y</p:attrName>
+                                        </p:attrNameLst>
+                                      </p:cBhvr>
+                                    </p:animMotion>
+                                  </p:childTnLst>
+                                </p:cTn>
+                              </p:par>
+                            </p:childTnLst>
+                          </p:cTn>
+                        </p:par>
+                        <p:par>
+                          <p:cTn id="15" fill="hold">
+                            <p:stCondLst>
+                              <p:cond delay="1000"/>
+                            </p:stCondLst>
+                            <p:childTnLst>
+                              <p:par>
+                                <p:cTn id="16" presetClass="entr" nodeType="afterEffect" presetID="9" grpId="4" fill="hold">
+                                  <p:stCondLst>
+                                    <p:cond delay="0"/>
+                                  </p:stCondLst>
+                                  <p:iterate type="el" backwards="0">
+                                    <p:tmAbs val="0"/>
+                                  </p:iterate>
+                                  <p:childTnLst>
+                                    <p:set>
+                                      <p:cBhvr>
+                                        <p:cTn id="17" fill="hold"/>
+                                        <p:tgtEl>
+                                          <p:spTgt spid="195"/>
+                                        </p:tgtEl>
+                                        <p:attrNameLst>
+                                          <p:attrName>style.visibility</p:attrName>
+                                        </p:attrNameLst>
+                                      </p:cBhvr>
+                                      <p:to>
+                                        <p:strVal val="visible"/>
+                                      </p:to>
+                                    </p:set>
+                                    <p:animEffect filter="dissolve" transition="in">
+                                      <p:cBhvr>
+                                        <p:cTn id="18" dur="799"/>
+                                        <p:tgtEl>
+                                          <p:spTgt spid="195"/>
+                                        </p:tgtEl>
+                                      </p:cBhvr>
+                                    </p:animEffect>
+                                  </p:childTnLst>
+                                </p:cTn>
+                              </p:par>
+                            </p:childTnLst>
+                          </p:cTn>
+                        </p:par>
+                      </p:childTnLst>
+                    </p:cTn>
+                  </p:par>
+                  <p:par>
+                    <p:cTn id="19" fill="hold">
+                      <p:stCondLst>
+                        <p:cond delay="indefinite"/>
+                      </p:stCondLst>
+                      <p:childTnLst>
+                        <p:par>
+                          <p:cTn id="20" fill="hold">
+                            <p:stCondLst>
+                              <p:cond delay="0"/>
+                            </p:stCondLst>
+                            <p:childTnLst>
+                              <p:par>
+                                <p:cTn id="21" presetClass="emph" nodeType="clickEffect" presetSubtype="0" presetID="6" grpId="5" accel="50000" decel="50000" fill="hold">
+                                  <p:stCondLst>
+                                    <p:cond delay="0"/>
+                                  </p:stCondLst>
+                                  <p:childTnLst>
+                                    <p:animScale>
+                                      <p:cBhvr>
+                                        <p:cTn id="22" dur="1000" fill="hold"/>
+                                        <p:tgtEl>
+                                          <p:spTgt spid="195"/>
+                                        </p:tgtEl>
+                                      </p:cBhvr>
+                                      <p:by x="20000" y="20000"/>
+                                    </p:animScale>
+                                  </p:childTnLst>
+                                </p:cTn>
+                              </p:par>
+                            </p:childTnLst>
+                          </p:cTn>
+                        </p:par>
+                        <p:par>
+                          <p:cTn id="23" fill="hold">
+                            <p:stCondLst>
+                              <p:cond delay="0"/>
+                            </p:stCondLst>
+                            <p:childTnLst>
+                              <p:par>
+                                <p:cTn id="24" presetClass="path" nodeType="withEffect" presetSubtype="0" presetID="-1" grpId="6" accel="50000" decel="50000" fill="hold">
+                                  <p:stCondLst>
+                                    <p:cond delay="0"/>
+                                  </p:stCondLst>
+                                  <p:childTnLst>
+                                    <p:animMotion path="M 0.000000 0.000000 L -0.149466 0.375926" origin="layout" pathEditMode="relative">
+                                      <p:cBhvr>
+                                        <p:cTn id="25" dur="1000" fill="hold"/>
+                                        <p:tgtEl>
+                                          <p:spTgt spid="195"/>
+                                        </p:tgtEl>
+                                        <p:attrNameLst>
+                                          <p:attrName>ppt_x</p:attrName>
+                                          <p:attrName>ppt_y</p:attrName>
+                                        </p:attrNameLst>
+                                      </p:cBhvr>
+                                    </p:animMotion>
+                                  </p:childTnLst>
+                                </p:cTn>
+                              </p:par>
+                            </p:childTnLst>
+                          </p:cTn>
+                        </p:par>
+                        <p:par>
+                          <p:cTn id="26" fill="hold">
+                            <p:stCondLst>
+                              <p:cond delay="1000"/>
+                            </p:stCondLst>
+                            <p:childTnLst>
+                              <p:par>
+                                <p:cTn id="27" presetClass="entr" nodeType="afterEffect" presetID="9" grpId="7" fill="hold">
+                                  <p:stCondLst>
+                                    <p:cond delay="0"/>
+                                  </p:stCondLst>
+                                  <p:iterate type="el" backwards="0">
+                                    <p:tmAbs val="0"/>
+                                  </p:iterate>
+                                  <p:childTnLst>
+                                    <p:set>
+                                      <p:cBhvr>
+                                        <p:cTn id="28" fill="hold"/>
+                                        <p:tgtEl>
+                                          <p:spTgt spid="196"/>
+                                        </p:tgtEl>
+                                        <p:attrNameLst>
+                                          <p:attrName>style.visibility</p:attrName>
+                                        </p:attrNameLst>
+                                      </p:cBhvr>
+                                      <p:to>
+                                        <p:strVal val="visible"/>
+                                      </p:to>
+                                    </p:set>
+                                    <p:animEffect filter="dissolve" transition="in">
+                                      <p:cBhvr>
+                                        <p:cTn id="29" dur="799"/>
+                                        <p:tgtEl>
+                                          <p:spTgt spid="196"/>
+                                        </p:tgtEl>
+                                      </p:cBhvr>
+                                    </p:animEffect>
+                                  </p:childTnLst>
+                                </p:cTn>
+                              </p:par>
+                            </p:childTnLst>
+                          </p:cTn>
+                        </p:par>
+                      </p:childTnLst>
+                    </p:cTn>
+                  </p:par>
+                  <p:par>
+                    <p:cTn id="30" fill="hold">
+                      <p:stCondLst>
+                        <p:cond delay="indefinite"/>
+                      </p:stCondLst>
+                      <p:childTnLst>
+                        <p:par>
+                          <p:cTn id="31" fill="hold">
+                            <p:stCondLst>
+                              <p:cond delay="0"/>
+                            </p:stCondLst>
+                            <p:childTnLst>
+                              <p:par>
+                                <p:cTn id="32" presetClass="emph" nodeType="clickEffect" presetSubtype="0" presetID="6" grpId="8" accel="50000" decel="50000" fill="hold">
+                                  <p:stCondLst>
+                                    <p:cond delay="0"/>
+                                  </p:stCondLst>
+                                  <p:childTnLst>
+                                    <p:animScale>
+                                      <p:cBhvr>
+                                        <p:cTn id="33" dur="1000" fill="hold"/>
+                                        <p:tgtEl>
+                                          <p:spTgt spid="196"/>
+                                        </p:tgtEl>
+                                      </p:cBhvr>
+                                      <p:by x="20000" y="20000"/>
+                                    </p:animScale>
+                                  </p:childTnLst>
+                                </p:cTn>
+                              </p:par>
+                            </p:childTnLst>
+                          </p:cTn>
+                        </p:par>
+                        <p:par>
+                          <p:cTn id="34" fill="hold">
+                            <p:stCondLst>
+                              <p:cond delay="0"/>
+                            </p:stCondLst>
+                            <p:childTnLst>
+                              <p:par>
+                                <p:cTn id="35" presetClass="path" nodeType="withEffect" presetSubtype="0" presetID="-1" grpId="9" accel="50000" decel="50000" fill="hold">
+                                  <p:stCondLst>
+                                    <p:cond delay="0"/>
+                                  </p:stCondLst>
+                                  <p:childTnLst>
+                                    <p:animMotion path="M 0.000000 0.000000 L 0.110606 0.372410" origin="layout" pathEditMode="relative">
+                                      <p:cBhvr>
+                                        <p:cTn id="36" dur="1000" fill="hold"/>
+                                        <p:tgtEl>
+                                          <p:spTgt spid="196"/>
+                                        </p:tgtEl>
+                                        <p:attrNameLst>
+                                          <p:attrName>ppt_x</p:attrName>
+                                          <p:attrName>ppt_y</p:attrName>
+                                        </p:attrNameLst>
+                                      </p:cBhvr>
+                                    </p:animMotion>
+                                  </p:childTnLst>
+                                </p:cTn>
+                              </p:par>
+                            </p:childTnLst>
+                          </p:cTn>
+                        </p:par>
+                        <p:par>
+                          <p:cTn id="37" fill="hold">
+                            <p:stCondLst>
+                              <p:cond delay="1000"/>
+                            </p:stCondLst>
+                            <p:childTnLst>
+                              <p:par>
+                                <p:cTn id="38" presetClass="entr" nodeType="afterEffect" presetID="9" grpId="10" fill="hold">
+                                  <p:stCondLst>
+                                    <p:cond delay="0"/>
+                                  </p:stCondLst>
+                                  <p:iterate type="el" backwards="0">
+                                    <p:tmAbs val="0"/>
+                                  </p:iterate>
+                                  <p:childTnLst>
+                                    <p:set>
+                                      <p:cBhvr>
+                                        <p:cTn id="39" fill="hold"/>
+                                        <p:tgtEl>
+                                          <p:spTgt spid="197"/>
+                                        </p:tgtEl>
+                                        <p:attrNameLst>
+                                          <p:attrName>style.visibility</p:attrName>
+                                        </p:attrNameLst>
+                                      </p:cBhvr>
+                                      <p:to>
+                                        <p:strVal val="visible"/>
+                                      </p:to>
+                                    </p:set>
+                                    <p:animEffect filter="dissolve" transition="in">
+                                      <p:cBhvr>
+                                        <p:cTn id="40" dur="800"/>
+                                        <p:tgtEl>
+                                          <p:spTgt spid="197"/>
+                                        </p:tgtEl>
+                                      </p:cBhvr>
+                                    </p:animEffect>
+                                  </p:childTnLst>
+                                </p:cTn>
+                              </p:par>
+                            </p:childTnLst>
+                          </p:cTn>
+                        </p:par>
+                      </p:childTnLst>
+                    </p:cTn>
+                  </p:par>
+                  <p:par>
+                    <p:cTn id="41" fill="hold">
+                      <p:stCondLst>
+                        <p:cond delay="indefinite"/>
+                      </p:stCondLst>
+                      <p:childTnLst>
+                        <p:par>
+                          <p:cTn id="42" fill="hold">
+                            <p:stCondLst>
+                              <p:cond delay="0"/>
+                            </p:stCondLst>
+                            <p:childTnLst>
+                              <p:par>
+                                <p:cTn id="43" presetClass="emph" nodeType="clickEffect" presetSubtype="0" presetID="6" grpId="11" accel="50000" decel="50000" fill="hold">
+                                  <p:stCondLst>
+                                    <p:cond delay="0"/>
+                                  </p:stCondLst>
+                                  <p:childTnLst>
+                                    <p:animScale>
+                                      <p:cBhvr>
+                                        <p:cTn id="44" dur="1000" fill="hold"/>
+                                        <p:tgtEl>
+                                          <p:spTgt spid="197"/>
+                                        </p:tgtEl>
+                                      </p:cBhvr>
+                                      <p:by x="20000" y="20000"/>
+                                    </p:animScale>
+                                  </p:childTnLst>
+                                </p:cTn>
+                              </p:par>
+                            </p:childTnLst>
+                          </p:cTn>
+                        </p:par>
+                        <p:par>
+                          <p:cTn id="45" fill="hold">
+                            <p:stCondLst>
+                              <p:cond delay="0"/>
+                            </p:stCondLst>
+                            <p:childTnLst>
+                              <p:par>
+                                <p:cTn id="46" presetClass="path" nodeType="withEffect" presetSubtype="0" presetID="-1" grpId="12" accel="50000" decel="50000" fill="hold">
+                                  <p:stCondLst>
+                                    <p:cond delay="0"/>
+                                  </p:stCondLst>
+                                  <p:childTnLst>
+                                    <p:animMotion path="M 0.000000 0.000000 L 0.358500 0.364961" origin="layout" pathEditMode="relative">
+                                      <p:cBhvr>
+                                        <p:cTn id="47" dur="1000" fill="hold"/>
+                                        <p:tgtEl>
+                                          <p:spTgt spid="197"/>
+                                        </p:tgtEl>
+                                        <p:attrNameLst>
+                                          <p:attrName>ppt_x</p:attrName>
+                                          <p:attrName>ppt_y</p:attrName>
+                                        </p:attrNameLst>
+                                      </p:cBhvr>
+                                    </p:animMotion>
                                   </p:childTnLst>
                                 </p:cTn>
                               </p:par>
@@ -12147,6 +12740,13 @@
     </p:tnLst>
     <p:bldLst>
       <p:bldP build="whole" bldLvl="1" animBg="1" rev="0" advAuto="0" spid="194" grpId="1"/>
+      <p:bldP build="whole" bldLvl="1" animBg="1" rev="0" advAuto="0" spid="194" grpId="2"/>
+      <p:bldP build="whole" bldLvl="1" animBg="1" rev="0" advAuto="0" spid="196" grpId="7"/>
+      <p:bldP build="whole" bldLvl="1" animBg="1" rev="0" advAuto="0" spid="196" grpId="8"/>
+      <p:bldP build="whole" bldLvl="1" animBg="1" rev="0" advAuto="0" spid="197" grpId="10"/>
+      <p:bldP build="whole" bldLvl="1" animBg="1" rev="0" advAuto="0" spid="197" grpId="11"/>
+      <p:bldP build="whole" bldLvl="1" animBg="1" rev="0" advAuto="0" spid="195" grpId="4"/>
+      <p:bldP build="whole" bldLvl="1" animBg="1" rev="0" advAuto="0" spid="195" grpId="5"/>
     </p:bldLst>
   </p:timing>
 </p:sld>
@@ -12171,7 +12771,7 @@
       </p:grpSpPr>
       <p:sp>
         <p:nvSpPr>
-          <p:cNvPr id="196" name="Répartition des taches"/>
+          <p:cNvPr id="199" name="Répartition des tâches"/>
           <p:cNvSpPr txBox="1"/>
           <p:nvPr/>
         </p:nvSpPr>
@@ -12209,14 +12809,14 @@
           <a:p>
             <a:pPr/>
             <a:r>
-              <a:t>Répartition des taches</a:t>
+              <a:t>Répartition des tâches</a:t>
             </a:r>
           </a:p>
         </p:txBody>
       </p:sp>
       <p:sp>
         <p:nvSpPr>
-          <p:cNvPr id="197" name="Numéro de diapositive"/>
+          <p:cNvPr id="200" name="Numéro de diapositive"/>
           <p:cNvSpPr txBox="1"/>
           <p:nvPr>
             <p:ph type="sldNum" sz="quarter" idx="2"/>
@@ -12254,7 +12854,7 @@
       </p:sp>
       <p:sp>
         <p:nvSpPr>
-          <p:cNvPr id="198" name="Texte"/>
+          <p:cNvPr id="201" name="Texte"/>
           <p:cNvSpPr txBox="1"/>
           <p:nvPr/>
         </p:nvSpPr>
@@ -12298,93 +12898,6 @@
       </p:sp>
       <p:pic>
         <p:nvPicPr>
-          <p:cNvPr id="199" name="boss.png" descr="boss.png"/>
-          <p:cNvPicPr>
-            <a:picLocks noChangeAspect="1"/>
-          </p:cNvPicPr>
-          <p:nvPr/>
-        </p:nvPicPr>
-        <p:blipFill>
-          <a:blip r:embed="rId2">
-            <a:extLst/>
-          </a:blip>
-          <a:stretch>
-            <a:fillRect/>
-          </a:stretch>
-        </p:blipFill>
-        <p:spPr>
-          <a:xfrm>
-            <a:off x="1205633" y="2184041"/>
-            <a:ext cx="1293354" cy="1293354"/>
-          </a:xfrm>
-          <a:prstGeom prst="rect">
-            <a:avLst/>
-          </a:prstGeom>
-          <a:ln w="12700">
-            <a:miter lim="400000"/>
-          </a:ln>
-        </p:spPr>
-      </p:pic>
-      <p:pic>
-        <p:nvPicPr>
-          <p:cNvPr id="200" name="boss.png" descr="boss.png"/>
-          <p:cNvPicPr>
-            <a:picLocks noChangeAspect="1"/>
-          </p:cNvPicPr>
-          <p:nvPr/>
-        </p:nvPicPr>
-        <p:blipFill>
-          <a:blip r:embed="rId2">
-            <a:extLst/>
-          </a:blip>
-          <a:stretch>
-            <a:fillRect/>
-          </a:stretch>
-        </p:blipFill>
-        <p:spPr>
-          <a:xfrm>
-            <a:off x="1205633" y="4422409"/>
-            <a:ext cx="1293354" cy="1293354"/>
-          </a:xfrm>
-          <a:prstGeom prst="rect">
-            <a:avLst/>
-          </a:prstGeom>
-          <a:ln w="12700">
-            <a:miter lim="400000"/>
-          </a:ln>
-        </p:spPr>
-      </p:pic>
-      <p:pic>
-        <p:nvPicPr>
-          <p:cNvPr id="201" name="boss.png" descr="boss.png"/>
-          <p:cNvPicPr>
-            <a:picLocks noChangeAspect="1"/>
-          </p:cNvPicPr>
-          <p:nvPr/>
-        </p:nvPicPr>
-        <p:blipFill>
-          <a:blip r:embed="rId2">
-            <a:extLst/>
-          </a:blip>
-          <a:stretch>
-            <a:fillRect/>
-          </a:stretch>
-        </p:blipFill>
-        <p:spPr>
-          <a:xfrm>
-            <a:off x="1205633" y="6660776"/>
-            <a:ext cx="1293354" cy="1293354"/>
-          </a:xfrm>
-          <a:prstGeom prst="rect">
-            <a:avLst/>
-          </a:prstGeom>
-          <a:ln w="12700">
-            <a:miter lim="400000"/>
-          </a:ln>
-        </p:spPr>
-      </p:pic>
-      <p:pic>
-        <p:nvPicPr>
           <p:cNvPr id="202" name="boss.png" descr="boss.png"/>
           <p:cNvPicPr>
             <a:picLocks noChangeAspect="1"/>
@@ -12401,7 +12914,7 @@
         </p:blipFill>
         <p:spPr>
           <a:xfrm>
-            <a:off x="7058570" y="2184041"/>
+            <a:off x="1205633" y="2184041"/>
             <a:ext cx="1293354" cy="1293354"/>
           </a:xfrm>
           <a:prstGeom prst="rect">
@@ -12430,7 +12943,7 @@
         </p:blipFill>
         <p:spPr>
           <a:xfrm>
-            <a:off x="7058570" y="4422409"/>
+            <a:off x="1205633" y="4422409"/>
             <a:ext cx="1293354" cy="1293354"/>
           </a:xfrm>
           <a:prstGeom prst="rect">
@@ -12459,6 +12972,93 @@
         </p:blipFill>
         <p:spPr>
           <a:xfrm>
+            <a:off x="1205633" y="6660776"/>
+            <a:ext cx="1293354" cy="1293354"/>
+          </a:xfrm>
+          <a:prstGeom prst="rect">
+            <a:avLst/>
+          </a:prstGeom>
+          <a:ln w="12700">
+            <a:miter lim="400000"/>
+          </a:ln>
+        </p:spPr>
+      </p:pic>
+      <p:pic>
+        <p:nvPicPr>
+          <p:cNvPr id="205" name="boss.png" descr="boss.png"/>
+          <p:cNvPicPr>
+            <a:picLocks noChangeAspect="1"/>
+          </p:cNvPicPr>
+          <p:nvPr/>
+        </p:nvPicPr>
+        <p:blipFill>
+          <a:blip r:embed="rId2">
+            <a:extLst/>
+          </a:blip>
+          <a:stretch>
+            <a:fillRect/>
+          </a:stretch>
+        </p:blipFill>
+        <p:spPr>
+          <a:xfrm>
+            <a:off x="7058570" y="2184041"/>
+            <a:ext cx="1293354" cy="1293354"/>
+          </a:xfrm>
+          <a:prstGeom prst="rect">
+            <a:avLst/>
+          </a:prstGeom>
+          <a:ln w="12700">
+            <a:miter lim="400000"/>
+          </a:ln>
+        </p:spPr>
+      </p:pic>
+      <p:pic>
+        <p:nvPicPr>
+          <p:cNvPr id="206" name="boss.png" descr="boss.png"/>
+          <p:cNvPicPr>
+            <a:picLocks noChangeAspect="1"/>
+          </p:cNvPicPr>
+          <p:nvPr/>
+        </p:nvPicPr>
+        <p:blipFill>
+          <a:blip r:embed="rId2">
+            <a:extLst/>
+          </a:blip>
+          <a:stretch>
+            <a:fillRect/>
+          </a:stretch>
+        </p:blipFill>
+        <p:spPr>
+          <a:xfrm>
+            <a:off x="7058570" y="4422409"/>
+            <a:ext cx="1293354" cy="1293354"/>
+          </a:xfrm>
+          <a:prstGeom prst="rect">
+            <a:avLst/>
+          </a:prstGeom>
+          <a:ln w="12700">
+            <a:miter lim="400000"/>
+          </a:ln>
+        </p:spPr>
+      </p:pic>
+      <p:pic>
+        <p:nvPicPr>
+          <p:cNvPr id="207" name="boss.png" descr="boss.png"/>
+          <p:cNvPicPr>
+            <a:picLocks noChangeAspect="1"/>
+          </p:cNvPicPr>
+          <p:nvPr/>
+        </p:nvPicPr>
+        <p:blipFill>
+          <a:blip r:embed="rId2">
+            <a:extLst/>
+          </a:blip>
+          <a:stretch>
+            <a:fillRect/>
+          </a:stretch>
+        </p:blipFill>
+        <p:spPr>
+          <a:xfrm>
             <a:off x="7058570" y="6660776"/>
             <a:ext cx="1293354" cy="1293354"/>
           </a:xfrm>
@@ -12472,7 +13072,7 @@
       </p:pic>
       <p:sp>
         <p:nvSpPr>
-          <p:cNvPr id="205" name="Paul"/>
+          <p:cNvPr id="208" name="Paul"/>
           <p:cNvSpPr txBox="1"/>
           <p:nvPr/>
         </p:nvSpPr>
@@ -12512,7 +13112,7 @@
       </p:sp>
       <p:sp>
         <p:nvSpPr>
-          <p:cNvPr id="206" name="Création de la classe jeu…"/>
+          <p:cNvPr id="209" name="Création de la classe jeu…"/>
           <p:cNvSpPr txBox="1"/>
           <p:nvPr/>
         </p:nvSpPr>
@@ -12576,7 +13176,7 @@
       </p:sp>
       <p:sp>
         <p:nvSpPr>
-          <p:cNvPr id="207" name="Création de la classe Plateau…"/>
+          <p:cNvPr id="210" name="Création de la classe Plateau…"/>
           <p:cNvSpPr txBox="1"/>
           <p:nvPr/>
         </p:nvSpPr>
@@ -12658,7 +13258,7 @@
       </p:sp>
       <p:sp>
         <p:nvSpPr>
-          <p:cNvPr id="208" name="Création de la classe Roi…"/>
+          <p:cNvPr id="211" name="Création de la classe Roi…"/>
           <p:cNvSpPr txBox="1"/>
           <p:nvPr/>
         </p:nvSpPr>
@@ -12714,7 +13314,7 @@
       </p:sp>
       <p:sp>
         <p:nvSpPr>
-          <p:cNvPr id="209" name="Chef de projet…"/>
+          <p:cNvPr id="212" name="Chef de projet…"/>
           <p:cNvSpPr txBox="1"/>
           <p:nvPr/>
         </p:nvSpPr>
@@ -12783,7 +13383,7 @@
       </p:sp>
       <p:sp>
         <p:nvSpPr>
-          <p:cNvPr id="210" name="David"/>
+          <p:cNvPr id="213" name="David"/>
           <p:cNvSpPr txBox="1"/>
           <p:nvPr/>
         </p:nvSpPr>
@@ -12823,7 +13423,7 @@
       </p:sp>
       <p:sp>
         <p:nvSpPr>
-          <p:cNvPr id="211" name="Théo"/>
+          <p:cNvPr id="214" name="Théo"/>
           <p:cNvSpPr txBox="1"/>
           <p:nvPr/>
         </p:nvSpPr>
@@ -12863,7 +13463,7 @@
       </p:sp>
       <p:sp>
         <p:nvSpPr>
-          <p:cNvPr id="212" name="Benjamin"/>
+          <p:cNvPr id="215" name="Benjamin"/>
           <p:cNvSpPr txBox="1"/>
           <p:nvPr/>
         </p:nvSpPr>
@@ -12903,7 +13503,7 @@
       </p:sp>
       <p:sp>
         <p:nvSpPr>
-          <p:cNvPr id="213" name="Alexis"/>
+          <p:cNvPr id="216" name="Alexis"/>
           <p:cNvSpPr txBox="1"/>
           <p:nvPr/>
         </p:nvSpPr>
@@ -12943,7 +13543,7 @@
       </p:sp>
       <p:sp>
         <p:nvSpPr>
-          <p:cNvPr id="214" name="Victor"/>
+          <p:cNvPr id="217" name="Victor"/>
           <p:cNvSpPr txBox="1"/>
           <p:nvPr/>
         </p:nvSpPr>
@@ -12983,7 +13583,7 @@
       </p:sp>
       <p:sp>
         <p:nvSpPr>
-          <p:cNvPr id="215" name="Création de la classe Fou…"/>
+          <p:cNvPr id="218" name="Création de la classe Fou…"/>
           <p:cNvSpPr txBox="1"/>
           <p:nvPr/>
         </p:nvSpPr>
@@ -13039,7 +13639,7 @@
       </p:sp>
       <p:sp>
         <p:nvSpPr>
-          <p:cNvPr id="216" name="Création de la classe Dame…"/>
+          <p:cNvPr id="219" name="Création de la classe Dame…"/>
           <p:cNvSpPr txBox="1"/>
           <p:nvPr/>
         </p:nvSpPr>

</xml_diff>

<commit_message>
diapo presque fin mdrrr
</commit_message>
<xml_diff>
--- a/doc/diapo pour les bouseux.pptx
+++ b/doc/diapo pour les bouseux.pptx
@@ -3273,7 +3273,7 @@
       </p:grpSpPr>
       <p:sp>
         <p:nvSpPr>
-          <p:cNvPr id="221" name="Bilan"/>
+          <p:cNvPr id="222" name="Bilan"/>
           <p:cNvSpPr txBox="1"/>
           <p:nvPr/>
         </p:nvSpPr>
@@ -3318,7 +3318,7 @@
       </p:sp>
       <p:sp>
         <p:nvSpPr>
-          <p:cNvPr id="222" name="Numéro de diapositive"/>
+          <p:cNvPr id="223" name="Numéro de diapositive"/>
           <p:cNvSpPr txBox="1"/>
           <p:nvPr>
             <p:ph type="sldNum" sz="quarter" idx="2"/>
@@ -3356,7 +3356,7 @@
       </p:sp>
       <p:sp>
         <p:nvSpPr>
-          <p:cNvPr id="223" name="Technique :"/>
+          <p:cNvPr id="224" name="Technique :"/>
           <p:cNvSpPr txBox="1"/>
           <p:nvPr/>
         </p:nvSpPr>
@@ -3399,7 +3399,7 @@
       </p:sp>
       <p:sp>
         <p:nvSpPr>
-          <p:cNvPr id="224" name="- Programme fonctionnel"/>
+          <p:cNvPr id="225" name="- Programme fonctionnel"/>
           <p:cNvSpPr txBox="1"/>
           <p:nvPr/>
         </p:nvSpPr>
@@ -3442,7 +3442,7 @@
       </p:sp>
       <p:sp>
         <p:nvSpPr>
-          <p:cNvPr id="225" name="- Possible d’améliorer l’aspect graphique"/>
+          <p:cNvPr id="226" name="- Possible d’améliorer l’aspect graphique"/>
           <p:cNvSpPr txBox="1"/>
           <p:nvPr/>
         </p:nvSpPr>
@@ -3485,7 +3485,7 @@
       </p:sp>
       <p:sp>
         <p:nvSpPr>
-          <p:cNvPr id="226" name="- Ajout d’une IA pour jouer seul"/>
+          <p:cNvPr id="227" name="- Ajout d’une IA pour jouer seul"/>
           <p:cNvSpPr txBox="1"/>
           <p:nvPr/>
         </p:nvSpPr>
@@ -3528,7 +3528,7 @@
       </p:sp>
       <p:sp>
         <p:nvSpPr>
-          <p:cNvPr id="227" name="Humain :"/>
+          <p:cNvPr id="228" name="Humain :"/>
           <p:cNvSpPr txBox="1"/>
           <p:nvPr/>
         </p:nvSpPr>
@@ -3571,7 +3571,7 @@
       </p:sp>
       <p:sp>
         <p:nvSpPr>
-          <p:cNvPr id="228" name="- Difficile de se coordonner"/>
+          <p:cNvPr id="229" name="- Difficile de se coordonner"/>
           <p:cNvSpPr txBox="1"/>
           <p:nvPr/>
         </p:nvSpPr>
@@ -3614,7 +3614,7 @@
       </p:sp>
       <p:sp>
         <p:nvSpPr>
-          <p:cNvPr id="229" name="- Bonne entente et bonne ambiance de travail"/>
+          <p:cNvPr id="230" name="- Bonne entente et bonne ambiance de travail"/>
           <p:cNvSpPr txBox="1"/>
           <p:nvPr/>
         </p:nvSpPr>
@@ -3657,7 +3657,7 @@
       </p:sp>
       <p:sp>
         <p:nvSpPr>
-          <p:cNvPr id="230" name="Pédagogique :"/>
+          <p:cNvPr id="231" name="Pédagogique :"/>
           <p:cNvSpPr txBox="1"/>
           <p:nvPr/>
         </p:nvSpPr>
@@ -3700,7 +3700,7 @@
       </p:sp>
       <p:sp>
         <p:nvSpPr>
-          <p:cNvPr id="231" name="- Meilleure connaissance du jeu d’échecs"/>
+          <p:cNvPr id="232" name="- Meilleure connaissance du jeu d’échecs"/>
           <p:cNvSpPr txBox="1"/>
           <p:nvPr/>
         </p:nvSpPr>
@@ -3743,7 +3743,7 @@
       </p:sp>
       <p:sp>
         <p:nvSpPr>
-          <p:cNvPr id="232" name="- Utilisation de GitKraken pour la gestion du code"/>
+          <p:cNvPr id="233" name="- Utilisation de GitKraken pour la gestion du code"/>
           <p:cNvSpPr txBox="1"/>
           <p:nvPr/>
         </p:nvSpPr>
@@ -3786,7 +3786,7 @@
       </p:sp>
       <p:sp>
         <p:nvSpPr>
-          <p:cNvPr id="233" name="- Utilisation d’une grande partie des connaissances"/>
+          <p:cNvPr id="234" name="- Utilisation d’une grande partie des connaissances"/>
           <p:cNvSpPr txBox="1"/>
           <p:nvPr/>
         </p:nvSpPr>
@@ -3829,7 +3829,7 @@
       </p:sp>
       <p:sp>
         <p:nvSpPr>
-          <p:cNvPr id="234" name="- Apprentissage de la répartition du travail"/>
+          <p:cNvPr id="235" name="- Apprentissage de la répartition du travail"/>
           <p:cNvSpPr txBox="1"/>
           <p:nvPr/>
         </p:nvSpPr>
@@ -3872,7 +3872,7 @@
       </p:sp>
       <p:pic>
         <p:nvPicPr>
-          <p:cNvPr id="235" name="computer.png" descr="computer.png"/>
+          <p:cNvPr id="236" name="computer.png" descr="computer.png"/>
           <p:cNvPicPr>
             <a:picLocks noChangeAspect="1"/>
           </p:cNvPicPr>
@@ -3901,7 +3901,7 @@
       </p:pic>
       <p:pic>
         <p:nvPicPr>
-          <p:cNvPr id="236" name="artificial-intelligence.png" descr="artificial-intelligence.png"/>
+          <p:cNvPr id="237" name="artificial-intelligence.png" descr="artificial-intelligence.png"/>
           <p:cNvPicPr>
             <a:picLocks noChangeAspect="1"/>
           </p:cNvPicPr>
@@ -3930,7 +3930,7 @@
       </p:pic>
       <p:pic>
         <p:nvPicPr>
-          <p:cNvPr id="237" name="code.png" descr="code.png"/>
+          <p:cNvPr id="238" name="code.png" descr="code.png"/>
           <p:cNvPicPr>
             <a:picLocks noChangeAspect="1"/>
           </p:cNvPicPr>
@@ -3959,7 +3959,7 @@
       </p:pic>
       <p:pic>
         <p:nvPicPr>
-          <p:cNvPr id="238" name="laptop.png" descr="laptop.png"/>
+          <p:cNvPr id="239" name="laptop.png" descr="laptop.png"/>
           <p:cNvPicPr>
             <a:picLocks noChangeAspect="1"/>
           </p:cNvPicPr>
@@ -3988,7 +3988,7 @@
       </p:pic>
       <p:sp>
         <p:nvSpPr>
-          <p:cNvPr id="239" name="- Apprentissage de la communication en groupe"/>
+          <p:cNvPr id="240" name="- Apprentissage de la communication en groupe"/>
           <p:cNvSpPr txBox="1"/>
           <p:nvPr/>
         </p:nvSpPr>
@@ -4031,7 +4031,7 @@
       </p:sp>
       <p:pic>
         <p:nvPicPr>
-          <p:cNvPr id="240" name="calendar.png" descr="calendar.png"/>
+          <p:cNvPr id="241" name="calendar.png" descr="calendar.png"/>
           <p:cNvPicPr>
             <a:picLocks noChangeAspect="1"/>
           </p:cNvPicPr>
@@ -4060,7 +4060,7 @@
       </p:pic>
       <p:pic>
         <p:nvPicPr>
-          <p:cNvPr id="241" name="employees.png" descr="employees.png"/>
+          <p:cNvPr id="242" name="employees.png" descr="employees.png"/>
           <p:cNvPicPr>
             <a:picLocks noChangeAspect="1"/>
           </p:cNvPicPr>
@@ -4089,7 +4089,7 @@
       </p:pic>
       <p:pic>
         <p:nvPicPr>
-          <p:cNvPr id="242" name="speak.png" descr="speak.png"/>
+          <p:cNvPr id="243" name="speak.png" descr="speak.png"/>
           <p:cNvPicPr>
             <a:picLocks noChangeAspect="1"/>
           </p:cNvPicPr>
@@ -4118,7 +4118,7 @@
       </p:pic>
       <p:pic>
         <p:nvPicPr>
-          <p:cNvPr id="243" name="teamwork.png" descr="teamwork.png"/>
+          <p:cNvPr id="244" name="teamwork.png" descr="teamwork.png"/>
           <p:cNvPicPr>
             <a:picLocks noChangeAspect="1"/>
           </p:cNvPicPr>
@@ -4147,7 +4147,7 @@
       </p:pic>
       <p:pic>
         <p:nvPicPr>
-          <p:cNvPr id="244" name="bookshelf.png" descr="bookshelf.png"/>
+          <p:cNvPr id="245" name="bookshelf.png" descr="bookshelf.png"/>
           <p:cNvPicPr>
             <a:picLocks noChangeAspect="1"/>
           </p:cNvPicPr>
@@ -4176,7 +4176,7 @@
       </p:pic>
       <p:pic>
         <p:nvPicPr>
-          <p:cNvPr id="245" name="chat.png" descr="chat.png"/>
+          <p:cNvPr id="246" name="chat.png" descr="chat.png"/>
           <p:cNvPicPr>
             <a:picLocks noChangeAspect="1"/>
           </p:cNvPicPr>
@@ -4205,7 +4205,7 @@
       </p:pic>
       <p:pic>
         <p:nvPicPr>
-          <p:cNvPr id="246" name="chess-board.png" descr="chess-board.png"/>
+          <p:cNvPr id="247" name="chess-board.png" descr="chess-board.png"/>
           <p:cNvPicPr>
             <a:picLocks noChangeAspect="1"/>
           </p:cNvPicPr>
@@ -4234,7 +4234,7 @@
       </p:pic>
       <p:pic>
         <p:nvPicPr>
-          <p:cNvPr id="247" name="classroom.png" descr="classroom.png"/>
+          <p:cNvPr id="248" name="classroom.png" descr="classroom.png"/>
           <p:cNvPicPr>
             <a:picLocks noChangeAspect="1"/>
           </p:cNvPicPr>
@@ -4263,7 +4263,7 @@
       </p:pic>
       <p:pic>
         <p:nvPicPr>
-          <p:cNvPr id="248" name="GitKraken-Logo.png" descr="GitKraken-Logo.png"/>
+          <p:cNvPr id="249" name="GitKraken-Logo.png" descr="GitKraken-Logo.png"/>
           <p:cNvPicPr>
             <a:picLocks noChangeAspect="1"/>
           </p:cNvPicPr>
@@ -4343,7 +4343,7 @@
                                       <p:cBhvr>
                                         <p:cTn id="6" fill="hold"/>
                                         <p:tgtEl>
-                                          <p:spTgt spid="223"/>
+                                          <p:spTgt spid="224"/>
                                         </p:tgtEl>
                                         <p:attrNameLst>
                                           <p:attrName>style.visibility</p:attrName>
@@ -4357,7 +4357,7 @@
                                       <p:cBhvr>
                                         <p:cTn id="7" dur="799"/>
                                         <p:tgtEl>
-                                          <p:spTgt spid="223"/>
+                                          <p:spTgt spid="224"/>
                                         </p:tgtEl>
                                       </p:cBhvr>
                                     </p:animEffect>
@@ -4386,7 +4386,7 @@
                                       <p:cBhvr>
                                         <p:cTn id="10" fill="hold"/>
                                         <p:tgtEl>
-                                          <p:spTgt spid="235"/>
+                                          <p:spTgt spid="236"/>
                                         </p:tgtEl>
                                         <p:attrNameLst>
                                           <p:attrName>style.visibility</p:attrName>
@@ -4400,7 +4400,7 @@
                                       <p:cBhvr>
                                         <p:cTn id="11" dur="799"/>
                                         <p:tgtEl>
-                                          <p:spTgt spid="235"/>
+                                          <p:spTgt spid="236"/>
                                         </p:tgtEl>
                                       </p:cBhvr>
                                     </p:animEffect>
@@ -4438,7 +4438,7 @@
                                       <p:cBhvr>
                                         <p:cTn id="15" fill="hold"/>
                                         <p:tgtEl>
-                                          <p:spTgt spid="224"/>
+                                          <p:spTgt spid="225"/>
                                         </p:tgtEl>
                                         <p:attrNameLst>
                                           <p:attrName>style.visibility</p:attrName>
@@ -4452,7 +4452,7 @@
                                       <p:cBhvr>
                                         <p:cTn id="16" dur="799"/>
                                         <p:tgtEl>
-                                          <p:spTgt spid="224"/>
+                                          <p:spTgt spid="225"/>
                                         </p:tgtEl>
                                       </p:cBhvr>
                                     </p:animEffect>
@@ -4481,7 +4481,7 @@
                                       <p:cBhvr>
                                         <p:cTn id="19" fill="hold"/>
                                         <p:tgtEl>
-                                          <p:spTgt spid="237"/>
+                                          <p:spTgt spid="238"/>
                                         </p:tgtEl>
                                         <p:attrNameLst>
                                           <p:attrName>style.visibility</p:attrName>
@@ -4495,7 +4495,7 @@
                                       <p:cBhvr>
                                         <p:cTn id="20" dur="799"/>
                                         <p:tgtEl>
-                                          <p:spTgt spid="237"/>
+                                          <p:spTgt spid="238"/>
                                         </p:tgtEl>
                                       </p:cBhvr>
                                     </p:animEffect>
@@ -4533,7 +4533,7 @@
                                       <p:cBhvr>
                                         <p:cTn id="24" fill="hold"/>
                                         <p:tgtEl>
-                                          <p:spTgt spid="225"/>
+                                          <p:spTgt spid="226"/>
                                         </p:tgtEl>
                                         <p:attrNameLst>
                                           <p:attrName>style.visibility</p:attrName>
@@ -4547,7 +4547,7 @@
                                       <p:cBhvr>
                                         <p:cTn id="25" dur="800"/>
                                         <p:tgtEl>
-                                          <p:spTgt spid="225"/>
+                                          <p:spTgt spid="226"/>
                                         </p:tgtEl>
                                       </p:cBhvr>
                                     </p:animEffect>
@@ -4576,7 +4576,7 @@
                                       <p:cBhvr>
                                         <p:cTn id="28" fill="hold"/>
                                         <p:tgtEl>
-                                          <p:spTgt spid="238"/>
+                                          <p:spTgt spid="239"/>
                                         </p:tgtEl>
                                         <p:attrNameLst>
                                           <p:attrName>style.visibility</p:attrName>
@@ -4590,7 +4590,7 @@
                                       <p:cBhvr>
                                         <p:cTn id="29" dur="799"/>
                                         <p:tgtEl>
-                                          <p:spTgt spid="238"/>
+                                          <p:spTgt spid="239"/>
                                         </p:tgtEl>
                                       </p:cBhvr>
                                     </p:animEffect>
@@ -4628,7 +4628,7 @@
                                       <p:cBhvr>
                                         <p:cTn id="33" fill="hold"/>
                                         <p:tgtEl>
-                                          <p:spTgt spid="226"/>
+                                          <p:spTgt spid="227"/>
                                         </p:tgtEl>
                                         <p:attrNameLst>
                                           <p:attrName>style.visibility</p:attrName>
@@ -4642,7 +4642,7 @@
                                       <p:cBhvr>
                                         <p:cTn id="34" dur="800"/>
                                         <p:tgtEl>
-                                          <p:spTgt spid="226"/>
+                                          <p:spTgt spid="227"/>
                                         </p:tgtEl>
                                       </p:cBhvr>
                                     </p:animEffect>
@@ -4671,7 +4671,7 @@
                                       <p:cBhvr>
                                         <p:cTn id="37" fill="hold"/>
                                         <p:tgtEl>
-                                          <p:spTgt spid="236"/>
+                                          <p:spTgt spid="237"/>
                                         </p:tgtEl>
                                         <p:attrNameLst>
                                           <p:attrName>style.visibility</p:attrName>
@@ -4685,7 +4685,7 @@
                                       <p:cBhvr>
                                         <p:cTn id="38" dur="799"/>
                                         <p:tgtEl>
-                                          <p:spTgt spid="236"/>
+                                          <p:spTgt spid="237"/>
                                         </p:tgtEl>
                                       </p:cBhvr>
                                     </p:animEffect>
@@ -4723,7 +4723,7 @@
                                       <p:cBhvr>
                                         <p:cTn id="42" dur="1000" fill="hold"/>
                                         <p:tgtEl>
-                                          <p:spTgt spid="223"/>
+                                          <p:spTgt spid="224"/>
                                         </p:tgtEl>
                                         <p:attrNameLst>
                                           <p:attrName>ppt_w</p:attrName>
@@ -4746,7 +4746,7 @@
                                       <p:cBhvr>
                                         <p:cTn id="43" dur="1000" fill="hold"/>
                                         <p:tgtEl>
-                                          <p:spTgt spid="223"/>
+                                          <p:spTgt spid="224"/>
                                         </p:tgtEl>
                                         <p:attrNameLst>
                                           <p:attrName>ppt_h</p:attrName>
@@ -4773,7 +4773,7 @@
                                           </p:stCondLst>
                                         </p:cTn>
                                         <p:tgtEl>
-                                          <p:spTgt spid="223"/>
+                                          <p:spTgt spid="224"/>
                                         </p:tgtEl>
                                         <p:attrNameLst>
                                           <p:attrName>style.visibility</p:attrName>
@@ -4808,7 +4808,7 @@
                                       <p:cBhvr>
                                         <p:cTn id="47" dur="1000" fill="hold"/>
                                         <p:tgtEl>
-                                          <p:spTgt spid="238"/>
+                                          <p:spTgt spid="239"/>
                                         </p:tgtEl>
                                         <p:attrNameLst>
                                           <p:attrName>ppt_w</p:attrName>
@@ -4831,7 +4831,7 @@
                                       <p:cBhvr>
                                         <p:cTn id="48" dur="1000" fill="hold"/>
                                         <p:tgtEl>
-                                          <p:spTgt spid="238"/>
+                                          <p:spTgt spid="239"/>
                                         </p:tgtEl>
                                         <p:attrNameLst>
                                           <p:attrName>ppt_h</p:attrName>
@@ -4858,7 +4858,7 @@
                                           </p:stCondLst>
                                         </p:cTn>
                                         <p:tgtEl>
-                                          <p:spTgt spid="238"/>
+                                          <p:spTgt spid="239"/>
                                         </p:tgtEl>
                                         <p:attrNameLst>
                                           <p:attrName>style.visibility</p:attrName>
@@ -4893,7 +4893,7 @@
                                       <p:cBhvr>
                                         <p:cTn id="52" dur="1000" fill="hold"/>
                                         <p:tgtEl>
-                                          <p:spTgt spid="236"/>
+                                          <p:spTgt spid="237"/>
                                         </p:tgtEl>
                                         <p:attrNameLst>
                                           <p:attrName>ppt_w</p:attrName>
@@ -4916,7 +4916,7 @@
                                       <p:cBhvr>
                                         <p:cTn id="53" dur="1000" fill="hold"/>
                                         <p:tgtEl>
-                                          <p:spTgt spid="236"/>
+                                          <p:spTgt spid="237"/>
                                         </p:tgtEl>
                                         <p:attrNameLst>
                                           <p:attrName>ppt_h</p:attrName>
@@ -4943,7 +4943,7 @@
                                           </p:stCondLst>
                                         </p:cTn>
                                         <p:tgtEl>
-                                          <p:spTgt spid="236"/>
+                                          <p:spTgt spid="237"/>
                                         </p:tgtEl>
                                         <p:attrNameLst>
                                           <p:attrName>style.visibility</p:attrName>
@@ -4978,7 +4978,7 @@
                                       <p:cBhvr>
                                         <p:cTn id="57" dur="1000" fill="hold"/>
                                         <p:tgtEl>
-                                          <p:spTgt spid="237"/>
+                                          <p:spTgt spid="238"/>
                                         </p:tgtEl>
                                         <p:attrNameLst>
                                           <p:attrName>ppt_w</p:attrName>
@@ -5001,7 +5001,7 @@
                                       <p:cBhvr>
                                         <p:cTn id="58" dur="1000" fill="hold"/>
                                         <p:tgtEl>
-                                          <p:spTgt spid="237"/>
+                                          <p:spTgt spid="238"/>
                                         </p:tgtEl>
                                         <p:attrNameLst>
                                           <p:attrName>ppt_h</p:attrName>
@@ -5028,7 +5028,7 @@
                                           </p:stCondLst>
                                         </p:cTn>
                                         <p:tgtEl>
-                                          <p:spTgt spid="237"/>
+                                          <p:spTgt spid="238"/>
                                         </p:tgtEl>
                                         <p:attrNameLst>
                                           <p:attrName>style.visibility</p:attrName>
@@ -5063,7 +5063,7 @@
                                       <p:cBhvr>
                                         <p:cTn id="62" dur="1000" fill="hold"/>
                                         <p:tgtEl>
-                                          <p:spTgt spid="235"/>
+                                          <p:spTgt spid="236"/>
                                         </p:tgtEl>
                                         <p:attrNameLst>
                                           <p:attrName>ppt_w</p:attrName>
@@ -5086,7 +5086,7 @@
                                       <p:cBhvr>
                                         <p:cTn id="63" dur="1000" fill="hold"/>
                                         <p:tgtEl>
-                                          <p:spTgt spid="235"/>
+                                          <p:spTgt spid="236"/>
                                         </p:tgtEl>
                                         <p:attrNameLst>
                                           <p:attrName>ppt_h</p:attrName>
@@ -5113,7 +5113,7 @@
                                           </p:stCondLst>
                                         </p:cTn>
                                         <p:tgtEl>
-                                          <p:spTgt spid="235"/>
+                                          <p:spTgt spid="236"/>
                                         </p:tgtEl>
                                         <p:attrNameLst>
                                           <p:attrName>style.visibility</p:attrName>
@@ -5148,7 +5148,7 @@
                                       <p:cBhvr>
                                         <p:cTn id="67" dur="1000" fill="hold"/>
                                         <p:tgtEl>
-                                          <p:spTgt spid="224"/>
+                                          <p:spTgt spid="225"/>
                                         </p:tgtEl>
                                         <p:attrNameLst>
                                           <p:attrName>ppt_w</p:attrName>
@@ -5171,7 +5171,7 @@
                                       <p:cBhvr>
                                         <p:cTn id="68" dur="1000" fill="hold"/>
                                         <p:tgtEl>
-                                          <p:spTgt spid="224"/>
+                                          <p:spTgt spid="225"/>
                                         </p:tgtEl>
                                         <p:attrNameLst>
                                           <p:attrName>ppt_h</p:attrName>
@@ -5198,7 +5198,7 @@
                                           </p:stCondLst>
                                         </p:cTn>
                                         <p:tgtEl>
-                                          <p:spTgt spid="224"/>
+                                          <p:spTgt spid="225"/>
                                         </p:tgtEl>
                                         <p:attrNameLst>
                                           <p:attrName>style.visibility</p:attrName>
@@ -5233,7 +5233,7 @@
                                       <p:cBhvr>
                                         <p:cTn id="72" dur="1000" fill="hold"/>
                                         <p:tgtEl>
-                                          <p:spTgt spid="225"/>
+                                          <p:spTgt spid="226"/>
                                         </p:tgtEl>
                                         <p:attrNameLst>
                                           <p:attrName>ppt_w</p:attrName>
@@ -5256,7 +5256,7 @@
                                       <p:cBhvr>
                                         <p:cTn id="73" dur="1000" fill="hold"/>
                                         <p:tgtEl>
-                                          <p:spTgt spid="225"/>
+                                          <p:spTgt spid="226"/>
                                         </p:tgtEl>
                                         <p:attrNameLst>
                                           <p:attrName>ppt_h</p:attrName>
@@ -5283,7 +5283,7 @@
                                           </p:stCondLst>
                                         </p:cTn>
                                         <p:tgtEl>
-                                          <p:spTgt spid="225"/>
+                                          <p:spTgt spid="226"/>
                                         </p:tgtEl>
                                         <p:attrNameLst>
                                           <p:attrName>style.visibility</p:attrName>
@@ -5318,7 +5318,7 @@
                                       <p:cBhvr>
                                         <p:cTn id="77" dur="1000" fill="hold"/>
                                         <p:tgtEl>
-                                          <p:spTgt spid="226"/>
+                                          <p:spTgt spid="227"/>
                                         </p:tgtEl>
                                         <p:attrNameLst>
                                           <p:attrName>ppt_w</p:attrName>
@@ -5341,7 +5341,7 @@
                                       <p:cBhvr>
                                         <p:cTn id="78" dur="1000" fill="hold"/>
                                         <p:tgtEl>
-                                          <p:spTgt spid="226"/>
+                                          <p:spTgt spid="227"/>
                                         </p:tgtEl>
                                         <p:attrNameLst>
                                           <p:attrName>ppt_h</p:attrName>
@@ -5368,7 +5368,7 @@
                                           </p:stCondLst>
                                         </p:cTn>
                                         <p:tgtEl>
-                                          <p:spTgt spid="226"/>
+                                          <p:spTgt spid="227"/>
                                         </p:tgtEl>
                                         <p:attrNameLst>
                                           <p:attrName>style.visibility</p:attrName>
@@ -5403,7 +5403,7 @@
                                       <p:cBhvr>
                                         <p:cTn id="82" fill="hold"/>
                                         <p:tgtEl>
-                                          <p:spTgt spid="227"/>
+                                          <p:spTgt spid="228"/>
                                         </p:tgtEl>
                                         <p:attrNameLst>
                                           <p:attrName>style.visibility</p:attrName>
@@ -5417,7 +5417,7 @@
                                       <p:cBhvr>
                                         <p:cTn id="83" dur="799"/>
                                         <p:tgtEl>
-                                          <p:spTgt spid="227"/>
+                                          <p:spTgt spid="228"/>
                                         </p:tgtEl>
                                       </p:cBhvr>
                                     </p:animEffect>
@@ -5446,7 +5446,7 @@
                                       <p:cBhvr>
                                         <p:cTn id="86" fill="hold"/>
                                         <p:tgtEl>
-                                          <p:spTgt spid="241"/>
+                                          <p:spTgt spid="242"/>
                                         </p:tgtEl>
                                         <p:attrNameLst>
                                           <p:attrName>style.visibility</p:attrName>
@@ -5460,7 +5460,7 @@
                                       <p:cBhvr>
                                         <p:cTn id="87" dur="799"/>
                                         <p:tgtEl>
-                                          <p:spTgt spid="241"/>
+                                          <p:spTgt spid="242"/>
                                         </p:tgtEl>
                                       </p:cBhvr>
                                     </p:animEffect>
@@ -5498,7 +5498,7 @@
                                       <p:cBhvr>
                                         <p:cTn id="91" fill="hold"/>
                                         <p:tgtEl>
-                                          <p:spTgt spid="228"/>
+                                          <p:spTgt spid="229"/>
                                         </p:tgtEl>
                                         <p:attrNameLst>
                                           <p:attrName>style.visibility</p:attrName>
@@ -5512,7 +5512,7 @@
                                       <p:cBhvr>
                                         <p:cTn id="92" dur="800"/>
                                         <p:tgtEl>
-                                          <p:spTgt spid="228"/>
+                                          <p:spTgt spid="229"/>
                                         </p:tgtEl>
                                       </p:cBhvr>
                                     </p:animEffect>
@@ -5541,7 +5541,7 @@
                                       <p:cBhvr>
                                         <p:cTn id="95" fill="hold"/>
                                         <p:tgtEl>
-                                          <p:spTgt spid="240"/>
+                                          <p:spTgt spid="241"/>
                                         </p:tgtEl>
                                         <p:attrNameLst>
                                           <p:attrName>style.visibility</p:attrName>
@@ -5555,7 +5555,7 @@
                                       <p:cBhvr>
                                         <p:cTn id="96" dur="799"/>
                                         <p:tgtEl>
-                                          <p:spTgt spid="240"/>
+                                          <p:spTgt spid="241"/>
                                         </p:tgtEl>
                                       </p:cBhvr>
                                     </p:animEffect>
@@ -5593,7 +5593,7 @@
                                       <p:cBhvr>
                                         <p:cTn id="100" fill="hold"/>
                                         <p:tgtEl>
-                                          <p:spTgt spid="229"/>
+                                          <p:spTgt spid="230"/>
                                         </p:tgtEl>
                                         <p:attrNameLst>
                                           <p:attrName>style.visibility</p:attrName>
@@ -5607,7 +5607,7 @@
                                       <p:cBhvr>
                                         <p:cTn id="101" dur="800"/>
                                         <p:tgtEl>
-                                          <p:spTgt spid="229"/>
+                                          <p:spTgt spid="230"/>
                                         </p:tgtEl>
                                       </p:cBhvr>
                                     </p:animEffect>
@@ -5636,7 +5636,7 @@
                                       <p:cBhvr>
                                         <p:cTn id="104" fill="hold"/>
                                         <p:tgtEl>
-                                          <p:spTgt spid="242"/>
+                                          <p:spTgt spid="243"/>
                                         </p:tgtEl>
                                         <p:attrNameLst>
                                           <p:attrName>style.visibility</p:attrName>
@@ -5650,7 +5650,7 @@
                                       <p:cBhvr>
                                         <p:cTn id="105" dur="799"/>
                                         <p:tgtEl>
-                                          <p:spTgt spid="242"/>
+                                          <p:spTgt spid="243"/>
                                         </p:tgtEl>
                                       </p:cBhvr>
                                     </p:animEffect>
@@ -5688,7 +5688,7 @@
                                       <p:cBhvr>
                                         <p:cTn id="109" fill="hold"/>
                                         <p:tgtEl>
-                                          <p:spTgt spid="234"/>
+                                          <p:spTgt spid="235"/>
                                         </p:tgtEl>
                                         <p:attrNameLst>
                                           <p:attrName>style.visibility</p:attrName>
@@ -5702,7 +5702,7 @@
                                       <p:cBhvr>
                                         <p:cTn id="110" dur="800"/>
                                         <p:tgtEl>
-                                          <p:spTgt spid="234"/>
+                                          <p:spTgt spid="235"/>
                                         </p:tgtEl>
                                       </p:cBhvr>
                                     </p:animEffect>
@@ -5731,7 +5731,7 @@
                                       <p:cBhvr>
                                         <p:cTn id="113" fill="hold"/>
                                         <p:tgtEl>
-                                          <p:spTgt spid="243"/>
+                                          <p:spTgt spid="244"/>
                                         </p:tgtEl>
                                         <p:attrNameLst>
                                           <p:attrName>style.visibility</p:attrName>
@@ -5745,7 +5745,7 @@
                                       <p:cBhvr>
                                         <p:cTn id="114" dur="799"/>
                                         <p:tgtEl>
-                                          <p:spTgt spid="243"/>
+                                          <p:spTgt spid="244"/>
                                         </p:tgtEl>
                                       </p:cBhvr>
                                     </p:animEffect>
@@ -5783,7 +5783,7 @@
                                       <p:cBhvr>
                                         <p:cTn id="118" dur="1000" fill="hold"/>
                                         <p:tgtEl>
-                                          <p:spTgt spid="227"/>
+                                          <p:spTgt spid="228"/>
                                         </p:tgtEl>
                                         <p:attrNameLst>
                                           <p:attrName>ppt_w</p:attrName>
@@ -5806,7 +5806,7 @@
                                       <p:cBhvr>
                                         <p:cTn id="119" dur="1000" fill="hold"/>
                                         <p:tgtEl>
-                                          <p:spTgt spid="227"/>
+                                          <p:spTgt spid="228"/>
                                         </p:tgtEl>
                                         <p:attrNameLst>
                                           <p:attrName>ppt_h</p:attrName>
@@ -5833,7 +5833,7 @@
                                           </p:stCondLst>
                                         </p:cTn>
                                         <p:tgtEl>
-                                          <p:spTgt spid="227"/>
+                                          <p:spTgt spid="228"/>
                                         </p:tgtEl>
                                         <p:attrNameLst>
                                           <p:attrName>style.visibility</p:attrName>
@@ -5868,7 +5868,7 @@
                                       <p:cBhvr>
                                         <p:cTn id="123" dur="1000" fill="hold"/>
                                         <p:tgtEl>
-                                          <p:spTgt spid="228"/>
+                                          <p:spTgt spid="229"/>
                                         </p:tgtEl>
                                         <p:attrNameLst>
                                           <p:attrName>ppt_w</p:attrName>
@@ -5891,7 +5891,7 @@
                                       <p:cBhvr>
                                         <p:cTn id="124" dur="1000" fill="hold"/>
                                         <p:tgtEl>
-                                          <p:spTgt spid="228"/>
+                                          <p:spTgt spid="229"/>
                                         </p:tgtEl>
                                         <p:attrNameLst>
                                           <p:attrName>ppt_h</p:attrName>
@@ -5918,7 +5918,7 @@
                                           </p:stCondLst>
                                         </p:cTn>
                                         <p:tgtEl>
-                                          <p:spTgt spid="228"/>
+                                          <p:spTgt spid="229"/>
                                         </p:tgtEl>
                                         <p:attrNameLst>
                                           <p:attrName>style.visibility</p:attrName>
@@ -5953,7 +5953,7 @@
                                       <p:cBhvr>
                                         <p:cTn id="128" dur="1000" fill="hold"/>
                                         <p:tgtEl>
-                                          <p:spTgt spid="229"/>
+                                          <p:spTgt spid="230"/>
                                         </p:tgtEl>
                                         <p:attrNameLst>
                                           <p:attrName>ppt_w</p:attrName>
@@ -5976,7 +5976,7 @@
                                       <p:cBhvr>
                                         <p:cTn id="129" dur="1000" fill="hold"/>
                                         <p:tgtEl>
-                                          <p:spTgt spid="229"/>
+                                          <p:spTgt spid="230"/>
                                         </p:tgtEl>
                                         <p:attrNameLst>
                                           <p:attrName>ppt_h</p:attrName>
@@ -6003,7 +6003,7 @@
                                           </p:stCondLst>
                                         </p:cTn>
                                         <p:tgtEl>
-                                          <p:spTgt spid="229"/>
+                                          <p:spTgt spid="230"/>
                                         </p:tgtEl>
                                         <p:attrNameLst>
                                           <p:attrName>style.visibility</p:attrName>
@@ -6038,7 +6038,7 @@
                                       <p:cBhvr>
                                         <p:cTn id="133" dur="1000" fill="hold"/>
                                         <p:tgtEl>
-                                          <p:spTgt spid="234"/>
+                                          <p:spTgt spid="235"/>
                                         </p:tgtEl>
                                         <p:attrNameLst>
                                           <p:attrName>ppt_w</p:attrName>
@@ -6061,7 +6061,7 @@
                                       <p:cBhvr>
                                         <p:cTn id="134" dur="1000" fill="hold"/>
                                         <p:tgtEl>
-                                          <p:spTgt spid="234"/>
+                                          <p:spTgt spid="235"/>
                                         </p:tgtEl>
                                         <p:attrNameLst>
                                           <p:attrName>ppt_h</p:attrName>
@@ -6088,7 +6088,7 @@
                                           </p:stCondLst>
                                         </p:cTn>
                                         <p:tgtEl>
-                                          <p:spTgt spid="234"/>
+                                          <p:spTgt spid="235"/>
                                         </p:tgtEl>
                                         <p:attrNameLst>
                                           <p:attrName>style.visibility</p:attrName>
@@ -6123,7 +6123,7 @@
                                       <p:cBhvr>
                                         <p:cTn id="138" dur="1000" fill="hold"/>
                                         <p:tgtEl>
-                                          <p:spTgt spid="241"/>
+                                          <p:spTgt spid="242"/>
                                         </p:tgtEl>
                                         <p:attrNameLst>
                                           <p:attrName>ppt_w</p:attrName>
@@ -6146,7 +6146,7 @@
                                       <p:cBhvr>
                                         <p:cTn id="139" dur="1000" fill="hold"/>
                                         <p:tgtEl>
-                                          <p:spTgt spid="241"/>
+                                          <p:spTgt spid="242"/>
                                         </p:tgtEl>
                                         <p:attrNameLst>
                                           <p:attrName>ppt_h</p:attrName>
@@ -6173,7 +6173,7 @@
                                           </p:stCondLst>
                                         </p:cTn>
                                         <p:tgtEl>
-                                          <p:spTgt spid="241"/>
+                                          <p:spTgt spid="242"/>
                                         </p:tgtEl>
                                         <p:attrNameLst>
                                           <p:attrName>style.visibility</p:attrName>
@@ -6208,7 +6208,7 @@
                                       <p:cBhvr>
                                         <p:cTn id="143" dur="1000" fill="hold"/>
                                         <p:tgtEl>
-                                          <p:spTgt spid="240"/>
+                                          <p:spTgt spid="241"/>
                                         </p:tgtEl>
                                         <p:attrNameLst>
                                           <p:attrName>ppt_w</p:attrName>
@@ -6231,7 +6231,7 @@
                                       <p:cBhvr>
                                         <p:cTn id="144" dur="1000" fill="hold"/>
                                         <p:tgtEl>
-                                          <p:spTgt spid="240"/>
+                                          <p:spTgt spid="241"/>
                                         </p:tgtEl>
                                         <p:attrNameLst>
                                           <p:attrName>ppt_h</p:attrName>
@@ -6258,7 +6258,7 @@
                                           </p:stCondLst>
                                         </p:cTn>
                                         <p:tgtEl>
-                                          <p:spTgt spid="240"/>
+                                          <p:spTgt spid="241"/>
                                         </p:tgtEl>
                                         <p:attrNameLst>
                                           <p:attrName>style.visibility</p:attrName>
@@ -6293,7 +6293,7 @@
                                       <p:cBhvr>
                                         <p:cTn id="148" dur="1000" fill="hold"/>
                                         <p:tgtEl>
-                                          <p:spTgt spid="242"/>
+                                          <p:spTgt spid="243"/>
                                         </p:tgtEl>
                                         <p:attrNameLst>
                                           <p:attrName>ppt_w</p:attrName>
@@ -6316,7 +6316,7 @@
                                       <p:cBhvr>
                                         <p:cTn id="149" dur="1000" fill="hold"/>
                                         <p:tgtEl>
-                                          <p:spTgt spid="242"/>
+                                          <p:spTgt spid="243"/>
                                         </p:tgtEl>
                                         <p:attrNameLst>
                                           <p:attrName>ppt_h</p:attrName>
@@ -6343,7 +6343,7 @@
                                           </p:stCondLst>
                                         </p:cTn>
                                         <p:tgtEl>
-                                          <p:spTgt spid="242"/>
+                                          <p:spTgt spid="243"/>
                                         </p:tgtEl>
                                         <p:attrNameLst>
                                           <p:attrName>style.visibility</p:attrName>
@@ -6378,7 +6378,7 @@
                                       <p:cBhvr>
                                         <p:cTn id="153" dur="1000" fill="hold"/>
                                         <p:tgtEl>
-                                          <p:spTgt spid="243"/>
+                                          <p:spTgt spid="244"/>
                                         </p:tgtEl>
                                         <p:attrNameLst>
                                           <p:attrName>ppt_w</p:attrName>
@@ -6401,7 +6401,7 @@
                                       <p:cBhvr>
                                         <p:cTn id="154" dur="1000" fill="hold"/>
                                         <p:tgtEl>
-                                          <p:spTgt spid="243"/>
+                                          <p:spTgt spid="244"/>
                                         </p:tgtEl>
                                         <p:attrNameLst>
                                           <p:attrName>ppt_h</p:attrName>
@@ -6428,7 +6428,7 @@
                                           </p:stCondLst>
                                         </p:cTn>
                                         <p:tgtEl>
-                                          <p:spTgt spid="243"/>
+                                          <p:spTgt spid="244"/>
                                         </p:tgtEl>
                                         <p:attrNameLst>
                                           <p:attrName>style.visibility</p:attrName>
@@ -6463,7 +6463,7 @@
                                       <p:cBhvr>
                                         <p:cTn id="158" fill="hold"/>
                                         <p:tgtEl>
-                                          <p:spTgt spid="230"/>
+                                          <p:spTgt spid="231"/>
                                         </p:tgtEl>
                                         <p:attrNameLst>
                                           <p:attrName>style.visibility</p:attrName>
@@ -6477,7 +6477,7 @@
                                       <p:cBhvr>
                                         <p:cTn id="159" dur="799"/>
                                         <p:tgtEl>
-                                          <p:spTgt spid="230"/>
+                                          <p:spTgt spid="231"/>
                                         </p:tgtEl>
                                       </p:cBhvr>
                                     </p:animEffect>
@@ -6506,7 +6506,7 @@
                                       <p:cBhvr>
                                         <p:cTn id="162" fill="hold"/>
                                         <p:tgtEl>
-                                          <p:spTgt spid="247"/>
+                                          <p:spTgt spid="248"/>
                                         </p:tgtEl>
                                         <p:attrNameLst>
                                           <p:attrName>style.visibility</p:attrName>
@@ -6520,7 +6520,7 @@
                                       <p:cBhvr>
                                         <p:cTn id="163" dur="799"/>
                                         <p:tgtEl>
-                                          <p:spTgt spid="247"/>
+                                          <p:spTgt spid="248"/>
                                         </p:tgtEl>
                                       </p:cBhvr>
                                     </p:animEffect>
@@ -6558,7 +6558,7 @@
                                       <p:cBhvr>
                                         <p:cTn id="167" fill="hold"/>
                                         <p:tgtEl>
-                                          <p:spTgt spid="231"/>
+                                          <p:spTgt spid="232"/>
                                         </p:tgtEl>
                                         <p:attrNameLst>
                                           <p:attrName>style.visibility</p:attrName>
@@ -6572,7 +6572,7 @@
                                       <p:cBhvr>
                                         <p:cTn id="168" dur="800"/>
                                         <p:tgtEl>
-                                          <p:spTgt spid="231"/>
+                                          <p:spTgt spid="232"/>
                                         </p:tgtEl>
                                       </p:cBhvr>
                                     </p:animEffect>
@@ -6601,7 +6601,7 @@
                                       <p:cBhvr>
                                         <p:cTn id="171" fill="hold"/>
                                         <p:tgtEl>
-                                          <p:spTgt spid="246"/>
+                                          <p:spTgt spid="247"/>
                                         </p:tgtEl>
                                         <p:attrNameLst>
                                           <p:attrName>style.visibility</p:attrName>
@@ -6615,7 +6615,7 @@
                                       <p:cBhvr>
                                         <p:cTn id="172" dur="799"/>
                                         <p:tgtEl>
-                                          <p:spTgt spid="246"/>
+                                          <p:spTgt spid="247"/>
                                         </p:tgtEl>
                                       </p:cBhvr>
                                     </p:animEffect>
@@ -6653,7 +6653,7 @@
                                       <p:cBhvr>
                                         <p:cTn id="176" fill="hold"/>
                                         <p:tgtEl>
-                                          <p:spTgt spid="232"/>
+                                          <p:spTgt spid="233"/>
                                         </p:tgtEl>
                                         <p:attrNameLst>
                                           <p:attrName>style.visibility</p:attrName>
@@ -6667,7 +6667,7 @@
                                       <p:cBhvr>
                                         <p:cTn id="177" dur="800"/>
                                         <p:tgtEl>
-                                          <p:spTgt spid="232"/>
+                                          <p:spTgt spid="233"/>
                                         </p:tgtEl>
                                       </p:cBhvr>
                                     </p:animEffect>
@@ -6696,7 +6696,7 @@
                                       <p:cBhvr>
                                         <p:cTn id="180" fill="hold"/>
                                         <p:tgtEl>
-                                          <p:spTgt spid="248"/>
+                                          <p:spTgt spid="249"/>
                                         </p:tgtEl>
                                         <p:attrNameLst>
                                           <p:attrName>style.visibility</p:attrName>
@@ -6710,7 +6710,7 @@
                                       <p:cBhvr>
                                         <p:cTn id="181" dur="800"/>
                                         <p:tgtEl>
-                                          <p:spTgt spid="248"/>
+                                          <p:spTgt spid="249"/>
                                         </p:tgtEl>
                                       </p:cBhvr>
                                     </p:animEffect>
@@ -6748,7 +6748,7 @@
                                       <p:cBhvr>
                                         <p:cTn id="185" fill="hold"/>
                                         <p:tgtEl>
-                                          <p:spTgt spid="233"/>
+                                          <p:spTgt spid="234"/>
                                         </p:tgtEl>
                                         <p:attrNameLst>
                                           <p:attrName>style.visibility</p:attrName>
@@ -6762,7 +6762,7 @@
                                       <p:cBhvr>
                                         <p:cTn id="186" dur="800"/>
                                         <p:tgtEl>
-                                          <p:spTgt spid="233"/>
+                                          <p:spTgt spid="234"/>
                                         </p:tgtEl>
                                       </p:cBhvr>
                                     </p:animEffect>
@@ -6791,7 +6791,7 @@
                                       <p:cBhvr>
                                         <p:cTn id="189" fill="hold"/>
                                         <p:tgtEl>
-                                          <p:spTgt spid="244"/>
+                                          <p:spTgt spid="245"/>
                                         </p:tgtEl>
                                         <p:attrNameLst>
                                           <p:attrName>style.visibility</p:attrName>
@@ -6805,7 +6805,7 @@
                                       <p:cBhvr>
                                         <p:cTn id="190" dur="799"/>
                                         <p:tgtEl>
-                                          <p:spTgt spid="244"/>
+                                          <p:spTgt spid="245"/>
                                         </p:tgtEl>
                                       </p:cBhvr>
                                     </p:animEffect>
@@ -6843,7 +6843,7 @@
                                       <p:cBhvr>
                                         <p:cTn id="194" fill="hold"/>
                                         <p:tgtEl>
-                                          <p:spTgt spid="239"/>
+                                          <p:spTgt spid="240"/>
                                         </p:tgtEl>
                                         <p:attrNameLst>
                                           <p:attrName>style.visibility</p:attrName>
@@ -6857,7 +6857,7 @@
                                       <p:cBhvr>
                                         <p:cTn id="195" dur="800"/>
                                         <p:tgtEl>
-                                          <p:spTgt spid="239"/>
+                                          <p:spTgt spid="240"/>
                                         </p:tgtEl>
                                       </p:cBhvr>
                                     </p:animEffect>
@@ -6886,7 +6886,7 @@
                                       <p:cBhvr>
                                         <p:cTn id="198" fill="hold"/>
                                         <p:tgtEl>
-                                          <p:spTgt spid="245"/>
+                                          <p:spTgt spid="246"/>
                                         </p:tgtEl>
                                         <p:attrNameLst>
                                           <p:attrName>style.visibility</p:attrName>
@@ -6900,7 +6900,7 @@
                                       <p:cBhvr>
                                         <p:cTn id="199" dur="799"/>
                                         <p:tgtEl>
-                                          <p:spTgt spid="245"/>
+                                          <p:spTgt spid="246"/>
                                         </p:tgtEl>
                                       </p:cBhvr>
                                     </p:animEffect>
@@ -6935,48 +6935,48 @@
       </p:par>
     </p:tnLst>
     <p:bldLst>
-      <p:bldP build="whole" bldLvl="1" animBg="1" rev="0" advAuto="0" spid="229" grpId="21"/>
-      <p:bldP build="whole" bldLvl="1" animBg="1" rev="0" advAuto="0" spid="242" grpId="22"/>
-      <p:bldP build="whole" bldLvl="1" animBg="1" rev="0" advAuto="0" spid="235" grpId="13"/>
-      <p:bldP build="whole" bldLvl="1" animBg="1" rev="0" advAuto="0" spid="227" grpId="17"/>
-      <p:bldP build="whole" bldLvl="1" animBg="1" rev="0" advAuto="0" spid="230" grpId="33"/>
-      <p:bldP build="whole" bldLvl="1" animBg="1" rev="0" advAuto="0" spid="229" grpId="27"/>
-      <p:bldP build="whole" bldLvl="1" animBg="1" rev="0" advAuto="0" spid="232" grpId="37"/>
-      <p:bldP build="whole" bldLvl="1" animBg="1" rev="0" advAuto="0" spid="225" grpId="5"/>
-      <p:bldP build="whole" bldLvl="1" animBg="1" rev="0" advAuto="0" spid="239" grpId="41"/>
-      <p:bldP build="whole" bldLvl="1" animBg="1" rev="0" advAuto="0" spid="241" grpId="18"/>
-      <p:bldP build="whole" bldLvl="1" animBg="1" rev="0" advAuto="0" spid="236" grpId="8"/>
-      <p:bldP build="whole" bldLvl="1" animBg="1" rev="0" advAuto="0" spid="242" grpId="31"/>
-      <p:bldP build="whole" bldLvl="1" animBg="1" rev="0" advAuto="0" spid="227" grpId="25"/>
-      <p:bldP build="whole" bldLvl="1" animBg="1" rev="0" advAuto="0" spid="236" grpId="11"/>
-      <p:bldP build="whole" bldLvl="1" animBg="1" rev="0" advAuto="0" spid="225" grpId="15"/>
-      <p:bldP build="whole" bldLvl="1" animBg="1" rev="0" advAuto="0" spid="234" grpId="23"/>
-      <p:bldP build="whole" bldLvl="1" animBg="1" rev="0" advAuto="0" spid="223" grpId="1"/>
-      <p:bldP build="whole" bldLvl="1" animBg="1" rev="0" advAuto="0" spid="240" grpId="20"/>
-      <p:bldP build="whole" bldLvl="1" animBg="1" rev="0" advAuto="0" spid="241" grpId="29"/>
-      <p:bldP build="whole" bldLvl="1" animBg="1" rev="0" advAuto="0" spid="231" grpId="35"/>
-      <p:bldP build="whole" bldLvl="1" animBg="1" rev="0" advAuto="0" spid="234" grpId="28"/>
-      <p:bldP build="whole" bldLvl="1" animBg="1" rev="0" advAuto="0" spid="243" grpId="24"/>
-      <p:bldP build="whole" bldLvl="1" animBg="1" rev="0" advAuto="0" spid="224" grpId="3"/>
-      <p:bldP build="whole" bldLvl="1" animBg="1" rev="0" advAuto="0" spid="238" grpId="6"/>
-      <p:bldP build="whole" bldLvl="1" animBg="1" rev="0" advAuto="0" spid="223" grpId="9"/>
-      <p:bldP build="whole" bldLvl="1" animBg="1" rev="0" advAuto="0" spid="238" grpId="10"/>
-      <p:bldP build="whole" bldLvl="1" animBg="1" rev="0" advAuto="0" spid="237" grpId="4"/>
-      <p:bldP build="whole" bldLvl="1" animBg="1" rev="0" advAuto="0" spid="240" grpId="30"/>
-      <p:bldP build="whole" bldLvl="1" animBg="1" rev="0" advAuto="0" spid="243" grpId="32"/>
-      <p:bldP build="whole" bldLvl="1" animBg="1" rev="0" advAuto="0" spid="237" grpId="12"/>
-      <p:bldP build="whole" bldLvl="1" animBg="1" rev="0" advAuto="0" spid="248" grpId="38"/>
-      <p:bldP build="whole" bldLvl="1" animBg="1" rev="0" advAuto="0" spid="245" grpId="42"/>
-      <p:bldP build="whole" bldLvl="1" animBg="1" rev="0" advAuto="0" spid="224" grpId="14"/>
-      <p:bldP build="whole" bldLvl="1" animBg="1" rev="0" advAuto="0" spid="226" grpId="7"/>
-      <p:bldP build="whole" bldLvl="1" animBg="1" rev="0" advAuto="0" spid="228" grpId="19"/>
-      <p:bldP build="whole" bldLvl="1" animBg="1" rev="0" advAuto="0" spid="233" grpId="39"/>
-      <p:bldP build="whole" bldLvl="1" animBg="1" rev="0" advAuto="0" spid="226" grpId="16"/>
-      <p:bldP build="whole" bldLvl="1" animBg="1" rev="0" advAuto="0" spid="228" grpId="26"/>
-      <p:bldP build="whole" bldLvl="1" animBg="1" rev="0" advAuto="0" spid="247" grpId="34"/>
-      <p:bldP build="whole" bldLvl="1" animBg="1" rev="0" advAuto="0" spid="235" grpId="2"/>
-      <p:bldP build="whole" bldLvl="1" animBg="1" rev="0" advAuto="0" spid="246" grpId="36"/>
-      <p:bldP build="whole" bldLvl="1" animBg="1" rev="0" advAuto="0" spid="244" grpId="40"/>
+      <p:bldP build="whole" bldLvl="1" animBg="1" rev="0" advAuto="0" spid="234" grpId="39"/>
+      <p:bldP build="whole" bldLvl="1" animBg="1" rev="0" advAuto="0" spid="229" grpId="19"/>
+      <p:bldP build="whole" bldLvl="1" animBg="1" rev="0" advAuto="0" spid="245" grpId="40"/>
+      <p:bldP build="whole" bldLvl="1" animBg="1" rev="0" advAuto="0" spid="232" grpId="35"/>
+      <p:bldP build="whole" bldLvl="1" animBg="1" rev="0" advAuto="0" spid="229" grpId="26"/>
+      <p:bldP build="whole" bldLvl="1" animBg="1" rev="0" advAuto="0" spid="224" grpId="1"/>
+      <p:bldP build="whole" bldLvl="1" animBg="1" rev="0" advAuto="0" spid="248" grpId="34"/>
+      <p:bldP build="whole" bldLvl="1" animBg="1" rev="0" advAuto="0" spid="233" grpId="37"/>
+      <p:bldP build="whole" bldLvl="1" animBg="1" rev="0" advAuto="0" spid="241" grpId="20"/>
+      <p:bldP build="whole" bldLvl="1" animBg="1" rev="0" advAuto="0" spid="249" grpId="38"/>
+      <p:bldP build="whole" bldLvl="1" animBg="1" rev="0" advAuto="0" spid="246" grpId="42"/>
+      <p:bldP build="whole" bldLvl="1" animBg="1" rev="0" advAuto="0" spid="236" grpId="2"/>
+      <p:bldP build="whole" bldLvl="1" animBg="1" rev="0" advAuto="0" spid="224" grpId="9"/>
+      <p:bldP build="whole" bldLvl="1" animBg="1" rev="0" advAuto="0" spid="225" grpId="3"/>
+      <p:bldP build="whole" bldLvl="1" animBg="1" rev="0" advAuto="0" spid="243" grpId="22"/>
+      <p:bldP build="whole" bldLvl="1" animBg="1" rev="0" advAuto="0" spid="241" grpId="30"/>
+      <p:bldP build="whole" bldLvl="1" animBg="1" rev="0" advAuto="0" spid="239" grpId="6"/>
+      <p:bldP build="whole" bldLvl="1" animBg="1" rev="0" advAuto="0" spid="240" grpId="41"/>
+      <p:bldP build="whole" bldLvl="1" animBg="1" rev="0" advAuto="0" spid="239" grpId="10"/>
+      <p:bldP build="whole" bldLvl="1" animBg="1" rev="0" advAuto="0" spid="236" grpId="13"/>
+      <p:bldP build="whole" bldLvl="1" animBg="1" rev="0" advAuto="0" spid="227" grpId="7"/>
+      <p:bldP build="whole" bldLvl="1" animBg="1" rev="0" advAuto="0" spid="242" grpId="18"/>
+      <p:bldP build="whole" bldLvl="1" animBg="1" rev="0" advAuto="0" spid="235" grpId="23"/>
+      <p:bldP build="whole" bldLvl="1" animBg="1" rev="0" advAuto="0" spid="243" grpId="31"/>
+      <p:bldP build="whole" bldLvl="1" animBg="1" rev="0" advAuto="0" spid="225" grpId="14"/>
+      <p:bldP build="whole" bldLvl="1" animBg="1" rev="0" advAuto="0" spid="235" grpId="28"/>
+      <p:bldP build="whole" bldLvl="1" animBg="1" rev="0" advAuto="0" spid="238" grpId="4"/>
+      <p:bldP build="whole" bldLvl="1" animBg="1" rev="0" advAuto="0" spid="227" grpId="16"/>
+      <p:bldP build="whole" bldLvl="1" animBg="1" rev="0" advAuto="0" spid="242" grpId="29"/>
+      <p:bldP build="whole" bldLvl="1" animBg="1" rev="0" advAuto="0" spid="230" grpId="21"/>
+      <p:bldP build="whole" bldLvl="1" animBg="1" rev="0" advAuto="0" spid="247" grpId="36"/>
+      <p:bldP build="whole" bldLvl="1" animBg="1" rev="0" advAuto="0" spid="228" grpId="17"/>
+      <p:bldP build="whole" bldLvl="1" animBg="1" rev="0" advAuto="0" spid="244" grpId="24"/>
+      <p:bldP build="whole" bldLvl="1" animBg="1" rev="0" advAuto="0" spid="238" grpId="12"/>
+      <p:bldP build="whole" bldLvl="1" animBg="1" rev="0" advAuto="0" spid="237" grpId="8"/>
+      <p:bldP build="whole" bldLvl="1" animBg="1" rev="0" advAuto="0" spid="230" grpId="27"/>
+      <p:bldP build="whole" bldLvl="1" animBg="1" rev="0" advAuto="0" spid="226" grpId="5"/>
+      <p:bldP build="whole" bldLvl="1" animBg="1" rev="0" advAuto="0" spid="237" grpId="11"/>
+      <p:bldP build="whole" bldLvl="1" animBg="1" rev="0" advAuto="0" spid="228" grpId="25"/>
+      <p:bldP build="whole" bldLvl="1" animBg="1" rev="0" advAuto="0" spid="244" grpId="32"/>
+      <p:bldP build="whole" bldLvl="1" animBg="1" rev="0" advAuto="0" spid="226" grpId="15"/>
+      <p:bldP build="whole" bldLvl="1" animBg="1" rev="0" advAuto="0" spid="231" grpId="33"/>
     </p:bldLst>
   </p:timing>
 </p:sld>
@@ -7001,7 +7001,7 @@
       </p:grpSpPr>
       <p:sp>
         <p:nvSpPr>
-          <p:cNvPr id="250" name="Conclusion"/>
+          <p:cNvPr id="251" name="Conclusion"/>
           <p:cNvSpPr txBox="1"/>
           <p:nvPr/>
         </p:nvSpPr>
@@ -7046,7 +7046,7 @@
       </p:sp>
       <p:sp>
         <p:nvSpPr>
-          <p:cNvPr id="251" name="- Amélioration de notre capacité au travail de groupe"/>
+          <p:cNvPr id="252" name="- Amélioration de notre capacité au travail de groupe"/>
           <p:cNvSpPr txBox="1"/>
           <p:nvPr/>
         </p:nvSpPr>
@@ -7089,7 +7089,7 @@
       </p:sp>
       <p:sp>
         <p:nvSpPr>
-          <p:cNvPr id="252" name="- Réalisation d’un jeu d’échecs"/>
+          <p:cNvPr id="253" name="- Réalisation d’un jeu d’échecs"/>
           <p:cNvSpPr txBox="1"/>
           <p:nvPr/>
         </p:nvSpPr>
@@ -7132,7 +7132,7 @@
       </p:sp>
       <p:sp>
         <p:nvSpPr>
-          <p:cNvPr id="253" name="- Mise en pratique des connaissances comme l’UML"/>
+          <p:cNvPr id="254" name="- Mise en pratique des connaissances comme l’UML"/>
           <p:cNvSpPr txBox="1"/>
           <p:nvPr/>
         </p:nvSpPr>
@@ -7175,7 +7175,7 @@
       </p:sp>
       <p:sp>
         <p:nvSpPr>
-          <p:cNvPr id="254" name="- Amélioration de l’esthétique du jeu"/>
+          <p:cNvPr id="255" name="- Amélioration de l’esthétique du jeu"/>
           <p:cNvSpPr txBox="1"/>
           <p:nvPr/>
         </p:nvSpPr>
@@ -7218,7 +7218,7 @@
       </p:sp>
       <p:sp>
         <p:nvSpPr>
-          <p:cNvPr id="255" name="Numéro de diapositive"/>
+          <p:cNvPr id="256" name="Numéro de diapositive"/>
           <p:cNvSpPr txBox="1"/>
           <p:nvPr>
             <p:ph type="sldNum" sz="quarter" idx="2"/>
@@ -7256,7 +7256,7 @@
       </p:sp>
       <p:pic>
         <p:nvPicPr>
-          <p:cNvPr id="256" name="chess-board.png" descr="chess-board.png"/>
+          <p:cNvPr id="257" name="chess-board.png" descr="chess-board.png"/>
           <p:cNvPicPr>
             <a:picLocks noChangeAspect="1"/>
           </p:cNvPicPr>
@@ -7285,7 +7285,7 @@
       </p:pic>
       <p:pic>
         <p:nvPicPr>
-          <p:cNvPr id="257" name="teamwork.png" descr="teamwork.png"/>
+          <p:cNvPr id="258" name="teamwork.png" descr="teamwork.png"/>
           <p:cNvPicPr>
             <a:picLocks noChangeAspect="1"/>
           </p:cNvPicPr>
@@ -7314,7 +7314,7 @@
       </p:pic>
       <p:pic>
         <p:nvPicPr>
-          <p:cNvPr id="258" name="monitor.png" descr="monitor.png"/>
+          <p:cNvPr id="259" name="monitor.png" descr="monitor.png"/>
           <p:cNvPicPr>
             <a:picLocks noChangeAspect="1"/>
           </p:cNvPicPr>
@@ -7343,7 +7343,7 @@
       </p:pic>
       <p:pic>
         <p:nvPicPr>
-          <p:cNvPr id="259" name="diagram.png" descr="diagram.png"/>
+          <p:cNvPr id="260" name="diagram.png" descr="diagram.png"/>
           <p:cNvPicPr>
             <a:picLocks noChangeAspect="1"/>
           </p:cNvPicPr>
@@ -7423,7 +7423,7 @@
                                       <p:cBhvr>
                                         <p:cTn id="6" fill="hold"/>
                                         <p:tgtEl>
-                                          <p:spTgt spid="252"/>
+                                          <p:spTgt spid="253"/>
                                         </p:tgtEl>
                                         <p:attrNameLst>
                                           <p:attrName>style.visibility</p:attrName>
@@ -7437,7 +7437,7 @@
                                       <p:cBhvr>
                                         <p:cTn id="7" dur="800"/>
                                         <p:tgtEl>
-                                          <p:spTgt spid="252"/>
+                                          <p:spTgt spid="253"/>
                                         </p:tgtEl>
                                       </p:cBhvr>
                                     </p:animEffect>
@@ -7466,7 +7466,7 @@
                                       <p:cBhvr>
                                         <p:cTn id="10" fill="hold"/>
                                         <p:tgtEl>
-                                          <p:spTgt spid="256"/>
+                                          <p:spTgt spid="257"/>
                                         </p:tgtEl>
                                         <p:attrNameLst>
                                           <p:attrName>style.visibility</p:attrName>
@@ -7480,7 +7480,7 @@
                                       <p:cBhvr>
                                         <p:cTn id="11" dur="1000"/>
                                         <p:tgtEl>
-                                          <p:spTgt spid="256"/>
+                                          <p:spTgt spid="257"/>
                                         </p:tgtEl>
                                       </p:cBhvr>
                                     </p:animEffect>
@@ -7518,7 +7518,7 @@
                                       <p:cBhvr>
                                         <p:cTn id="15" fill="hold"/>
                                         <p:tgtEl>
-                                          <p:spTgt spid="251"/>
+                                          <p:spTgt spid="252"/>
                                         </p:tgtEl>
                                         <p:attrNameLst>
                                           <p:attrName>style.visibility</p:attrName>
@@ -7532,7 +7532,7 @@
                                       <p:cBhvr>
                                         <p:cTn id="16" dur="800"/>
                                         <p:tgtEl>
-                                          <p:spTgt spid="251"/>
+                                          <p:spTgt spid="252"/>
                                         </p:tgtEl>
                                       </p:cBhvr>
                                     </p:animEffect>
@@ -7561,7 +7561,7 @@
                                       <p:cBhvr>
                                         <p:cTn id="19" fill="hold"/>
                                         <p:tgtEl>
-                                          <p:spTgt spid="257"/>
+                                          <p:spTgt spid="258"/>
                                         </p:tgtEl>
                                         <p:attrNameLst>
                                           <p:attrName>style.visibility</p:attrName>
@@ -7575,7 +7575,7 @@
                                       <p:cBhvr>
                                         <p:cTn id="20" dur="1000"/>
                                         <p:tgtEl>
-                                          <p:spTgt spid="257"/>
+                                          <p:spTgt spid="258"/>
                                         </p:tgtEl>
                                       </p:cBhvr>
                                     </p:animEffect>
@@ -7613,7 +7613,7 @@
                                       <p:cBhvr>
                                         <p:cTn id="24" fill="hold"/>
                                         <p:tgtEl>
-                                          <p:spTgt spid="253"/>
+                                          <p:spTgt spid="254"/>
                                         </p:tgtEl>
                                         <p:attrNameLst>
                                           <p:attrName>style.visibility</p:attrName>
@@ -7627,7 +7627,7 @@
                                       <p:cBhvr>
                                         <p:cTn id="25" dur="800"/>
                                         <p:tgtEl>
-                                          <p:spTgt spid="253"/>
+                                          <p:spTgt spid="254"/>
                                         </p:tgtEl>
                                       </p:cBhvr>
                                     </p:animEffect>
@@ -7656,7 +7656,7 @@
                                       <p:cBhvr>
                                         <p:cTn id="28" fill="hold"/>
                                         <p:tgtEl>
-                                          <p:spTgt spid="259"/>
+                                          <p:spTgt spid="260"/>
                                         </p:tgtEl>
                                         <p:attrNameLst>
                                           <p:attrName>style.visibility</p:attrName>
@@ -7670,7 +7670,7 @@
                                       <p:cBhvr>
                                         <p:cTn id="29" dur="1000"/>
                                         <p:tgtEl>
-                                          <p:spTgt spid="259"/>
+                                          <p:spTgt spid="260"/>
                                         </p:tgtEl>
                                       </p:cBhvr>
                                     </p:animEffect>
@@ -7708,7 +7708,7 @@
                                       <p:cBhvr>
                                         <p:cTn id="33" fill="hold"/>
                                         <p:tgtEl>
-                                          <p:spTgt spid="254"/>
+                                          <p:spTgt spid="255"/>
                                         </p:tgtEl>
                                         <p:attrNameLst>
                                           <p:attrName>style.visibility</p:attrName>
@@ -7722,7 +7722,7 @@
                                       <p:cBhvr>
                                         <p:cTn id="34" dur="800"/>
                                         <p:tgtEl>
-                                          <p:spTgt spid="254"/>
+                                          <p:spTgt spid="255"/>
                                         </p:tgtEl>
                                       </p:cBhvr>
                                     </p:animEffect>
@@ -7751,7 +7751,7 @@
                                       <p:cBhvr>
                                         <p:cTn id="37" fill="hold"/>
                                         <p:tgtEl>
-                                          <p:spTgt spid="258"/>
+                                          <p:spTgt spid="259"/>
                                         </p:tgtEl>
                                         <p:attrNameLst>
                                           <p:attrName>style.visibility</p:attrName>
@@ -7765,7 +7765,7 @@
                                       <p:cBhvr>
                                         <p:cTn id="38" dur="1000"/>
                                         <p:tgtEl>
-                                          <p:spTgt spid="258"/>
+                                          <p:spTgt spid="259"/>
                                         </p:tgtEl>
                                       </p:cBhvr>
                                     </p:animEffect>
@@ -7800,14 +7800,14 @@
       </p:par>
     </p:tnLst>
     <p:bldLst>
-      <p:bldP build="whole" bldLvl="1" animBg="1" rev="0" advAuto="0" spid="258" grpId="8"/>
-      <p:bldP build="whole" bldLvl="1" animBg="1" rev="0" advAuto="0" spid="256" grpId="2"/>
-      <p:bldP build="whole" bldLvl="1" animBg="1" rev="0" advAuto="0" spid="259" grpId="6"/>
-      <p:bldP build="whole" bldLvl="1" animBg="1" rev="0" advAuto="0" spid="257" grpId="4"/>
-      <p:bldP build="whole" bldLvl="1" animBg="1" rev="0" advAuto="0" spid="252" grpId="1"/>
-      <p:bldP build="whole" bldLvl="1" animBg="1" rev="0" advAuto="0" spid="251" grpId="3"/>
-      <p:bldP build="whole" bldLvl="1" animBg="1" rev="0" advAuto="0" spid="254" grpId="7"/>
-      <p:bldP build="whole" bldLvl="1" animBg="1" rev="0" advAuto="0" spid="253" grpId="5"/>
+      <p:bldP build="whole" bldLvl="1" animBg="1" rev="0" advAuto="0" spid="252" grpId="3"/>
+      <p:bldP build="whole" bldLvl="1" animBg="1" rev="0" advAuto="0" spid="258" grpId="4"/>
+      <p:bldP build="whole" bldLvl="1" animBg="1" rev="0" advAuto="0" spid="257" grpId="2"/>
+      <p:bldP build="whole" bldLvl="1" animBg="1" rev="0" advAuto="0" spid="253" grpId="1"/>
+      <p:bldP build="whole" bldLvl="1" animBg="1" rev="0" advAuto="0" spid="260" grpId="6"/>
+      <p:bldP build="whole" bldLvl="1" animBg="1" rev="0" advAuto="0" spid="254" grpId="5"/>
+      <p:bldP build="whole" bldLvl="1" animBg="1" rev="0" advAuto="0" spid="259" grpId="8"/>
+      <p:bldP build="whole" bldLvl="1" animBg="1" rev="0" advAuto="0" spid="255" grpId="7"/>
     </p:bldLst>
   </p:timing>
 </p:sld>
@@ -8095,8 +8095,8 @@
         </p:nvSpPr>
         <p:spPr>
           <a:xfrm>
-            <a:off x="2551904" y="3088672"/>
-            <a:ext cx="3885820" cy="399289"/>
+            <a:off x="2551903" y="3088672"/>
+            <a:ext cx="3885821" cy="399289"/>
           </a:xfrm>
           <a:prstGeom prst="rect">
             <a:avLst/>
@@ -9971,22 +9971,22 @@
       </p:par>
     </p:tnLst>
     <p:bldLst>
+      <p:bldP build="whole" bldLvl="1" animBg="1" rev="0" advAuto="0" spid="128" grpId="9"/>
+      <p:bldP build="whole" bldLvl="1" animBg="1" rev="0" advAuto="0" spid="140" grpId="15"/>
+      <p:bldP build="whole" bldLvl="1" animBg="1" rev="0" advAuto="0" spid="139" grpId="12"/>
+      <p:bldP build="whole" bldLvl="1" animBg="1" rev="0" advAuto="0" spid="143" grpId="16"/>
+      <p:bldP build="whole" bldLvl="1" animBg="1" rev="0" advAuto="0" spid="135" grpId="4"/>
       <p:bldP build="whole" bldLvl="1" animBg="1" rev="0" advAuto="0" spid="137" grpId="8"/>
+      <p:bldP build="whole" bldLvl="1" animBg="1" rev="0" advAuto="0" spid="138" grpId="10"/>
+      <p:bldP build="whole" bldLvl="1" animBg="1" rev="0" advAuto="0" spid="134" grpId="2"/>
+      <p:bldP build="whole" bldLvl="1" animBg="1" rev="0" advAuto="0" spid="142" grpId="14"/>
+      <p:bldP build="whole" bldLvl="1" animBg="1" rev="0" advAuto="0" spid="136" grpId="6"/>
+      <p:bldP build="whole" bldLvl="1" animBg="1" rev="0" advAuto="0" spid="133" grpId="3"/>
+      <p:bldP build="whole" bldLvl="1" animBg="1" rev="0" advAuto="0" spid="130" grpId="1"/>
       <p:bldP build="whole" bldLvl="1" animBg="1" rev="0" advAuto="0" spid="129" grpId="7"/>
-      <p:bldP build="whole" bldLvl="1" animBg="1" rev="0" advAuto="0" spid="128" grpId="9"/>
-      <p:bldP build="whole" bldLvl="1" animBg="1" rev="0" advAuto="0" spid="143" grpId="16"/>
-      <p:bldP build="whole" bldLvl="1" animBg="1" rev="0" advAuto="0" spid="133" grpId="3"/>
-      <p:bldP build="whole" bldLvl="1" animBg="1" rev="0" advAuto="0" spid="138" grpId="10"/>
-      <p:bldP build="whole" bldLvl="1" animBg="1" rev="0" advAuto="0" spid="136" grpId="6"/>
-      <p:bldP build="whole" bldLvl="1" animBg="1" rev="0" advAuto="0" spid="140" grpId="15"/>
-      <p:bldP build="whole" bldLvl="1" animBg="1" rev="0" advAuto="0" spid="134" grpId="2"/>
-      <p:bldP build="whole" bldLvl="1" animBg="1" rev="0" advAuto="0" spid="139" grpId="12"/>
-      <p:bldP build="whole" bldLvl="1" animBg="1" rev="0" advAuto="0" spid="141" grpId="13"/>
-      <p:bldP build="whole" bldLvl="1" animBg="1" rev="0" advAuto="0" spid="135" grpId="4"/>
-      <p:bldP build="whole" bldLvl="1" animBg="1" rev="0" advAuto="0" spid="142" grpId="14"/>
       <p:bldP build="whole" bldLvl="1" animBg="1" rev="0" advAuto="0" spid="132" grpId="5"/>
       <p:bldP build="whole" bldLvl="1" animBg="1" rev="0" advAuto="0" spid="131" grpId="11"/>
-      <p:bldP build="whole" bldLvl="1" animBg="1" rev="0" advAuto="0" spid="130" grpId="1"/>
+      <p:bldP build="whole" bldLvl="1" animBg="1" rev="0" advAuto="0" spid="141" grpId="13"/>
     </p:bldLst>
   </p:timing>
 </p:sld>
@@ -10146,8 +10146,8 @@
         </p:blipFill>
         <p:spPr>
           <a:xfrm>
-            <a:off x="7576486" y="1834420"/>
-            <a:ext cx="3908251" cy="3858705"/>
+            <a:off x="7576487" y="1834420"/>
+            <a:ext cx="3908250" cy="3858706"/>
           </a:xfrm>
           <a:prstGeom prst="rect">
             <a:avLst/>
@@ -10166,7 +10166,7 @@
         <p:spPr>
           <a:xfrm>
             <a:off x="5387982" y="7009757"/>
-            <a:ext cx="10464801" cy="1961514"/>
+            <a:ext cx="10464801" cy="1961515"/>
           </a:xfrm>
           <a:prstGeom prst="rect">
             <a:avLst/>
@@ -10700,7 +10700,7 @@
         <p:spPr>
           <a:xfrm>
             <a:off x="2575820" y="1618310"/>
-            <a:ext cx="8724975" cy="6705620"/>
+            <a:ext cx="8724975" cy="6705619"/>
           </a:xfrm>
           <a:prstGeom prst="rect">
             <a:avLst/>
@@ -10993,10 +10993,10 @@
       </p:par>
     </p:tnLst>
     <p:bldLst>
+      <p:bldP build="whole" bldLvl="1" animBg="1" rev="0" advAuto="0" spid="162" grpId="2"/>
+      <p:bldP build="whole" bldLvl="1" animBg="1" rev="0" advAuto="0" spid="162" grpId="1"/>
+      <p:bldP build="whole" bldLvl="1" animBg="1" rev="0" advAuto="0" spid="163" grpId="5"/>
       <p:bldP build="whole" bldLvl="1" animBg="1" rev="0" advAuto="0" spid="163" grpId="4"/>
-      <p:bldP build="whole" bldLvl="1" animBg="1" rev="0" advAuto="0" spid="163" grpId="5"/>
-      <p:bldP build="whole" bldLvl="1" animBg="1" rev="0" advAuto="0" spid="162" grpId="1"/>
-      <p:bldP build="whole" bldLvl="1" animBg="1" rev="0" advAuto="0" spid="162" grpId="2"/>
     </p:bldLst>
   </p:timing>
 </p:sld>
@@ -11355,9 +11355,39 @@
           <a:chExt cx="0" cy="0"/>
         </a:xfrm>
       </p:grpSpPr>
+      <p:pic>
+        <p:nvPicPr>
+          <p:cNvPr id="174" name="gantt.png" descr="gantt.png"/>
+          <p:cNvPicPr>
+            <a:picLocks noChangeAspect="1"/>
+          </p:cNvPicPr>
+          <p:nvPr/>
+        </p:nvPicPr>
+        <p:blipFill>
+          <a:blip r:embed="rId2">
+            <a:extLst/>
+          </a:blip>
+          <a:srcRect l="13137" t="9981" r="0" b="0"/>
+          <a:stretch>
+            <a:fillRect/>
+          </a:stretch>
+        </p:blipFill>
+        <p:spPr>
+          <a:xfrm>
+            <a:off x="4479677" y="2407345"/>
+            <a:ext cx="41516450" cy="5914492"/>
+          </a:xfrm>
+          <a:prstGeom prst="rect">
+            <a:avLst/>
+          </a:prstGeom>
+          <a:ln w="12700">
+            <a:miter lim="400000"/>
+          </a:ln>
+        </p:spPr>
+      </p:pic>
       <p:sp>
         <p:nvSpPr>
-          <p:cNvPr id="174" name="Déroulement du projet"/>
+          <p:cNvPr id="175" name="Déroulement du projet"/>
           <p:cNvSpPr txBox="1"/>
           <p:nvPr/>
         </p:nvSpPr>
@@ -11402,7 +11432,7 @@
       </p:sp>
       <p:sp>
         <p:nvSpPr>
-          <p:cNvPr id="175" name="Numéro de diapositive"/>
+          <p:cNvPr id="176" name="Numéro de diapositive"/>
           <p:cNvSpPr txBox="1"/>
           <p:nvPr>
             <p:ph type="sldNum" sz="quarter" idx="2"/>
@@ -11438,55 +11468,36 @@
           </a:p>
         </p:txBody>
       </p:sp>
-      <p:sp>
-        <p:nvSpPr>
-          <p:cNvPr id="176" name="Gantt"/>
-          <p:cNvSpPr/>
+      <p:pic>
+        <p:nvPicPr>
+          <p:cNvPr id="177" name="gantt.png" descr="gantt.png"/>
+          <p:cNvPicPr>
+            <a:picLocks noChangeAspect="1"/>
+          </p:cNvPicPr>
           <p:nvPr/>
-        </p:nvSpPr>
+        </p:nvPicPr>
+        <p:blipFill>
+          <a:blip r:embed="rId2">
+            <a:extLst/>
+          </a:blip>
+          <a:srcRect l="0" t="9981" r="90673" b="0"/>
+          <a:stretch>
+            <a:fillRect/>
+          </a:stretch>
+        </p:blipFill>
         <p:spPr>
           <a:xfrm>
-            <a:off x="545255" y="2577671"/>
-            <a:ext cx="11914290" cy="6582844"/>
+            <a:off x="9269" y="2407345"/>
+            <a:ext cx="4457659" cy="5914492"/>
           </a:xfrm>
           <a:prstGeom prst="rect">
             <a:avLst/>
           </a:prstGeom>
-          <a:solidFill>
-            <a:schemeClr val="accent1"/>
-          </a:solidFill>
           <a:ln w="12700">
             <a:miter lim="400000"/>
           </a:ln>
-          <a:extLst>
-            <a:ext uri="{C572A759-6A51-4108-AA02-DFA0A04FC94B}">
-              <ma14:wrappingTextBoxFlag xmlns:ma14="http://schemas.microsoft.com/office/mac/drawingml/2011/main" val="1"/>
-            </a:ext>
-          </a:extLst>
-        </p:spPr>
-        <p:txBody>
-          <a:bodyPr lIns="50800" tIns="50800" rIns="50800" bIns="50800" anchor="ctr"/>
-          <a:lstStyle>
-            <a:lvl1pPr>
-              <a:defRPr b="0" sz="2200">
-                <a:solidFill>
-                  <a:srgbClr val="FFFFFF"/>
-                </a:solidFill>
-                <a:latin typeface="+mn-lt"/>
-                <a:ea typeface="+mn-ea"/>
-                <a:cs typeface="+mn-cs"/>
-                <a:sym typeface="Helvetica Neue Medium"/>
-              </a:defRPr>
-            </a:lvl1pPr>
-          </a:lstStyle>
-          <a:p>
-            <a:pPr/>
-            <a:r>
-              <a:t>Gantt</a:t>
-            </a:r>
-          </a:p>
-        </p:txBody>
-      </p:sp>
+        </p:spPr>
+      </p:pic>
     </p:spTree>
   </p:cSld>
   <p:clrMapOvr>
@@ -11504,6 +11515,192 @@
       </p:transition>
     </mc:Fallback>
   </mc:AlternateContent>
+  <p:timing>
+    <p:tnLst>
+      <p:par>
+        <p:cTn id="1" nodeType="tmRoot" restart="never" dur="indefinite" fill="hold">
+          <p:childTnLst>
+            <p:seq concurrent="1" prevAc="none" nextAc="seek">
+              <p:cTn id="2" nodeType="mainSeq" dur="indefinite" fill="hold">
+                <p:childTnLst>
+                  <p:par>
+                    <p:cTn id="3" fill="hold">
+                      <p:stCondLst>
+                        <p:cond delay="indefinite"/>
+                      </p:stCondLst>
+                      <p:childTnLst>
+                        <p:par>
+                          <p:cTn id="4" fill="hold">
+                            <p:stCondLst>
+                              <p:cond delay="0"/>
+                            </p:stCondLst>
+                            <p:childTnLst>
+                              <p:par>
+                                <p:cTn id="5" presetClass="path" nodeType="clickEffect" presetSubtype="0" presetID="-1" grpId="1" accel="50000" decel="50000" fill="hold">
+                                  <p:stCondLst>
+                                    <p:cond delay="0"/>
+                                  </p:stCondLst>
+                                  <p:childTnLst>
+                                    <p:animMotion path="M 0.000000 0.000000 L -0.787797 0.000000" origin="layout" pathEditMode="relative">
+                                      <p:cBhvr>
+                                        <p:cTn id="6" dur="1000" fill="hold"/>
+                                        <p:tgtEl>
+                                          <p:spTgt spid="174"/>
+                                        </p:tgtEl>
+                                        <p:attrNameLst>
+                                          <p:attrName>ppt_x</p:attrName>
+                                          <p:attrName>ppt_y</p:attrName>
+                                        </p:attrNameLst>
+                                      </p:cBhvr>
+                                    </p:animMotion>
+                                  </p:childTnLst>
+                                </p:cTn>
+                              </p:par>
+                            </p:childTnLst>
+                          </p:cTn>
+                        </p:par>
+                      </p:childTnLst>
+                    </p:cTn>
+                  </p:par>
+                  <p:par>
+                    <p:cTn id="7" fill="hold">
+                      <p:stCondLst>
+                        <p:cond delay="indefinite"/>
+                      </p:stCondLst>
+                      <p:childTnLst>
+                        <p:par>
+                          <p:cTn id="8" fill="hold">
+                            <p:stCondLst>
+                              <p:cond delay="0"/>
+                            </p:stCondLst>
+                            <p:childTnLst>
+                              <p:par>
+                                <p:cTn id="9" presetClass="path" nodeType="clickEffect" presetSubtype="0" presetID="-1" grpId="2" accel="50000" decel="50000" fill="hold">
+                                  <p:stCondLst>
+                                    <p:cond delay="0"/>
+                                  </p:stCondLst>
+                                  <p:childTnLst>
+                                    <p:animMotion path="M -0.787797 0.000000 L -1.500155 -0.000000" origin="layout" pathEditMode="relative">
+                                      <p:cBhvr>
+                                        <p:cTn id="10" dur="1000" fill="hold"/>
+                                        <p:tgtEl>
+                                          <p:spTgt spid="174"/>
+                                        </p:tgtEl>
+                                        <p:attrNameLst>
+                                          <p:attrName>ppt_x</p:attrName>
+                                          <p:attrName>ppt_y</p:attrName>
+                                        </p:attrNameLst>
+                                      </p:cBhvr>
+                                    </p:animMotion>
+                                  </p:childTnLst>
+                                </p:cTn>
+                              </p:par>
+                            </p:childTnLst>
+                          </p:cTn>
+                        </p:par>
+                      </p:childTnLst>
+                    </p:cTn>
+                  </p:par>
+                  <p:par>
+                    <p:cTn id="11" fill="hold">
+                      <p:stCondLst>
+                        <p:cond delay="indefinite"/>
+                      </p:stCondLst>
+                      <p:childTnLst>
+                        <p:par>
+                          <p:cTn id="12" fill="hold">
+                            <p:stCondLst>
+                              <p:cond delay="0"/>
+                            </p:stCondLst>
+                            <p:childTnLst>
+                              <p:par>
+                                <p:cTn id="13" presetClass="path" nodeType="clickEffect" presetSubtype="0" presetID="-1" grpId="3" accel="50000" decel="50000" fill="hold">
+                                  <p:stCondLst>
+                                    <p:cond delay="0"/>
+                                  </p:stCondLst>
+                                  <p:childTnLst>
+                                    <p:animMotion path="M -1.500155 -0.000000 L -2.264964 0.000000" origin="layout" pathEditMode="relative">
+                                      <p:cBhvr>
+                                        <p:cTn id="14" dur="1000" fill="hold"/>
+                                        <p:tgtEl>
+                                          <p:spTgt spid="174"/>
+                                        </p:tgtEl>
+                                        <p:attrNameLst>
+                                          <p:attrName>ppt_x</p:attrName>
+                                          <p:attrName>ppt_y</p:attrName>
+                                        </p:attrNameLst>
+                                      </p:cBhvr>
+                                    </p:animMotion>
+                                  </p:childTnLst>
+                                </p:cTn>
+                              </p:par>
+                            </p:childTnLst>
+                          </p:cTn>
+                        </p:par>
+                      </p:childTnLst>
+                    </p:cTn>
+                  </p:par>
+                  <p:par>
+                    <p:cTn id="15" fill="hold">
+                      <p:stCondLst>
+                        <p:cond delay="indefinite"/>
+                      </p:stCondLst>
+                      <p:childTnLst>
+                        <p:par>
+                          <p:cTn id="16" fill="hold">
+                            <p:stCondLst>
+                              <p:cond delay="0"/>
+                            </p:stCondLst>
+                            <p:childTnLst>
+                              <p:par>
+                                <p:cTn id="17" presetClass="path" nodeType="clickEffect" presetSubtype="0" presetID="-1" grpId="4" accel="50000" decel="50000" fill="hold">
+                                  <p:stCondLst>
+                                    <p:cond delay="0"/>
+                                  </p:stCondLst>
+                                  <p:childTnLst>
+                                    <p:animMotion path="M -2.264964 0.000000 L -2.530636 -0.000000" origin="layout" pathEditMode="relative">
+                                      <p:cBhvr>
+                                        <p:cTn id="18" dur="1000" fill="hold"/>
+                                        <p:tgtEl>
+                                          <p:spTgt spid="174"/>
+                                        </p:tgtEl>
+                                        <p:attrNameLst>
+                                          <p:attrName>ppt_x</p:attrName>
+                                          <p:attrName>ppt_y</p:attrName>
+                                        </p:attrNameLst>
+                                      </p:cBhvr>
+                                    </p:animMotion>
+                                  </p:childTnLst>
+                                </p:cTn>
+                              </p:par>
+                            </p:childTnLst>
+                          </p:cTn>
+                        </p:par>
+                      </p:childTnLst>
+                    </p:cTn>
+                  </p:par>
+                </p:childTnLst>
+              </p:cTn>
+              <p:prevCondLst>
+                <p:cond evt="onPrev">
+                  <p:tgtEl>
+                    <p:sldTgt/>
+                  </p:tgtEl>
+                </p:cond>
+              </p:prevCondLst>
+              <p:nextCondLst>
+                <p:cond evt="onNext">
+                  <p:tgtEl>
+                    <p:sldTgt/>
+                  </p:tgtEl>
+                </p:cond>
+              </p:nextCondLst>
+            </p:seq>
+          </p:childTnLst>
+        </p:cTn>
+      </p:par>
+    </p:tnLst>
+  </p:timing>
 </p:sld>
 </file>
 
@@ -11526,7 +11723,7 @@
       </p:grpSpPr>
       <p:sp>
         <p:nvSpPr>
-          <p:cNvPr id="178" name="Présentation des défis techniques"/>
+          <p:cNvPr id="179" name="Présentation des défis techniques"/>
           <p:cNvSpPr txBox="1"/>
           <p:nvPr/>
         </p:nvSpPr>
@@ -11571,7 +11768,7 @@
       </p:sp>
       <p:sp>
         <p:nvSpPr>
-          <p:cNvPr id="179" name="Numéro de diapositive"/>
+          <p:cNvPr id="180" name="Numéro de diapositive"/>
           <p:cNvSpPr txBox="1"/>
           <p:nvPr>
             <p:ph type="sldNum" sz="quarter" idx="2"/>
@@ -11609,7 +11806,7 @@
       </p:sp>
       <p:sp>
         <p:nvSpPr>
-          <p:cNvPr id="180" name="Déplacer toutes les pièces"/>
+          <p:cNvPr id="181" name="Déplacer toutes les pièces"/>
           <p:cNvSpPr txBox="1"/>
           <p:nvPr/>
         </p:nvSpPr>
@@ -11652,7 +11849,7 @@
       </p:sp>
       <p:pic>
         <p:nvPicPr>
-          <p:cNvPr id="181" name="problems-with-synchronization.png" descr="problems-with-synchronization.png"/>
+          <p:cNvPr id="182" name="problems-with-synchronization.png" descr="problems-with-synchronization.png"/>
           <p:cNvPicPr>
             <a:picLocks noChangeAspect="1"/>
           </p:cNvPicPr>
@@ -11681,7 +11878,7 @@
       </p:pic>
       <p:sp>
         <p:nvSpPr>
-          <p:cNvPr id="182" name="Gestion du roque"/>
+          <p:cNvPr id="183" name="Gestion du roque"/>
           <p:cNvSpPr txBox="1"/>
           <p:nvPr/>
         </p:nvSpPr>
@@ -11724,7 +11921,7 @@
       </p:sp>
       <p:pic>
         <p:nvPicPr>
-          <p:cNvPr id="183" name="problems-with-synchronization.png" descr="problems-with-synchronization.png"/>
+          <p:cNvPr id="184" name="problems-with-synchronization.png" descr="problems-with-synchronization.png"/>
           <p:cNvPicPr>
             <a:picLocks noChangeAspect="1"/>
           </p:cNvPicPr>
@@ -11753,7 +11950,7 @@
       </p:pic>
       <p:sp>
         <p:nvSpPr>
-          <p:cNvPr id="184" name="Interface graphique fonctionnelle"/>
+          <p:cNvPr id="185" name="Interface graphique fonctionnelle"/>
           <p:cNvSpPr txBox="1"/>
           <p:nvPr/>
         </p:nvSpPr>
@@ -11796,7 +11993,7 @@
       </p:sp>
       <p:pic>
         <p:nvPicPr>
-          <p:cNvPr id="185" name="problems-with-synchronization.png" descr="problems-with-synchronization.png"/>
+          <p:cNvPr id="186" name="problems-with-synchronization.png" descr="problems-with-synchronization.png"/>
           <p:cNvPicPr>
             <a:picLocks noChangeAspect="1"/>
           </p:cNvPicPr>
@@ -11825,7 +12022,7 @@
       </p:pic>
       <p:sp>
         <p:nvSpPr>
-          <p:cNvPr id="186" name="Gestion de la fin de partie"/>
+          <p:cNvPr id="187" name="Gestion de la fin de partie"/>
           <p:cNvSpPr txBox="1"/>
           <p:nvPr/>
         </p:nvSpPr>
@@ -11868,7 +12065,7 @@
       </p:sp>
       <p:pic>
         <p:nvPicPr>
-          <p:cNvPr id="187" name="problems-with-synchronization.png" descr="problems-with-synchronization.png"/>
+          <p:cNvPr id="188" name="problems-with-synchronization.png" descr="problems-with-synchronization.png"/>
           <p:cNvPicPr>
             <a:picLocks noChangeAspect="1"/>
           </p:cNvPicPr>
@@ -11897,7 +12094,7 @@
       </p:pic>
       <p:sp>
         <p:nvSpPr>
-          <p:cNvPr id="188" name="Gestion de l’échec"/>
+          <p:cNvPr id="189" name="Gestion de l’échec"/>
           <p:cNvSpPr txBox="1"/>
           <p:nvPr/>
         </p:nvSpPr>
@@ -11940,7 +12137,7 @@
       </p:sp>
       <p:pic>
         <p:nvPicPr>
-          <p:cNvPr id="189" name="problems-with-synchronization.png" descr="problems-with-synchronization.png"/>
+          <p:cNvPr id="190" name="problems-with-synchronization.png" descr="problems-with-synchronization.png"/>
           <p:cNvPicPr>
             <a:picLocks noChangeAspect="1"/>
           </p:cNvPicPr>
@@ -12006,7 +12203,7 @@
       </p:grpSpPr>
       <p:sp>
         <p:nvSpPr>
-          <p:cNvPr id="191" name="Choix de conception"/>
+          <p:cNvPr id="192" name="Choix de conception"/>
           <p:cNvSpPr txBox="1"/>
           <p:nvPr/>
         </p:nvSpPr>
@@ -12051,7 +12248,7 @@
       </p:sp>
       <p:sp>
         <p:nvSpPr>
-          <p:cNvPr id="192" name="Numéro de diapositive"/>
+          <p:cNvPr id="193" name="Numéro de diapositive"/>
           <p:cNvSpPr txBox="1"/>
           <p:nvPr>
             <p:ph type="sldNum" sz="quarter" idx="2"/>
@@ -12089,7 +12286,7 @@
       </p:sp>
       <p:sp>
         <p:nvSpPr>
-          <p:cNvPr id="193" name="Texte"/>
+          <p:cNvPr id="194" name="Texte"/>
           <p:cNvSpPr txBox="1"/>
           <p:nvPr/>
         </p:nvSpPr>
@@ -12133,7 +12330,7 @@
       </p:sp>
       <p:pic>
         <p:nvPicPr>
-          <p:cNvPr id="194" name="UML_P1.png" descr="UML_P1.png"/>
+          <p:cNvPr id="195" name="UML_P1.png" descr="UML_P1.png"/>
           <p:cNvPicPr>
             <a:picLocks noChangeAspect="1"/>
           </p:cNvPicPr>
@@ -12162,7 +12359,7 @@
       </p:pic>
       <p:pic>
         <p:nvPicPr>
-          <p:cNvPr id="195" name="UML_P2.png" descr="UML_P2.png"/>
+          <p:cNvPr id="196" name="UML_P2.png" descr="UML_P2.png"/>
           <p:cNvPicPr>
             <a:picLocks noChangeAspect="1"/>
           </p:cNvPicPr>
@@ -12191,7 +12388,7 @@
       </p:pic>
       <p:pic>
         <p:nvPicPr>
-          <p:cNvPr id="196" name="UML_P3.png" descr="UML_P3.png"/>
+          <p:cNvPr id="197" name="UML_P3.png" descr="UML_P3.png"/>
           <p:cNvPicPr>
             <a:picLocks noChangeAspect="1"/>
           </p:cNvPicPr>
@@ -12220,7 +12417,7 @@
       </p:pic>
       <p:pic>
         <p:nvPicPr>
-          <p:cNvPr id="197" name="UML_P4.png" descr="UML_P4.png"/>
+          <p:cNvPr id="198" name="UML_P4.png" descr="UML_P4.png"/>
           <p:cNvPicPr>
             <a:picLocks noChangeAspect="1"/>
           </p:cNvPicPr>
@@ -12297,7 +12494,7 @@
                                       <p:cBhvr>
                                         <p:cTn id="6" fill="hold"/>
                                         <p:tgtEl>
-                                          <p:spTgt spid="194"/>
+                                          <p:spTgt spid="195"/>
                                         </p:tgtEl>
                                         <p:attrNameLst>
                                           <p:attrName>style.visibility</p:attrName>
@@ -12311,7 +12508,7 @@
                                       <p:cBhvr>
                                         <p:cTn id="7" dur="799"/>
                                         <p:tgtEl>
-                                          <p:spTgt spid="194"/>
+                                          <p:spTgt spid="195"/>
                                         </p:tgtEl>
                                       </p:cBhvr>
                                     </p:animEffect>
@@ -12346,7 +12543,7 @@
                                       <p:cBhvr>
                                         <p:cTn id="11" dur="1000" fill="hold"/>
                                         <p:tgtEl>
-                                          <p:spTgt spid="194"/>
+                                          <p:spTgt spid="195"/>
                                         </p:tgtEl>
                                       </p:cBhvr>
                                       <p:by x="20000" y="20000"/>
@@ -12373,7 +12570,7 @@
                                       <p:cBhvr>
                                         <p:cTn id="14" dur="1000" fill="hold"/>
                                         <p:tgtEl>
-                                          <p:spTgt spid="194"/>
+                                          <p:spTgt spid="195"/>
                                         </p:tgtEl>
                                         <p:attrNameLst>
                                           <p:attrName>ppt_x</p:attrName>
@@ -12406,7 +12603,7 @@
                                       <p:cBhvr>
                                         <p:cTn id="17" fill="hold"/>
                                         <p:tgtEl>
-                                          <p:spTgt spid="195"/>
+                                          <p:spTgt spid="196"/>
                                         </p:tgtEl>
                                         <p:attrNameLst>
                                           <p:attrName>style.visibility</p:attrName>
@@ -12420,7 +12617,7 @@
                                       <p:cBhvr>
                                         <p:cTn id="18" dur="799"/>
                                         <p:tgtEl>
-                                          <p:spTgt spid="195"/>
+                                          <p:spTgt spid="196"/>
                                         </p:tgtEl>
                                       </p:cBhvr>
                                     </p:animEffect>
@@ -12455,7 +12652,7 @@
                                       <p:cBhvr>
                                         <p:cTn id="22" dur="1000" fill="hold"/>
                                         <p:tgtEl>
-                                          <p:spTgt spid="195"/>
+                                          <p:spTgt spid="196"/>
                                         </p:tgtEl>
                                       </p:cBhvr>
                                       <p:by x="20000" y="20000"/>
@@ -12482,7 +12679,7 @@
                                       <p:cBhvr>
                                         <p:cTn id="25" dur="1000" fill="hold"/>
                                         <p:tgtEl>
-                                          <p:spTgt spid="195"/>
+                                          <p:spTgt spid="196"/>
                                         </p:tgtEl>
                                         <p:attrNameLst>
                                           <p:attrName>ppt_x</p:attrName>
@@ -12515,7 +12712,7 @@
                                       <p:cBhvr>
                                         <p:cTn id="28" fill="hold"/>
                                         <p:tgtEl>
-                                          <p:spTgt spid="196"/>
+                                          <p:spTgt spid="197"/>
                                         </p:tgtEl>
                                         <p:attrNameLst>
                                           <p:attrName>style.visibility</p:attrName>
@@ -12529,7 +12726,7 @@
                                       <p:cBhvr>
                                         <p:cTn id="29" dur="799"/>
                                         <p:tgtEl>
-                                          <p:spTgt spid="196"/>
+                                          <p:spTgt spid="197"/>
                                         </p:tgtEl>
                                       </p:cBhvr>
                                     </p:animEffect>
@@ -12564,7 +12761,7 @@
                                       <p:cBhvr>
                                         <p:cTn id="33" dur="1000" fill="hold"/>
                                         <p:tgtEl>
-                                          <p:spTgt spid="196"/>
+                                          <p:spTgt spid="197"/>
                                         </p:tgtEl>
                                       </p:cBhvr>
                                       <p:by x="20000" y="20000"/>
@@ -12591,7 +12788,7 @@
                                       <p:cBhvr>
                                         <p:cTn id="36" dur="1000" fill="hold"/>
                                         <p:tgtEl>
-                                          <p:spTgt spid="196"/>
+                                          <p:spTgt spid="197"/>
                                         </p:tgtEl>
                                         <p:attrNameLst>
                                           <p:attrName>ppt_x</p:attrName>
@@ -12624,7 +12821,7 @@
                                       <p:cBhvr>
                                         <p:cTn id="39" fill="hold"/>
                                         <p:tgtEl>
-                                          <p:spTgt spid="197"/>
+                                          <p:spTgt spid="198"/>
                                         </p:tgtEl>
                                         <p:attrNameLst>
                                           <p:attrName>style.visibility</p:attrName>
@@ -12638,7 +12835,7 @@
                                       <p:cBhvr>
                                         <p:cTn id="40" dur="800"/>
                                         <p:tgtEl>
-                                          <p:spTgt spid="197"/>
+                                          <p:spTgt spid="198"/>
                                         </p:tgtEl>
                                       </p:cBhvr>
                                     </p:animEffect>
@@ -12673,7 +12870,7 @@
                                       <p:cBhvr>
                                         <p:cTn id="44" dur="1000" fill="hold"/>
                                         <p:tgtEl>
-                                          <p:spTgt spid="197"/>
+                                          <p:spTgt spid="198"/>
                                         </p:tgtEl>
                                       </p:cBhvr>
                                       <p:by x="20000" y="20000"/>
@@ -12700,7 +12897,7 @@
                                       <p:cBhvr>
                                         <p:cTn id="47" dur="1000" fill="hold"/>
                                         <p:tgtEl>
-                                          <p:spTgt spid="197"/>
+                                          <p:spTgt spid="198"/>
                                         </p:tgtEl>
                                         <p:attrNameLst>
                                           <p:attrName>ppt_x</p:attrName>
@@ -12739,14 +12936,14 @@
       </p:par>
     </p:tnLst>
     <p:bldLst>
-      <p:bldP build="whole" bldLvl="1" animBg="1" rev="0" advAuto="0" spid="194" grpId="1"/>
-      <p:bldP build="whole" bldLvl="1" animBg="1" rev="0" advAuto="0" spid="194" grpId="2"/>
-      <p:bldP build="whole" bldLvl="1" animBg="1" rev="0" advAuto="0" spid="196" grpId="7"/>
-      <p:bldP build="whole" bldLvl="1" animBg="1" rev="0" advAuto="0" spid="196" grpId="8"/>
-      <p:bldP build="whole" bldLvl="1" animBg="1" rev="0" advAuto="0" spid="197" grpId="10"/>
-      <p:bldP build="whole" bldLvl="1" animBg="1" rev="0" advAuto="0" spid="197" grpId="11"/>
-      <p:bldP build="whole" bldLvl="1" animBg="1" rev="0" advAuto="0" spid="195" grpId="4"/>
-      <p:bldP build="whole" bldLvl="1" animBg="1" rev="0" advAuto="0" spid="195" grpId="5"/>
+      <p:bldP build="whole" bldLvl="1" animBg="1" rev="0" advAuto="0" spid="196" grpId="5"/>
+      <p:bldP build="whole" bldLvl="1" animBg="1" rev="0" advAuto="0" spid="195" grpId="1"/>
+      <p:bldP build="whole" bldLvl="1" animBg="1" rev="0" advAuto="0" spid="195" grpId="2"/>
+      <p:bldP build="whole" bldLvl="1" animBg="1" rev="0" advAuto="0" spid="197" grpId="7"/>
+      <p:bldP build="whole" bldLvl="1" animBg="1" rev="0" advAuto="0" spid="197" grpId="8"/>
+      <p:bldP build="whole" bldLvl="1" animBg="1" rev="0" advAuto="0" spid="198" grpId="10"/>
+      <p:bldP build="whole" bldLvl="1" animBg="1" rev="0" advAuto="0" spid="198" grpId="11"/>
+      <p:bldP build="whole" bldLvl="1" animBg="1" rev="0" advAuto="0" spid="196" grpId="4"/>
     </p:bldLst>
   </p:timing>
 </p:sld>
@@ -12771,7 +12968,7 @@
       </p:grpSpPr>
       <p:sp>
         <p:nvSpPr>
-          <p:cNvPr id="199" name="Répartition des tâches"/>
+          <p:cNvPr id="200" name="Répartition des tâches"/>
           <p:cNvSpPr txBox="1"/>
           <p:nvPr/>
         </p:nvSpPr>
@@ -12816,7 +13013,7 @@
       </p:sp>
       <p:sp>
         <p:nvSpPr>
-          <p:cNvPr id="200" name="Numéro de diapositive"/>
+          <p:cNvPr id="201" name="Numéro de diapositive"/>
           <p:cNvSpPr txBox="1"/>
           <p:nvPr>
             <p:ph type="sldNum" sz="quarter" idx="2"/>
@@ -12854,7 +13051,7 @@
       </p:sp>
       <p:sp>
         <p:nvSpPr>
-          <p:cNvPr id="201" name="Texte"/>
+          <p:cNvPr id="202" name="Texte"/>
           <p:cNvSpPr txBox="1"/>
           <p:nvPr/>
         </p:nvSpPr>
@@ -12898,35 +13095,6 @@
       </p:sp>
       <p:pic>
         <p:nvPicPr>
-          <p:cNvPr id="202" name="boss.png" descr="boss.png"/>
-          <p:cNvPicPr>
-            <a:picLocks noChangeAspect="1"/>
-          </p:cNvPicPr>
-          <p:nvPr/>
-        </p:nvPicPr>
-        <p:blipFill>
-          <a:blip r:embed="rId2">
-            <a:extLst/>
-          </a:blip>
-          <a:stretch>
-            <a:fillRect/>
-          </a:stretch>
-        </p:blipFill>
-        <p:spPr>
-          <a:xfrm>
-            <a:off x="1205633" y="2184041"/>
-            <a:ext cx="1293354" cy="1293354"/>
-          </a:xfrm>
-          <a:prstGeom prst="rect">
-            <a:avLst/>
-          </a:prstGeom>
-          <a:ln w="12700">
-            <a:miter lim="400000"/>
-          </a:ln>
-        </p:spPr>
-      </p:pic>
-      <p:pic>
-        <p:nvPicPr>
           <p:cNvPr id="203" name="boss.png" descr="boss.png"/>
           <p:cNvPicPr>
             <a:picLocks noChangeAspect="1"/>
@@ -12943,7 +13111,7 @@
         </p:blipFill>
         <p:spPr>
           <a:xfrm>
-            <a:off x="1205633" y="4422409"/>
+            <a:off x="1205633" y="2184041"/>
             <a:ext cx="1293354" cy="1293354"/>
           </a:xfrm>
           <a:prstGeom prst="rect">
@@ -12972,7 +13140,7 @@
         </p:blipFill>
         <p:spPr>
           <a:xfrm>
-            <a:off x="1205633" y="6660776"/>
+            <a:off x="1205633" y="4422409"/>
             <a:ext cx="1293354" cy="1293354"/>
           </a:xfrm>
           <a:prstGeom prst="rect">
@@ -13001,7 +13169,7 @@
         </p:blipFill>
         <p:spPr>
           <a:xfrm>
-            <a:off x="7058570" y="2184041"/>
+            <a:off x="1205633" y="6660776"/>
             <a:ext cx="1293354" cy="1293354"/>
           </a:xfrm>
           <a:prstGeom prst="rect">
@@ -13030,7 +13198,7 @@
         </p:blipFill>
         <p:spPr>
           <a:xfrm>
-            <a:off x="7058570" y="4422409"/>
+            <a:off x="7058570" y="2184041"/>
             <a:ext cx="1293354" cy="1293354"/>
           </a:xfrm>
           <a:prstGeom prst="rect">
@@ -13059,6 +13227,35 @@
         </p:blipFill>
         <p:spPr>
           <a:xfrm>
+            <a:off x="7058570" y="4422409"/>
+            <a:ext cx="1293354" cy="1293354"/>
+          </a:xfrm>
+          <a:prstGeom prst="rect">
+            <a:avLst/>
+          </a:prstGeom>
+          <a:ln w="12700">
+            <a:miter lim="400000"/>
+          </a:ln>
+        </p:spPr>
+      </p:pic>
+      <p:pic>
+        <p:nvPicPr>
+          <p:cNvPr id="208" name="boss.png" descr="boss.png"/>
+          <p:cNvPicPr>
+            <a:picLocks noChangeAspect="1"/>
+          </p:cNvPicPr>
+          <p:nvPr/>
+        </p:nvPicPr>
+        <p:blipFill>
+          <a:blip r:embed="rId2">
+            <a:extLst/>
+          </a:blip>
+          <a:stretch>
+            <a:fillRect/>
+          </a:stretch>
+        </p:blipFill>
+        <p:spPr>
+          <a:xfrm>
             <a:off x="7058570" y="6660776"/>
             <a:ext cx="1293354" cy="1293354"/>
           </a:xfrm>
@@ -13072,7 +13269,7 @@
       </p:pic>
       <p:sp>
         <p:nvSpPr>
-          <p:cNvPr id="208" name="Paul"/>
+          <p:cNvPr id="209" name="Paul"/>
           <p:cNvSpPr txBox="1"/>
           <p:nvPr/>
         </p:nvSpPr>
@@ -13112,7 +13309,7 @@
       </p:sp>
       <p:sp>
         <p:nvSpPr>
-          <p:cNvPr id="209" name="Création de la classe jeu…"/>
+          <p:cNvPr id="210" name="Création de la classe jeu…"/>
           <p:cNvSpPr txBox="1"/>
           <p:nvPr/>
         </p:nvSpPr>
@@ -13176,7 +13373,7 @@
       </p:sp>
       <p:sp>
         <p:nvSpPr>
-          <p:cNvPr id="210" name="Création de la classe Plateau…"/>
+          <p:cNvPr id="211" name="Création de la classe Plateau…"/>
           <p:cNvSpPr txBox="1"/>
           <p:nvPr/>
         </p:nvSpPr>
@@ -13258,14 +13455,14 @@
       </p:sp>
       <p:sp>
         <p:nvSpPr>
-          <p:cNvPr id="211" name="Création de la classe Roi…"/>
+          <p:cNvPr id="212" name="Création de la classe Roi…"/>
           <p:cNvSpPr txBox="1"/>
           <p:nvPr/>
         </p:nvSpPr>
         <p:spPr>
           <a:xfrm>
-            <a:off x="8557273" y="6936181"/>
-            <a:ext cx="3885820" cy="742545"/>
+            <a:off x="8557273" y="6897861"/>
+            <a:ext cx="3885820" cy="1098145"/>
           </a:xfrm>
           <a:prstGeom prst="rect">
             <a:avLst/>
@@ -13310,11 +13507,24 @@
               <a:t>Création de la classe Tour</a:t>
             </a:r>
           </a:p>
+          <a:p>
+            <a:pPr marL="272435" indent="-272435" algn="l">
+              <a:spcBef>
+                <a:spcPts val="500"/>
+              </a:spcBef>
+              <a:buSzPct val="145000"/>
+              <a:buChar char="-"/>
+              <a:defRPr b="0" sz="1900"/>
+            </a:pPr>
+            <a:r>
+              <a:t>Création des images</a:t>
+            </a:r>
+          </a:p>
         </p:txBody>
       </p:sp>
       <p:sp>
         <p:nvSpPr>
-          <p:cNvPr id="212" name="Chef de projet…"/>
+          <p:cNvPr id="213" name="Chef de projet…"/>
           <p:cNvSpPr txBox="1"/>
           <p:nvPr/>
         </p:nvSpPr>
@@ -13383,7 +13593,7 @@
       </p:sp>
       <p:sp>
         <p:nvSpPr>
-          <p:cNvPr id="213" name="David"/>
+          <p:cNvPr id="214" name="David"/>
           <p:cNvSpPr txBox="1"/>
           <p:nvPr/>
         </p:nvSpPr>
@@ -13423,7 +13633,7 @@
       </p:sp>
       <p:sp>
         <p:nvSpPr>
-          <p:cNvPr id="214" name="Théo"/>
+          <p:cNvPr id="215" name="Théo"/>
           <p:cNvSpPr txBox="1"/>
           <p:nvPr/>
         </p:nvSpPr>
@@ -13463,7 +13673,7 @@
       </p:sp>
       <p:sp>
         <p:nvSpPr>
-          <p:cNvPr id="215" name="Benjamin"/>
+          <p:cNvPr id="216" name="Benjamin"/>
           <p:cNvSpPr txBox="1"/>
           <p:nvPr/>
         </p:nvSpPr>
@@ -13503,7 +13713,7 @@
       </p:sp>
       <p:sp>
         <p:nvSpPr>
-          <p:cNvPr id="216" name="Alexis"/>
+          <p:cNvPr id="217" name="Alexis"/>
           <p:cNvSpPr txBox="1"/>
           <p:nvPr/>
         </p:nvSpPr>
@@ -13543,7 +13753,7 @@
       </p:sp>
       <p:sp>
         <p:nvSpPr>
-          <p:cNvPr id="217" name="Victor"/>
+          <p:cNvPr id="218" name="Victor"/>
           <p:cNvSpPr txBox="1"/>
           <p:nvPr/>
         </p:nvSpPr>
@@ -13583,7 +13793,7 @@
       </p:sp>
       <p:sp>
         <p:nvSpPr>
-          <p:cNvPr id="218" name="Création de la classe Fou…"/>
+          <p:cNvPr id="219" name="Création de la classe Fou…"/>
           <p:cNvSpPr txBox="1"/>
           <p:nvPr/>
         </p:nvSpPr>
@@ -13639,7 +13849,7 @@
       </p:sp>
       <p:sp>
         <p:nvSpPr>
-          <p:cNvPr id="219" name="Création de la classe Dame…"/>
+          <p:cNvPr id="220" name="Création de la classe Dame…"/>
           <p:cNvSpPr txBox="1"/>
           <p:nvPr/>
         </p:nvSpPr>

</xml_diff>